<commit_message>
Update all figures to hopefully nicer top level block diagram
</commit_message>
<xml_diff>
--- a/figs/path-host-to-host.pptx
+++ b/figs/path-host-to-host.pptx
@@ -5,7 +5,7 @@
     <p:sldMasterId id="2147483648" r:id="rId4"/>
   </p:sldMasterIdLst>
   <p:sldIdLst>
-    <p:sldId id="273" r:id="rId5"/>
+    <p:sldId id="282" r:id="rId5"/>
   </p:sldIdLst>
   <p:sldSz cx="12192000" cy="6858000"/>
   <p:notesSz cx="6858000" cy="9144000"/>
@@ -115,7 +115,7 @@
 <file path=ppt/revisionInfo.xml><?xml version="1.0" encoding="utf-8"?>
 <p1510:revInfo xmlns:a="http://schemas.openxmlformats.org/drawingml/2006/main" xmlns:r="http://schemas.openxmlformats.org/officeDocument/2006/relationships" xmlns:p1510="http://schemas.microsoft.com/office/powerpoint/2015/10/main">
   <p1510:revLst>
-    <p1510:client id="{52E177FF-F235-4E07-92D0-8AE232DD6722}" v="11" dt="2020-11-22T05:15:49.478"/>
+    <p1510:client id="{215CE144-FB56-4986-BEC6-0B0CEE9927E5}" v="35" dt="2021-05-15T04:24:08.073"/>
   </p1510:revLst>
 </p1510:revInfo>
 </file>
@@ -123,32 +123,32 @@
 <file path=ppt/changesInfos/changesInfo1.xml><?xml version="1.0" encoding="utf-8"?>
 <pc:chgInfo xmlns:a="http://schemas.openxmlformats.org/drawingml/2006/main" xmlns:r="http://schemas.openxmlformats.org/officeDocument/2006/relationships" xmlns:ac="http://schemas.microsoft.com/office/drawing/2013/main/command" xmlns:pc="http://schemas.microsoft.com/office/powerpoint/2013/main/command">
   <pc:docChgLst>
-    <pc:chgData name="Fingerhut, John Andy" userId="6ad675d3-541e-4813-9336-4804cd571dc7" providerId="ADAL" clId="{F85A5950-EE91-4412-982E-458B5E7BE61D}"/>
+    <pc:chgData name="Fingerhut, John Andy" userId="6ad675d3-541e-4813-9336-4804cd571dc7" providerId="ADAL" clId="{215CE144-FB56-4986-BEC6-0B0CEE9927E5}"/>
     <pc:docChg chg="custSel modSld">
-      <pc:chgData name="Fingerhut, John Andy" userId="6ad675d3-541e-4813-9336-4804cd571dc7" providerId="ADAL" clId="{F85A5950-EE91-4412-982E-458B5E7BE61D}" dt="2020-11-22T05:15:49.478" v="11"/>
+      <pc:chgData name="Fingerhut, John Andy" userId="6ad675d3-541e-4813-9336-4804cd571dc7" providerId="ADAL" clId="{215CE144-FB56-4986-BEC6-0B0CEE9927E5}" dt="2021-05-15T04:24:08.073" v="35" actId="206"/>
       <pc:docMkLst>
         <pc:docMk/>
       </pc:docMkLst>
-      <pc:sldChg chg="delSp modSp">
-        <pc:chgData name="Fingerhut, John Andy" userId="6ad675d3-541e-4813-9336-4804cd571dc7" providerId="ADAL" clId="{F85A5950-EE91-4412-982E-458B5E7BE61D}" dt="2020-11-22T05:15:49.478" v="11"/>
+      <pc:sldChg chg="addSp delSp modSp mod">
+        <pc:chgData name="Fingerhut, John Andy" userId="6ad675d3-541e-4813-9336-4804cd571dc7" providerId="ADAL" clId="{215CE144-FB56-4986-BEC6-0B0CEE9927E5}" dt="2021-05-15T04:24:08.073" v="35" actId="206"/>
         <pc:sldMkLst>
           <pc:docMk/>
-          <pc:sldMk cId="1091789387" sldId="273"/>
+          <pc:sldMk cId="385545695" sldId="282"/>
         </pc:sldMkLst>
-        <pc:spChg chg="mod">
-          <ac:chgData name="Fingerhut, John Andy" userId="6ad675d3-541e-4813-9336-4804cd571dc7" providerId="ADAL" clId="{F85A5950-EE91-4412-982E-458B5E7BE61D}" dt="2020-11-22T05:15:49.478" v="11"/>
+        <pc:spChg chg="del">
+          <ac:chgData name="Fingerhut, John Andy" userId="6ad675d3-541e-4813-9336-4804cd571dc7" providerId="ADAL" clId="{215CE144-FB56-4986-BEC6-0B0CEE9927E5}" dt="2021-05-15T04:21:02.626" v="5" actId="478"/>
           <ac:spMkLst>
             <pc:docMk/>
-            <pc:sldMk cId="1091789387" sldId="273"/>
-            <ac:spMk id="2" creationId="{00F816EC-A0CB-4148-88E8-08B4A0808DCA}"/>
+            <pc:sldMk cId="385545695" sldId="282"/>
+            <ac:spMk id="100" creationId="{9866221D-E22D-494F-A732-52D1550B6CE5}"/>
           </ac:spMkLst>
         </pc:spChg>
-        <pc:spChg chg="del">
-          <ac:chgData name="Fingerhut, John Andy" userId="6ad675d3-541e-4813-9336-4804cd571dc7" providerId="ADAL" clId="{F85A5950-EE91-4412-982E-458B5E7BE61D}" dt="2020-11-22T05:14:14.968" v="0" actId="478"/>
+        <pc:spChg chg="add mod">
+          <ac:chgData name="Fingerhut, John Andy" userId="6ad675d3-541e-4813-9336-4804cd571dc7" providerId="ADAL" clId="{215CE144-FB56-4986-BEC6-0B0CEE9927E5}" dt="2021-05-15T04:24:08.073" v="35" actId="206"/>
           <ac:spMkLst>
             <pc:docMk/>
-            <pc:sldMk cId="1091789387" sldId="273"/>
-            <ac:spMk id="5" creationId="{0D414962-0FBF-4AFF-A93C-316C95994580}"/>
+            <pc:sldMk cId="385545695" sldId="282"/>
+            <ac:spMk id="103" creationId="{4A35EDA1-0A85-40E8-B400-8872957932A3}"/>
           </ac:spMkLst>
         </pc:spChg>
       </pc:sldChg>
@@ -304,7 +304,7 @@
           <a:p>
             <a:fld id="{B72825D7-6CAC-4DD9-81D1-F420B7F343C3}" type="datetimeFigureOut">
               <a:rPr lang="en-US" smtClean="0"/>
-              <a:t>11/21/2020</a:t>
+              <a:t>5/15/2021</a:t>
             </a:fld>
             <a:endParaRPr lang="en-US"/>
           </a:p>
@@ -502,7 +502,7 @@
           <a:p>
             <a:fld id="{B72825D7-6CAC-4DD9-81D1-F420B7F343C3}" type="datetimeFigureOut">
               <a:rPr lang="en-US" smtClean="0"/>
-              <a:t>11/21/2020</a:t>
+              <a:t>5/15/2021</a:t>
             </a:fld>
             <a:endParaRPr lang="en-US"/>
           </a:p>
@@ -710,7 +710,7 @@
           <a:p>
             <a:fld id="{B72825D7-6CAC-4DD9-81D1-F420B7F343C3}" type="datetimeFigureOut">
               <a:rPr lang="en-US" smtClean="0"/>
-              <a:t>11/21/2020</a:t>
+              <a:t>5/15/2021</a:t>
             </a:fld>
             <a:endParaRPr lang="en-US"/>
           </a:p>
@@ -908,7 +908,7 @@
           <a:p>
             <a:fld id="{B72825D7-6CAC-4DD9-81D1-F420B7F343C3}" type="datetimeFigureOut">
               <a:rPr lang="en-US" smtClean="0"/>
-              <a:t>11/21/2020</a:t>
+              <a:t>5/15/2021</a:t>
             </a:fld>
             <a:endParaRPr lang="en-US"/>
           </a:p>
@@ -1183,7 +1183,7 @@
           <a:p>
             <a:fld id="{B72825D7-6CAC-4DD9-81D1-F420B7F343C3}" type="datetimeFigureOut">
               <a:rPr lang="en-US" smtClean="0"/>
-              <a:t>11/21/2020</a:t>
+              <a:t>5/15/2021</a:t>
             </a:fld>
             <a:endParaRPr lang="en-US"/>
           </a:p>
@@ -1448,7 +1448,7 @@
           <a:p>
             <a:fld id="{B72825D7-6CAC-4DD9-81D1-F420B7F343C3}" type="datetimeFigureOut">
               <a:rPr lang="en-US" smtClean="0"/>
-              <a:t>11/21/2020</a:t>
+              <a:t>5/15/2021</a:t>
             </a:fld>
             <a:endParaRPr lang="en-US"/>
           </a:p>
@@ -1860,7 +1860,7 @@
           <a:p>
             <a:fld id="{B72825D7-6CAC-4DD9-81D1-F420B7F343C3}" type="datetimeFigureOut">
               <a:rPr lang="en-US" smtClean="0"/>
-              <a:t>11/21/2020</a:t>
+              <a:t>5/15/2021</a:t>
             </a:fld>
             <a:endParaRPr lang="en-US"/>
           </a:p>
@@ -2001,7 +2001,7 @@
           <a:p>
             <a:fld id="{B72825D7-6CAC-4DD9-81D1-F420B7F343C3}" type="datetimeFigureOut">
               <a:rPr lang="en-US" smtClean="0"/>
-              <a:t>11/21/2020</a:t>
+              <a:t>5/15/2021</a:t>
             </a:fld>
             <a:endParaRPr lang="en-US"/>
           </a:p>
@@ -2114,7 +2114,7 @@
           <a:p>
             <a:fld id="{B72825D7-6CAC-4DD9-81D1-F420B7F343C3}" type="datetimeFigureOut">
               <a:rPr lang="en-US" smtClean="0"/>
-              <a:t>11/21/2020</a:t>
+              <a:t>5/15/2021</a:t>
             </a:fld>
             <a:endParaRPr lang="en-US"/>
           </a:p>
@@ -2425,7 +2425,7 @@
           <a:p>
             <a:fld id="{B72825D7-6CAC-4DD9-81D1-F420B7F343C3}" type="datetimeFigureOut">
               <a:rPr lang="en-US" smtClean="0"/>
-              <a:t>11/21/2020</a:t>
+              <a:t>5/15/2021</a:t>
             </a:fld>
             <a:endParaRPr lang="en-US"/>
           </a:p>
@@ -2713,7 +2713,7 @@
           <a:p>
             <a:fld id="{B72825D7-6CAC-4DD9-81D1-F420B7F343C3}" type="datetimeFigureOut">
               <a:rPr lang="en-US" smtClean="0"/>
-              <a:t>11/21/2020</a:t>
+              <a:t>5/15/2021</a:t>
             </a:fld>
             <a:endParaRPr lang="en-US"/>
           </a:p>
@@ -2954,7 +2954,7 @@
           <a:p>
             <a:fld id="{B72825D7-6CAC-4DD9-81D1-F420B7F343C3}" type="datetimeFigureOut">
               <a:rPr lang="en-US" smtClean="0"/>
-              <a:t>11/21/2020</a:t>
+              <a:t>5/15/2021</a:t>
             </a:fld>
             <a:endParaRPr lang="en-US"/>
           </a:p>
@@ -3385,7 +3385,7 @@
         </p:nvSpPr>
         <p:spPr>
           <a:xfrm rot="16200000">
-            <a:off x="8767177" y="3937957"/>
+            <a:off x="8327088" y="3937957"/>
             <a:ext cx="2276178" cy="392105"/>
           </a:xfrm>
           <a:prstGeom prst="rect">
@@ -3429,1060 +3429,6 @@
       </p:sp>
       <p:grpSp>
         <p:nvGrpSpPr>
-          <p:cNvPr id="25" name="Group 24">
-            <a:extLst>
-              <a:ext uri="{FF2B5EF4-FFF2-40B4-BE49-F238E27FC236}">
-                <a16:creationId xmlns:a16="http://schemas.microsoft.com/office/drawing/2014/main" id="{D3A54630-E9F6-45DD-998F-E5DC0F14A399}"/>
-              </a:ext>
-            </a:extLst>
-          </p:cNvPr>
-          <p:cNvGrpSpPr/>
-          <p:nvPr/>
-        </p:nvGrpSpPr>
-        <p:grpSpPr>
-          <a:xfrm rot="16200000">
-            <a:off x="5802220" y="2927995"/>
-            <a:ext cx="1676833" cy="1661997"/>
-            <a:chOff x="6523829" y="1695985"/>
-            <a:chExt cx="1676833" cy="1661997"/>
-          </a:xfrm>
-        </p:grpSpPr>
-        <p:sp>
-          <p:nvSpPr>
-            <p:cNvPr id="7" name="Rectangle 6">
-              <a:extLst>
-                <a:ext uri="{FF2B5EF4-FFF2-40B4-BE49-F238E27FC236}">
-                  <a16:creationId xmlns:a16="http://schemas.microsoft.com/office/drawing/2014/main" id="{9719FC3C-4B0A-4BE8-AD6C-44B06ECD8204}"/>
-                </a:ext>
-              </a:extLst>
-            </p:cNvPr>
-            <p:cNvSpPr/>
-            <p:nvPr/>
-          </p:nvSpPr>
-          <p:spPr>
-            <a:xfrm>
-              <a:off x="6548148" y="1698443"/>
-              <a:ext cx="1621162" cy="1657688"/>
-            </a:xfrm>
-            <a:prstGeom prst="rect">
-              <a:avLst/>
-            </a:prstGeom>
-            <a:solidFill>
-              <a:schemeClr val="accent5">
-                <a:lumMod val="40000"/>
-                <a:lumOff val="60000"/>
-              </a:schemeClr>
-            </a:solidFill>
-          </p:spPr>
-          <p:style>
-            <a:lnRef idx="2">
-              <a:schemeClr val="accent1">
-                <a:shade val="50000"/>
-              </a:schemeClr>
-            </a:lnRef>
-            <a:fillRef idx="1">
-              <a:schemeClr val="accent1"/>
-            </a:fillRef>
-            <a:effectRef idx="0">
-              <a:schemeClr val="accent1"/>
-            </a:effectRef>
-            <a:fontRef idx="minor">
-              <a:schemeClr val="lt1"/>
-            </a:fontRef>
-          </p:style>
-          <p:txBody>
-            <a:bodyPr rtlCol="0" anchor="ctr"/>
-            <a:lstStyle/>
-            <a:p>
-              <a:endParaRPr lang="en-US" dirty="0">
-                <a:solidFill>
-                  <a:schemeClr val="tx1"/>
-                </a:solidFill>
-              </a:endParaRPr>
-            </a:p>
-          </p:txBody>
-        </p:sp>
-        <p:sp>
-          <p:nvSpPr>
-            <p:cNvPr id="9" name="Rectangle 8">
-              <a:extLst>
-                <a:ext uri="{FF2B5EF4-FFF2-40B4-BE49-F238E27FC236}">
-                  <a16:creationId xmlns:a16="http://schemas.microsoft.com/office/drawing/2014/main" id="{08CD8402-7233-47B1-A1B5-23D2E88AF40D}"/>
-                </a:ext>
-              </a:extLst>
-            </p:cNvPr>
-            <p:cNvSpPr/>
-            <p:nvPr/>
-          </p:nvSpPr>
-          <p:spPr>
-            <a:xfrm>
-              <a:off x="6610278" y="2059975"/>
-              <a:ext cx="1494503" cy="224589"/>
-            </a:xfrm>
-            <a:prstGeom prst="rect">
-              <a:avLst/>
-            </a:prstGeom>
-            <a:solidFill>
-              <a:srgbClr val="00B050"/>
-            </a:solidFill>
-          </p:spPr>
-          <p:style>
-            <a:lnRef idx="2">
-              <a:schemeClr val="accent1">
-                <a:shade val="50000"/>
-              </a:schemeClr>
-            </a:lnRef>
-            <a:fillRef idx="1">
-              <a:schemeClr val="accent1"/>
-            </a:fillRef>
-            <a:effectRef idx="0">
-              <a:schemeClr val="accent1"/>
-            </a:effectRef>
-            <a:fontRef idx="minor">
-              <a:schemeClr val="lt1"/>
-            </a:fontRef>
-          </p:style>
-          <p:txBody>
-            <a:bodyPr rtlCol="0" anchor="ctr"/>
-            <a:lstStyle/>
-            <a:p>
-              <a:pPr algn="ctr"/>
-              <a:r>
-                <a:rPr lang="en-US" dirty="0"/>
-                <a:t>Main Parser</a:t>
-              </a:r>
-            </a:p>
-          </p:txBody>
-        </p:sp>
-        <p:sp>
-          <p:nvSpPr>
-            <p:cNvPr id="10" name="Rectangle 9">
-              <a:extLst>
-                <a:ext uri="{FF2B5EF4-FFF2-40B4-BE49-F238E27FC236}">
-                  <a16:creationId xmlns:a16="http://schemas.microsoft.com/office/drawing/2014/main" id="{4DA835D9-811A-4207-86BD-82A8C24C1D85}"/>
-                </a:ext>
-              </a:extLst>
-            </p:cNvPr>
-            <p:cNvSpPr/>
-            <p:nvPr/>
-          </p:nvSpPr>
-          <p:spPr>
-            <a:xfrm>
-              <a:off x="6610278" y="2422677"/>
-              <a:ext cx="1494503" cy="200960"/>
-            </a:xfrm>
-            <a:prstGeom prst="rect">
-              <a:avLst/>
-            </a:prstGeom>
-            <a:solidFill>
-              <a:srgbClr val="00B050"/>
-            </a:solidFill>
-          </p:spPr>
-          <p:style>
-            <a:lnRef idx="2">
-              <a:schemeClr val="accent1">
-                <a:shade val="50000"/>
-              </a:schemeClr>
-            </a:lnRef>
-            <a:fillRef idx="1">
-              <a:schemeClr val="accent1"/>
-            </a:fillRef>
-            <a:effectRef idx="0">
-              <a:schemeClr val="accent1"/>
-            </a:effectRef>
-            <a:fontRef idx="minor">
-              <a:schemeClr val="lt1"/>
-            </a:fontRef>
-          </p:style>
-          <p:txBody>
-            <a:bodyPr rtlCol="0" anchor="ctr"/>
-            <a:lstStyle/>
-            <a:p>
-              <a:pPr algn="ctr"/>
-              <a:r>
-                <a:rPr lang="en-US" dirty="0"/>
-                <a:t>Main control</a:t>
-              </a:r>
-            </a:p>
-          </p:txBody>
-        </p:sp>
-        <p:sp>
-          <p:nvSpPr>
-            <p:cNvPr id="11" name="Rectangle 10">
-              <a:extLst>
-                <a:ext uri="{FF2B5EF4-FFF2-40B4-BE49-F238E27FC236}">
-                  <a16:creationId xmlns:a16="http://schemas.microsoft.com/office/drawing/2014/main" id="{C5E0B604-11FA-4D85-8C27-1B6B6D7746A0}"/>
-                </a:ext>
-              </a:extLst>
-            </p:cNvPr>
-            <p:cNvSpPr/>
-            <p:nvPr/>
-          </p:nvSpPr>
-          <p:spPr>
-            <a:xfrm>
-              <a:off x="6610278" y="2761264"/>
-              <a:ext cx="1494503" cy="234880"/>
-            </a:xfrm>
-            <a:prstGeom prst="rect">
-              <a:avLst/>
-            </a:prstGeom>
-            <a:solidFill>
-              <a:srgbClr val="00B050"/>
-            </a:solidFill>
-          </p:spPr>
-          <p:style>
-            <a:lnRef idx="2">
-              <a:schemeClr val="accent1">
-                <a:shade val="50000"/>
-              </a:schemeClr>
-            </a:lnRef>
-            <a:fillRef idx="1">
-              <a:schemeClr val="accent1"/>
-            </a:fillRef>
-            <a:effectRef idx="0">
-              <a:schemeClr val="accent1"/>
-            </a:effectRef>
-            <a:fontRef idx="minor">
-              <a:schemeClr val="lt1"/>
-            </a:fontRef>
-          </p:style>
-          <p:txBody>
-            <a:bodyPr rtlCol="0" anchor="ctr"/>
-            <a:lstStyle/>
-            <a:p>
-              <a:pPr algn="ctr"/>
-              <a:r>
-                <a:rPr lang="en-US" sz="1600" dirty="0"/>
-                <a:t>Main Deparser</a:t>
-              </a:r>
-            </a:p>
-          </p:txBody>
-        </p:sp>
-        <p:sp>
-          <p:nvSpPr>
-            <p:cNvPr id="12" name="TextBox 11">
-              <a:extLst>
-                <a:ext uri="{FF2B5EF4-FFF2-40B4-BE49-F238E27FC236}">
-                  <a16:creationId xmlns:a16="http://schemas.microsoft.com/office/drawing/2014/main" id="{A57A30FC-8EBC-4414-9C3F-8F53C01E89DB}"/>
-                </a:ext>
-              </a:extLst>
-            </p:cNvPr>
-            <p:cNvSpPr txBox="1"/>
-            <p:nvPr/>
-          </p:nvSpPr>
-          <p:spPr>
-            <a:xfrm>
-              <a:off x="7389221" y="1695985"/>
-              <a:ext cx="811441" cy="253916"/>
-            </a:xfrm>
-            <a:prstGeom prst="rect">
-              <a:avLst/>
-            </a:prstGeom>
-            <a:noFill/>
-          </p:spPr>
-          <p:txBody>
-            <a:bodyPr wrap="none" rtlCol="0">
-              <a:spAutoFit/>
-            </a:bodyPr>
-            <a:lstStyle/>
-            <a:p>
-              <a:r>
-                <a:rPr lang="en-US" sz="1050" dirty="0"/>
-                <a:t>FROM_NET</a:t>
-              </a:r>
-            </a:p>
-          </p:txBody>
-        </p:sp>
-        <p:sp>
-          <p:nvSpPr>
-            <p:cNvPr id="13" name="TextBox 12">
-              <a:extLst>
-                <a:ext uri="{FF2B5EF4-FFF2-40B4-BE49-F238E27FC236}">
-                  <a16:creationId xmlns:a16="http://schemas.microsoft.com/office/drawing/2014/main" id="{1CFDA1D5-F37B-4541-B9D2-E055C8630AC5}"/>
-                </a:ext>
-              </a:extLst>
-            </p:cNvPr>
-            <p:cNvSpPr txBox="1"/>
-            <p:nvPr/>
-          </p:nvSpPr>
-          <p:spPr>
-            <a:xfrm>
-              <a:off x="6605815" y="3104066"/>
-              <a:ext cx="625492" cy="253916"/>
-            </a:xfrm>
-            <a:prstGeom prst="rect">
-              <a:avLst/>
-            </a:prstGeom>
-            <a:noFill/>
-          </p:spPr>
-          <p:txBody>
-            <a:bodyPr wrap="none" rtlCol="0">
-              <a:spAutoFit/>
-            </a:bodyPr>
-            <a:lstStyle/>
-            <a:p>
-              <a:r>
-                <a:rPr lang="en-US" sz="1050" dirty="0"/>
-                <a:t>TO_NET</a:t>
-              </a:r>
-            </a:p>
-          </p:txBody>
-        </p:sp>
-        <p:sp>
-          <p:nvSpPr>
-            <p:cNvPr id="14" name="TextBox 13">
-              <a:extLst>
-                <a:ext uri="{FF2B5EF4-FFF2-40B4-BE49-F238E27FC236}">
-                  <a16:creationId xmlns:a16="http://schemas.microsoft.com/office/drawing/2014/main" id="{1334AC9D-6D71-45C5-B180-594CD48DA462}"/>
-                </a:ext>
-              </a:extLst>
-            </p:cNvPr>
-            <p:cNvSpPr txBox="1"/>
-            <p:nvPr/>
-          </p:nvSpPr>
-          <p:spPr>
-            <a:xfrm>
-              <a:off x="6523829" y="1705094"/>
-              <a:ext cx="894797" cy="253916"/>
-            </a:xfrm>
-            <a:prstGeom prst="rect">
-              <a:avLst/>
-            </a:prstGeom>
-            <a:noFill/>
-          </p:spPr>
-          <p:txBody>
-            <a:bodyPr wrap="none" rtlCol="0">
-              <a:spAutoFit/>
-            </a:bodyPr>
-            <a:lstStyle/>
-            <a:p>
-              <a:r>
-                <a:rPr lang="en-US" sz="1050" dirty="0"/>
-                <a:t>FROM_HOST</a:t>
-              </a:r>
-            </a:p>
-          </p:txBody>
-        </p:sp>
-        <p:sp>
-          <p:nvSpPr>
-            <p:cNvPr id="15" name="TextBox 14">
-              <a:extLst>
-                <a:ext uri="{FF2B5EF4-FFF2-40B4-BE49-F238E27FC236}">
-                  <a16:creationId xmlns:a16="http://schemas.microsoft.com/office/drawing/2014/main" id="{962C12F2-DD96-4A51-B663-4E2BD4690C21}"/>
-                </a:ext>
-              </a:extLst>
-            </p:cNvPr>
-            <p:cNvSpPr txBox="1"/>
-            <p:nvPr/>
-          </p:nvSpPr>
-          <p:spPr>
-            <a:xfrm>
-              <a:off x="7411958" y="3097378"/>
-              <a:ext cx="708848" cy="253916"/>
-            </a:xfrm>
-            <a:prstGeom prst="rect">
-              <a:avLst/>
-            </a:prstGeom>
-            <a:noFill/>
-          </p:spPr>
-          <p:txBody>
-            <a:bodyPr wrap="none" rtlCol="0">
-              <a:spAutoFit/>
-            </a:bodyPr>
-            <a:lstStyle/>
-            <a:p>
-              <a:r>
-                <a:rPr lang="en-US" sz="1050" dirty="0"/>
-                <a:t>TO_HOST</a:t>
-              </a:r>
-            </a:p>
-          </p:txBody>
-        </p:sp>
-        <p:cxnSp>
-          <p:nvCxnSpPr>
-            <p:cNvPr id="8" name="Straight Arrow Connector 7">
-              <a:extLst>
-                <a:ext uri="{FF2B5EF4-FFF2-40B4-BE49-F238E27FC236}">
-                  <a16:creationId xmlns:a16="http://schemas.microsoft.com/office/drawing/2014/main" id="{BB801080-B3EB-43D3-BDB6-AD0E67A57AA2}"/>
-                </a:ext>
-              </a:extLst>
-            </p:cNvPr>
-            <p:cNvCxnSpPr>
-              <a:cxnSpLocks/>
-            </p:cNvCxnSpPr>
-            <p:nvPr/>
-          </p:nvCxnSpPr>
-          <p:spPr>
-            <a:xfrm>
-              <a:off x="6926262" y="1914867"/>
-              <a:ext cx="0" cy="145108"/>
-            </a:xfrm>
-            <a:prstGeom prst="straightConnector1">
-              <a:avLst/>
-            </a:prstGeom>
-            <a:ln>
-              <a:tailEnd type="triangle"/>
-            </a:ln>
-          </p:spPr>
-          <p:style>
-            <a:lnRef idx="1">
-              <a:schemeClr val="accent1"/>
-            </a:lnRef>
-            <a:fillRef idx="0">
-              <a:schemeClr val="accent1"/>
-            </a:fillRef>
-            <a:effectRef idx="0">
-              <a:schemeClr val="accent1"/>
-            </a:effectRef>
-            <a:fontRef idx="minor">
-              <a:schemeClr val="tx1"/>
-            </a:fontRef>
-          </p:style>
-        </p:cxnSp>
-        <p:cxnSp>
-          <p:nvCxnSpPr>
-            <p:cNvPr id="18" name="Straight Arrow Connector 17">
-              <a:extLst>
-                <a:ext uri="{FF2B5EF4-FFF2-40B4-BE49-F238E27FC236}">
-                  <a16:creationId xmlns:a16="http://schemas.microsoft.com/office/drawing/2014/main" id="{78AD3BE8-DF3A-4F04-908C-973DFE021940}"/>
-                </a:ext>
-              </a:extLst>
-            </p:cNvPr>
-            <p:cNvCxnSpPr>
-              <a:cxnSpLocks/>
-            </p:cNvCxnSpPr>
-            <p:nvPr/>
-          </p:nvCxnSpPr>
-          <p:spPr>
-            <a:xfrm>
-              <a:off x="7799490" y="2291559"/>
-              <a:ext cx="0" cy="138113"/>
-            </a:xfrm>
-            <a:prstGeom prst="straightConnector1">
-              <a:avLst/>
-            </a:prstGeom>
-            <a:ln>
-              <a:tailEnd type="triangle"/>
-            </a:ln>
-          </p:spPr>
-          <p:style>
-            <a:lnRef idx="1">
-              <a:schemeClr val="accent1"/>
-            </a:lnRef>
-            <a:fillRef idx="0">
-              <a:schemeClr val="accent1"/>
-            </a:fillRef>
-            <a:effectRef idx="0">
-              <a:schemeClr val="accent1"/>
-            </a:effectRef>
-            <a:fontRef idx="minor">
-              <a:schemeClr val="tx1"/>
-            </a:fontRef>
-          </p:style>
-        </p:cxnSp>
-        <p:cxnSp>
-          <p:nvCxnSpPr>
-            <p:cNvPr id="21" name="Straight Arrow Connector 20">
-              <a:extLst>
-                <a:ext uri="{FF2B5EF4-FFF2-40B4-BE49-F238E27FC236}">
-                  <a16:creationId xmlns:a16="http://schemas.microsoft.com/office/drawing/2014/main" id="{118C6842-6E5E-4C24-B95F-914E14CD1B9C}"/>
-                </a:ext>
-              </a:extLst>
-            </p:cNvPr>
-            <p:cNvCxnSpPr>
-              <a:cxnSpLocks/>
-            </p:cNvCxnSpPr>
-            <p:nvPr/>
-          </p:nvCxnSpPr>
-          <p:spPr>
-            <a:xfrm>
-              <a:off x="7794942" y="2623637"/>
-              <a:ext cx="0" cy="137627"/>
-            </a:xfrm>
-            <a:prstGeom prst="straightConnector1">
-              <a:avLst/>
-            </a:prstGeom>
-            <a:ln>
-              <a:tailEnd type="triangle"/>
-            </a:ln>
-          </p:spPr>
-          <p:style>
-            <a:lnRef idx="1">
-              <a:schemeClr val="accent1"/>
-            </a:lnRef>
-            <a:fillRef idx="0">
-              <a:schemeClr val="accent1"/>
-            </a:fillRef>
-            <a:effectRef idx="0">
-              <a:schemeClr val="accent1"/>
-            </a:effectRef>
-            <a:fontRef idx="minor">
-              <a:schemeClr val="tx1"/>
-            </a:fontRef>
-          </p:style>
-        </p:cxnSp>
-        <p:cxnSp>
-          <p:nvCxnSpPr>
-            <p:cNvPr id="29" name="Straight Arrow Connector 28">
-              <a:extLst>
-                <a:ext uri="{FF2B5EF4-FFF2-40B4-BE49-F238E27FC236}">
-                  <a16:creationId xmlns:a16="http://schemas.microsoft.com/office/drawing/2014/main" id="{6E973354-BD42-4475-A807-8DE90F54F8A4}"/>
-                </a:ext>
-              </a:extLst>
-            </p:cNvPr>
-            <p:cNvCxnSpPr>
-              <a:cxnSpLocks/>
-            </p:cNvCxnSpPr>
-            <p:nvPr/>
-          </p:nvCxnSpPr>
-          <p:spPr>
-            <a:xfrm>
-              <a:off x="7794942" y="1914867"/>
-              <a:ext cx="0" cy="145108"/>
-            </a:xfrm>
-            <a:prstGeom prst="straightConnector1">
-              <a:avLst/>
-            </a:prstGeom>
-            <a:ln>
-              <a:tailEnd type="triangle"/>
-            </a:ln>
-          </p:spPr>
-          <p:style>
-            <a:lnRef idx="1">
-              <a:schemeClr val="accent1"/>
-            </a:lnRef>
-            <a:fillRef idx="0">
-              <a:schemeClr val="accent1"/>
-            </a:fillRef>
-            <a:effectRef idx="0">
-              <a:schemeClr val="accent1"/>
-            </a:effectRef>
-            <a:fontRef idx="minor">
-              <a:schemeClr val="tx1"/>
-            </a:fontRef>
-          </p:style>
-        </p:cxnSp>
-        <p:cxnSp>
-          <p:nvCxnSpPr>
-            <p:cNvPr id="30" name="Straight Arrow Connector 29">
-              <a:extLst>
-                <a:ext uri="{FF2B5EF4-FFF2-40B4-BE49-F238E27FC236}">
-                  <a16:creationId xmlns:a16="http://schemas.microsoft.com/office/drawing/2014/main" id="{D4BD033C-95E1-41B3-B6D8-C9EAC2E4C393}"/>
-                </a:ext>
-              </a:extLst>
-            </p:cNvPr>
-            <p:cNvCxnSpPr>
-              <a:cxnSpLocks/>
-            </p:cNvCxnSpPr>
-            <p:nvPr/>
-          </p:nvCxnSpPr>
-          <p:spPr>
-            <a:xfrm>
-              <a:off x="6926262" y="2996144"/>
-              <a:ext cx="0" cy="145108"/>
-            </a:xfrm>
-            <a:prstGeom prst="straightConnector1">
-              <a:avLst/>
-            </a:prstGeom>
-            <a:ln>
-              <a:tailEnd type="triangle"/>
-            </a:ln>
-          </p:spPr>
-          <p:style>
-            <a:lnRef idx="1">
-              <a:schemeClr val="accent1"/>
-            </a:lnRef>
-            <a:fillRef idx="0">
-              <a:schemeClr val="accent1"/>
-            </a:fillRef>
-            <a:effectRef idx="0">
-              <a:schemeClr val="accent1"/>
-            </a:effectRef>
-            <a:fontRef idx="minor">
-              <a:schemeClr val="tx1"/>
-            </a:fontRef>
-          </p:style>
-        </p:cxnSp>
-        <p:cxnSp>
-          <p:nvCxnSpPr>
-            <p:cNvPr id="31" name="Straight Arrow Connector 30">
-              <a:extLst>
-                <a:ext uri="{FF2B5EF4-FFF2-40B4-BE49-F238E27FC236}">
-                  <a16:creationId xmlns:a16="http://schemas.microsoft.com/office/drawing/2014/main" id="{3B2C21DB-6C35-4435-AF14-F51CB6679761}"/>
-                </a:ext>
-              </a:extLst>
-            </p:cNvPr>
-            <p:cNvCxnSpPr>
-              <a:cxnSpLocks/>
-            </p:cNvCxnSpPr>
-            <p:nvPr/>
-          </p:nvCxnSpPr>
-          <p:spPr>
-            <a:xfrm>
-              <a:off x="7794942" y="2996144"/>
-              <a:ext cx="0" cy="145108"/>
-            </a:xfrm>
-            <a:prstGeom prst="straightConnector1">
-              <a:avLst/>
-            </a:prstGeom>
-            <a:ln>
-              <a:tailEnd type="triangle"/>
-            </a:ln>
-          </p:spPr>
-          <p:style>
-            <a:lnRef idx="1">
-              <a:schemeClr val="accent1"/>
-            </a:lnRef>
-            <a:fillRef idx="0">
-              <a:schemeClr val="accent1"/>
-            </a:fillRef>
-            <a:effectRef idx="0">
-              <a:schemeClr val="accent1"/>
-            </a:effectRef>
-            <a:fontRef idx="minor">
-              <a:schemeClr val="tx1"/>
-            </a:fontRef>
-          </p:style>
-        </p:cxnSp>
-        <p:cxnSp>
-          <p:nvCxnSpPr>
-            <p:cNvPr id="32" name="Straight Arrow Connector 31">
-              <a:extLst>
-                <a:ext uri="{FF2B5EF4-FFF2-40B4-BE49-F238E27FC236}">
-                  <a16:creationId xmlns:a16="http://schemas.microsoft.com/office/drawing/2014/main" id="{92046405-9500-4397-B377-F93955C0070E}"/>
-                </a:ext>
-              </a:extLst>
-            </p:cNvPr>
-            <p:cNvCxnSpPr>
-              <a:cxnSpLocks/>
-            </p:cNvCxnSpPr>
-            <p:nvPr/>
-          </p:nvCxnSpPr>
-          <p:spPr>
-            <a:xfrm>
-              <a:off x="6926262" y="2284564"/>
-              <a:ext cx="0" cy="145108"/>
-            </a:xfrm>
-            <a:prstGeom prst="straightConnector1">
-              <a:avLst/>
-            </a:prstGeom>
-            <a:ln>
-              <a:tailEnd type="triangle"/>
-            </a:ln>
-          </p:spPr>
-          <p:style>
-            <a:lnRef idx="1">
-              <a:schemeClr val="accent1"/>
-            </a:lnRef>
-            <a:fillRef idx="0">
-              <a:schemeClr val="accent1"/>
-            </a:fillRef>
-            <a:effectRef idx="0">
-              <a:schemeClr val="accent1"/>
-            </a:effectRef>
-            <a:fontRef idx="minor">
-              <a:schemeClr val="tx1"/>
-            </a:fontRef>
-          </p:style>
-        </p:cxnSp>
-        <p:cxnSp>
-          <p:nvCxnSpPr>
-            <p:cNvPr id="33" name="Straight Arrow Connector 32">
-              <a:extLst>
-                <a:ext uri="{FF2B5EF4-FFF2-40B4-BE49-F238E27FC236}">
-                  <a16:creationId xmlns:a16="http://schemas.microsoft.com/office/drawing/2014/main" id="{E38A593F-0DEE-408E-8DF2-68583A1E725F}"/>
-                </a:ext>
-              </a:extLst>
-            </p:cNvPr>
-            <p:cNvCxnSpPr>
-              <a:cxnSpLocks/>
-            </p:cNvCxnSpPr>
-            <p:nvPr/>
-          </p:nvCxnSpPr>
-          <p:spPr>
-            <a:xfrm>
-              <a:off x="6926262" y="2623637"/>
-              <a:ext cx="0" cy="145108"/>
-            </a:xfrm>
-            <a:prstGeom prst="straightConnector1">
-              <a:avLst/>
-            </a:prstGeom>
-            <a:ln>
-              <a:tailEnd type="triangle"/>
-            </a:ln>
-          </p:spPr>
-          <p:style>
-            <a:lnRef idx="1">
-              <a:schemeClr val="accent1"/>
-            </a:lnRef>
-            <a:fillRef idx="0">
-              <a:schemeClr val="accent1"/>
-            </a:fillRef>
-            <a:effectRef idx="0">
-              <a:schemeClr val="accent1"/>
-            </a:effectRef>
-            <a:fontRef idx="minor">
-              <a:schemeClr val="tx1"/>
-            </a:fontRef>
-          </p:style>
-        </p:cxnSp>
-      </p:grpSp>
-      <p:sp>
-        <p:nvSpPr>
-          <p:cNvPr id="35" name="Rectangle 34">
-            <a:extLst>
-              <a:ext uri="{FF2B5EF4-FFF2-40B4-BE49-F238E27FC236}">
-                <a16:creationId xmlns:a16="http://schemas.microsoft.com/office/drawing/2014/main" id="{8EB9B0E0-C169-48B3-BCE6-385310287F99}"/>
-              </a:ext>
-            </a:extLst>
-          </p:cNvPr>
-          <p:cNvSpPr/>
-          <p:nvPr/>
-        </p:nvSpPr>
-        <p:spPr>
-          <a:xfrm rot="16200000">
-            <a:off x="2199810" y="2699455"/>
-            <a:ext cx="1715848" cy="1230325"/>
-          </a:xfrm>
-          <a:prstGeom prst="rect">
-            <a:avLst/>
-          </a:prstGeom>
-          <a:solidFill>
-            <a:schemeClr val="accent5">
-              <a:lumMod val="40000"/>
-              <a:lumOff val="60000"/>
-            </a:schemeClr>
-          </a:solidFill>
-        </p:spPr>
-        <p:style>
-          <a:lnRef idx="2">
-            <a:schemeClr val="accent1">
-              <a:shade val="50000"/>
-            </a:schemeClr>
-          </a:lnRef>
-          <a:fillRef idx="1">
-            <a:schemeClr val="accent1"/>
-          </a:fillRef>
-          <a:effectRef idx="0">
-            <a:schemeClr val="accent1"/>
-          </a:effectRef>
-          <a:fontRef idx="minor">
-            <a:schemeClr val="lt1"/>
-          </a:fontRef>
-        </p:style>
-        <p:txBody>
-          <a:bodyPr rtlCol="0" anchor="ctr"/>
-          <a:lstStyle/>
-          <a:p>
-            <a:endParaRPr lang="en-US" dirty="0">
-              <a:solidFill>
-                <a:schemeClr val="tx1"/>
-              </a:solidFill>
-            </a:endParaRPr>
-          </a:p>
-        </p:txBody>
-      </p:sp>
-      <p:sp>
-        <p:nvSpPr>
-          <p:cNvPr id="36" name="Rectangle 35">
-            <a:extLst>
-              <a:ext uri="{FF2B5EF4-FFF2-40B4-BE49-F238E27FC236}">
-                <a16:creationId xmlns:a16="http://schemas.microsoft.com/office/drawing/2014/main" id="{3ED9F1BC-576A-4EF3-9876-126695A64636}"/>
-              </a:ext>
-            </a:extLst>
-          </p:cNvPr>
-          <p:cNvSpPr/>
-          <p:nvPr/>
-        </p:nvSpPr>
-        <p:spPr>
-          <a:xfrm rot="16200000">
-            <a:off x="2065473" y="3213078"/>
-            <a:ext cx="1602958" cy="224589"/>
-          </a:xfrm>
-          <a:prstGeom prst="rect">
-            <a:avLst/>
-          </a:prstGeom>
-          <a:solidFill>
-            <a:srgbClr val="00B050"/>
-          </a:solidFill>
-        </p:spPr>
-        <p:style>
-          <a:lnRef idx="2">
-            <a:schemeClr val="accent1">
-              <a:shade val="50000"/>
-            </a:schemeClr>
-          </a:lnRef>
-          <a:fillRef idx="1">
-            <a:schemeClr val="accent1"/>
-          </a:fillRef>
-          <a:effectRef idx="0">
-            <a:schemeClr val="accent1"/>
-          </a:effectRef>
-          <a:fontRef idx="minor">
-            <a:schemeClr val="lt1"/>
-          </a:fontRef>
-        </p:style>
-        <p:txBody>
-          <a:bodyPr rtlCol="0" anchor="ctr"/>
-          <a:lstStyle/>
-          <a:p>
-            <a:pPr algn="ctr"/>
-            <a:r>
-              <a:rPr lang="en-US" dirty="0"/>
-              <a:t>Pre Parser</a:t>
-            </a:r>
-          </a:p>
-        </p:txBody>
-      </p:sp>
-      <p:sp>
-        <p:nvSpPr>
-          <p:cNvPr id="37" name="Rectangle 36">
-            <a:extLst>
-              <a:ext uri="{FF2B5EF4-FFF2-40B4-BE49-F238E27FC236}">
-                <a16:creationId xmlns:a16="http://schemas.microsoft.com/office/drawing/2014/main" id="{FEF6D1E8-CAD9-4D86-8016-9DF9D3A426B1}"/>
-              </a:ext>
-            </a:extLst>
-          </p:cNvPr>
-          <p:cNvSpPr/>
-          <p:nvPr/>
-        </p:nvSpPr>
-        <p:spPr>
-          <a:xfrm rot="16200000">
-            <a:off x="2416360" y="3224893"/>
-            <a:ext cx="1602958" cy="200959"/>
-          </a:xfrm>
-          <a:prstGeom prst="rect">
-            <a:avLst/>
-          </a:prstGeom>
-          <a:solidFill>
-            <a:srgbClr val="00B050"/>
-          </a:solidFill>
-        </p:spPr>
-        <p:style>
-          <a:lnRef idx="2">
-            <a:schemeClr val="accent1">
-              <a:shade val="50000"/>
-            </a:schemeClr>
-          </a:lnRef>
-          <a:fillRef idx="1">
-            <a:schemeClr val="accent1"/>
-          </a:fillRef>
-          <a:effectRef idx="0">
-            <a:schemeClr val="accent1"/>
-          </a:effectRef>
-          <a:fontRef idx="minor">
-            <a:schemeClr val="lt1"/>
-          </a:fontRef>
-        </p:style>
-        <p:txBody>
-          <a:bodyPr rtlCol="0" anchor="ctr"/>
-          <a:lstStyle/>
-          <a:p>
-            <a:pPr algn="ctr"/>
-            <a:r>
-              <a:rPr lang="en-US" dirty="0"/>
-              <a:t>Pre control</a:t>
-            </a:r>
-          </a:p>
-        </p:txBody>
-      </p:sp>
-      <p:sp>
-        <p:nvSpPr>
-          <p:cNvPr id="40" name="TextBox 39">
-            <a:extLst>
-              <a:ext uri="{FF2B5EF4-FFF2-40B4-BE49-F238E27FC236}">
-                <a16:creationId xmlns:a16="http://schemas.microsoft.com/office/drawing/2014/main" id="{A99932A6-6BD7-4FD1-93C8-8E131159E42A}"/>
-              </a:ext>
-            </a:extLst>
-          </p:cNvPr>
-          <p:cNvSpPr txBox="1"/>
-          <p:nvPr/>
-        </p:nvSpPr>
-        <p:spPr>
-          <a:xfrm rot="16200000">
-            <a:off x="3191516" y="3198415"/>
-            <a:ext cx="708848" cy="253916"/>
-          </a:xfrm>
-          <a:prstGeom prst="rect">
-            <a:avLst/>
-          </a:prstGeom>
-          <a:noFill/>
-        </p:spPr>
-        <p:txBody>
-          <a:bodyPr wrap="none" rtlCol="0">
-            <a:spAutoFit/>
-          </a:bodyPr>
-          <a:lstStyle/>
-          <a:p>
-            <a:r>
-              <a:rPr lang="en-US" sz="1050" dirty="0"/>
-              <a:t>TO_HOST</a:t>
-            </a:r>
-          </a:p>
-        </p:txBody>
-      </p:sp>
-      <p:sp>
-        <p:nvSpPr>
-          <p:cNvPr id="41" name="TextBox 40">
-            <a:extLst>
-              <a:ext uri="{FF2B5EF4-FFF2-40B4-BE49-F238E27FC236}">
-                <a16:creationId xmlns:a16="http://schemas.microsoft.com/office/drawing/2014/main" id="{92344D8E-30F6-4766-B972-809C391435CC}"/>
-              </a:ext>
-            </a:extLst>
-          </p:cNvPr>
-          <p:cNvSpPr txBox="1"/>
-          <p:nvPr/>
-        </p:nvSpPr>
-        <p:spPr>
-          <a:xfrm rot="16200000">
-            <a:off x="2121484" y="3198415"/>
-            <a:ext cx="811441" cy="253916"/>
-          </a:xfrm>
-          <a:prstGeom prst="rect">
-            <a:avLst/>
-          </a:prstGeom>
-          <a:noFill/>
-        </p:spPr>
-        <p:txBody>
-          <a:bodyPr wrap="none" rtlCol="0">
-            <a:spAutoFit/>
-          </a:bodyPr>
-          <a:lstStyle/>
-          <a:p>
-            <a:r>
-              <a:rPr lang="en-US" sz="1050" dirty="0"/>
-              <a:t>FROM_NET</a:t>
-            </a:r>
-          </a:p>
-        </p:txBody>
-      </p:sp>
-      <p:cxnSp>
-        <p:nvCxnSpPr>
-          <p:cNvPr id="43" name="Straight Arrow Connector 42">
-            <a:extLst>
-              <a:ext uri="{FF2B5EF4-FFF2-40B4-BE49-F238E27FC236}">
-                <a16:creationId xmlns:a16="http://schemas.microsoft.com/office/drawing/2014/main" id="{9FEFDBCA-8D42-4559-B5B7-7B17A99615BD}"/>
-              </a:ext>
-            </a:extLst>
-          </p:cNvPr>
-          <p:cNvCxnSpPr>
-            <a:cxnSpLocks/>
-          </p:cNvCxnSpPr>
-          <p:nvPr/>
-        </p:nvCxnSpPr>
-        <p:spPr>
-          <a:xfrm rot="16200000">
-            <a:off x="2682104" y="3252818"/>
-            <a:ext cx="0" cy="145108"/>
-          </a:xfrm>
-          <a:prstGeom prst="straightConnector1">
-            <a:avLst/>
-          </a:prstGeom>
-          <a:ln>
-            <a:tailEnd type="triangle"/>
-          </a:ln>
-        </p:spPr>
-        <p:style>
-          <a:lnRef idx="1">
-            <a:schemeClr val="accent1"/>
-          </a:lnRef>
-          <a:fillRef idx="0">
-            <a:schemeClr val="accent1"/>
-          </a:fillRef>
-          <a:effectRef idx="0">
-            <a:schemeClr val="accent1"/>
-          </a:effectRef>
-          <a:fontRef idx="minor">
-            <a:schemeClr val="tx1"/>
-          </a:fontRef>
-        </p:style>
-      </p:cxnSp>
-      <p:cxnSp>
-        <p:nvCxnSpPr>
-          <p:cNvPr id="49" name="Straight Arrow Connector 48">
-            <a:extLst>
-              <a:ext uri="{FF2B5EF4-FFF2-40B4-BE49-F238E27FC236}">
-                <a16:creationId xmlns:a16="http://schemas.microsoft.com/office/drawing/2014/main" id="{265B6322-C564-4122-876E-0B2152445370}"/>
-              </a:ext>
-            </a:extLst>
-          </p:cNvPr>
-          <p:cNvCxnSpPr>
-            <a:cxnSpLocks/>
-            <a:stCxn id="36" idx="2"/>
-            <a:endCxn id="37" idx="0"/>
-          </p:cNvCxnSpPr>
-          <p:nvPr/>
-        </p:nvCxnSpPr>
-        <p:spPr>
-          <a:xfrm rot="16200000">
-            <a:off x="3048303" y="3256316"/>
-            <a:ext cx="0" cy="138113"/>
-          </a:xfrm>
-          <a:prstGeom prst="straightConnector1">
-            <a:avLst/>
-          </a:prstGeom>
-          <a:ln>
-            <a:tailEnd type="triangle"/>
-          </a:ln>
-        </p:spPr>
-        <p:style>
-          <a:lnRef idx="1">
-            <a:schemeClr val="accent1"/>
-          </a:lnRef>
-          <a:fillRef idx="0">
-            <a:schemeClr val="accent1"/>
-          </a:fillRef>
-          <a:effectRef idx="0">
-            <a:schemeClr val="accent1"/>
-          </a:effectRef>
-          <a:fontRef idx="minor">
-            <a:schemeClr val="tx1"/>
-          </a:fontRef>
-        </p:style>
-      </p:cxnSp>
-      <p:cxnSp>
-        <p:nvCxnSpPr>
-          <p:cNvPr id="50" name="Straight Arrow Connector 49">
-            <a:extLst>
-              <a:ext uri="{FF2B5EF4-FFF2-40B4-BE49-F238E27FC236}">
-                <a16:creationId xmlns:a16="http://schemas.microsoft.com/office/drawing/2014/main" id="{516664ED-D0D4-46ED-91FF-5BDE567A773D}"/>
-              </a:ext>
-            </a:extLst>
-          </p:cNvPr>
-          <p:cNvCxnSpPr>
-            <a:cxnSpLocks/>
-          </p:cNvCxnSpPr>
-          <p:nvPr/>
-        </p:nvCxnSpPr>
-        <p:spPr>
-          <a:xfrm rot="16200000">
-            <a:off x="3390874" y="3252818"/>
-            <a:ext cx="0" cy="145108"/>
-          </a:xfrm>
-          <a:prstGeom prst="straightConnector1">
-            <a:avLst/>
-          </a:prstGeom>
-          <a:ln>
-            <a:tailEnd type="triangle"/>
-          </a:ln>
-        </p:spPr>
-        <p:style>
-          <a:lnRef idx="1">
-            <a:schemeClr val="accent1"/>
-          </a:lnRef>
-          <a:fillRef idx="0">
-            <a:schemeClr val="accent1"/>
-          </a:fillRef>
-          <a:effectRef idx="0">
-            <a:schemeClr val="accent1"/>
-          </a:effectRef>
-          <a:fontRef idx="minor">
-            <a:schemeClr val="tx1"/>
-          </a:fontRef>
-        </p:style>
-      </p:cxnSp>
-      <p:grpSp>
-        <p:nvGrpSpPr>
           <p:cNvPr id="78" name="Group 77">
             <a:extLst>
               <a:ext uri="{FF2B5EF4-FFF2-40B4-BE49-F238E27FC236}">
@@ -4495,7 +3441,7 @@
         </p:nvGrpSpPr>
         <p:grpSpPr>
           <a:xfrm>
-            <a:off x="4083063" y="4598203"/>
+            <a:off x="3725832" y="4598203"/>
             <a:ext cx="1036865" cy="660688"/>
             <a:chOff x="7162255" y="2438057"/>
             <a:chExt cx="1036865" cy="660688"/>
@@ -5144,50 +4090,6 @@
           </p:style>
         </p:cxnSp>
       </p:grpSp>
-      <p:cxnSp>
-        <p:nvCxnSpPr>
-          <p:cNvPr id="80" name="Connector: Elbow 79">
-            <a:extLst>
-              <a:ext uri="{FF2B5EF4-FFF2-40B4-BE49-F238E27FC236}">
-                <a16:creationId xmlns:a16="http://schemas.microsoft.com/office/drawing/2014/main" id="{236BE345-2EA6-45DD-85B2-ACD4C19A91F5}"/>
-              </a:ext>
-            </a:extLst>
-          </p:cNvPr>
-          <p:cNvCxnSpPr>
-            <a:cxnSpLocks/>
-            <a:stCxn id="13" idx="2"/>
-          </p:cNvCxnSpPr>
-          <p:nvPr/>
-        </p:nvCxnSpPr>
-        <p:spPr>
-          <a:xfrm flipH="1">
-            <a:off x="5109450" y="4202678"/>
-            <a:ext cx="2362185" cy="713269"/>
-          </a:xfrm>
-          <a:prstGeom prst="bentConnector3">
-            <a:avLst>
-              <a:gd name="adj1" fmla="val -17543"/>
-            </a:avLst>
-          </a:prstGeom>
-          <a:ln>
-            <a:tailEnd type="triangle"/>
-          </a:ln>
-        </p:spPr>
-        <p:style>
-          <a:lnRef idx="1">
-            <a:schemeClr val="accent1"/>
-          </a:lnRef>
-          <a:fillRef idx="0">
-            <a:schemeClr val="accent1"/>
-          </a:fillRef>
-          <a:effectRef idx="0">
-            <a:schemeClr val="accent1"/>
-          </a:effectRef>
-          <a:fontRef idx="minor">
-            <a:schemeClr val="tx1"/>
-          </a:fontRef>
-        </p:style>
-      </p:cxnSp>
       <p:grpSp>
         <p:nvGrpSpPr>
           <p:cNvPr id="83" name="Group 82">
@@ -5202,7 +4104,7 @@
         </p:nvGrpSpPr>
         <p:grpSpPr>
           <a:xfrm rot="10800000">
-            <a:off x="7756319" y="2996747"/>
+            <a:off x="7316230" y="4597410"/>
             <a:ext cx="1036865" cy="660688"/>
             <a:chOff x="7162255" y="2438057"/>
             <a:chExt cx="1036865" cy="660688"/>
@@ -5851,56 +4753,12 @@
           </p:style>
         </p:cxnSp>
       </p:grpSp>
-      <p:cxnSp>
-        <p:nvCxnSpPr>
-          <p:cNvPr id="100" name="Connector: Elbow 99">
-            <a:extLst>
-              <a:ext uri="{FF2B5EF4-FFF2-40B4-BE49-F238E27FC236}">
-                <a16:creationId xmlns:a16="http://schemas.microsoft.com/office/drawing/2014/main" id="{F4860C18-D645-4EE6-BCDB-79FE3B828918}"/>
-              </a:ext>
-            </a:extLst>
-          </p:cNvPr>
-          <p:cNvCxnSpPr>
-            <a:cxnSpLocks/>
-            <a:stCxn id="15" idx="2"/>
-          </p:cNvCxnSpPr>
-          <p:nvPr/>
-        </p:nvCxnSpPr>
-        <p:spPr>
-          <a:xfrm flipV="1">
-            <a:off x="7464947" y="3345998"/>
-            <a:ext cx="323076" cy="8859"/>
-          </a:xfrm>
-          <a:prstGeom prst="bentConnector3">
-            <a:avLst>
-              <a:gd name="adj1" fmla="val 50000"/>
-            </a:avLst>
-          </a:prstGeom>
-          <a:ln>
-            <a:tailEnd type="triangle"/>
-          </a:ln>
-        </p:spPr>
-        <p:style>
-          <a:lnRef idx="1">
-            <a:schemeClr val="accent1"/>
-          </a:lnRef>
-          <a:fillRef idx="0">
-            <a:schemeClr val="accent1"/>
-          </a:fillRef>
-          <a:effectRef idx="0">
-            <a:schemeClr val="accent1"/>
-          </a:effectRef>
-          <a:fontRef idx="minor">
-            <a:schemeClr val="tx1"/>
-          </a:fontRef>
-        </p:style>
-      </p:cxnSp>
       <p:sp>
         <p:nvSpPr>
-          <p:cNvPr id="120" name="Rectangle 119">
-            <a:extLst>
-              <a:ext uri="{FF2B5EF4-FFF2-40B4-BE49-F238E27FC236}">
-                <a16:creationId xmlns:a16="http://schemas.microsoft.com/office/drawing/2014/main" id="{27878CF7-E469-4A06-9E5C-918E6DCCBE40}"/>
+          <p:cNvPr id="121" name="Rectangle 120">
+            <a:extLst>
+              <a:ext uri="{FF2B5EF4-FFF2-40B4-BE49-F238E27FC236}">
+                <a16:creationId xmlns:a16="http://schemas.microsoft.com/office/drawing/2014/main" id="{C5B57169-1275-4E2F-A03B-8F7108AA0A55}"/>
               </a:ext>
             </a:extLst>
           </p:cNvPr>
@@ -5909,66 +4767,7 @@
         </p:nvSpPr>
         <p:spPr>
           <a:xfrm>
-            <a:off x="4008164" y="3028079"/>
-            <a:ext cx="1406025" cy="596438"/>
-          </a:xfrm>
-          <a:prstGeom prst="rect">
-            <a:avLst/>
-          </a:prstGeom>
-          <a:solidFill>
-            <a:schemeClr val="accent4">
-              <a:lumMod val="40000"/>
-              <a:lumOff val="60000"/>
-            </a:schemeClr>
-          </a:solidFill>
-        </p:spPr>
-        <p:style>
-          <a:lnRef idx="2">
-            <a:schemeClr val="accent1">
-              <a:shade val="50000"/>
-            </a:schemeClr>
-          </a:lnRef>
-          <a:fillRef idx="1">
-            <a:schemeClr val="accent1"/>
-          </a:fillRef>
-          <a:effectRef idx="0">
-            <a:schemeClr val="accent1"/>
-          </a:effectRef>
-          <a:fontRef idx="minor">
-            <a:schemeClr val="lt1"/>
-          </a:fontRef>
-        </p:style>
-        <p:txBody>
-          <a:bodyPr rtlCol="0" anchor="ctr"/>
-          <a:lstStyle/>
-          <a:p>
-            <a:pPr algn="ctr"/>
-            <a:r>
-              <a:rPr lang="en-US" dirty="0">
-                <a:solidFill>
-                  <a:schemeClr val="tx1"/>
-                </a:solidFill>
-              </a:rPr>
-              <a:t>Net-to-host inline extern</a:t>
-            </a:r>
-          </a:p>
-        </p:txBody>
-      </p:sp>
-      <p:sp>
-        <p:nvSpPr>
-          <p:cNvPr id="121" name="Rectangle 120">
-            <a:extLst>
-              <a:ext uri="{FF2B5EF4-FFF2-40B4-BE49-F238E27FC236}">
-                <a16:creationId xmlns:a16="http://schemas.microsoft.com/office/drawing/2014/main" id="{C5B57169-1275-4E2F-A03B-8F7108AA0A55}"/>
-              </a:ext>
-            </a:extLst>
-          </p:cNvPr>
-          <p:cNvSpPr/>
-          <p:nvPr/>
-        </p:nvSpPr>
-        <p:spPr>
-          <a:xfrm>
-            <a:off x="2335252" y="4589811"/>
+            <a:off x="2218614" y="4589811"/>
             <a:ext cx="1350435" cy="681362"/>
           </a:xfrm>
           <a:prstGeom prst="rect">
@@ -6015,114 +4814,23 @@
       </p:sp>
       <p:cxnSp>
         <p:nvCxnSpPr>
-          <p:cNvPr id="123" name="Connector: Elbow 122">
-            <a:extLst>
-              <a:ext uri="{FF2B5EF4-FFF2-40B4-BE49-F238E27FC236}">
-                <a16:creationId xmlns:a16="http://schemas.microsoft.com/office/drawing/2014/main" id="{64C4D15B-D90A-42A1-857E-79AACC8E1ED6}"/>
+          <p:cNvPr id="134" name="Connector: Elbow 133">
+            <a:extLst>
+              <a:ext uri="{FF2B5EF4-FFF2-40B4-BE49-F238E27FC236}">
+                <a16:creationId xmlns:a16="http://schemas.microsoft.com/office/drawing/2014/main" id="{6C8D7A4A-4E00-4E2B-A752-9407B9B8DC70}"/>
               </a:ext>
             </a:extLst>
           </p:cNvPr>
           <p:cNvCxnSpPr>
             <a:cxnSpLocks/>
-            <a:stCxn id="120" idx="3"/>
-            <a:endCxn id="12" idx="0"/>
-          </p:cNvCxnSpPr>
-          <p:nvPr/>
-        </p:nvCxnSpPr>
-        <p:spPr>
-          <a:xfrm>
-            <a:off x="5414189" y="3326298"/>
-            <a:ext cx="395450" cy="12700"/>
-          </a:xfrm>
-          <a:prstGeom prst="bentConnector3">
-            <a:avLst>
-              <a:gd name="adj1" fmla="val 50000"/>
-            </a:avLst>
-          </a:prstGeom>
-          <a:ln>
-            <a:tailEnd type="triangle"/>
-          </a:ln>
-        </p:spPr>
-        <p:style>
-          <a:lnRef idx="1">
-            <a:schemeClr val="accent1"/>
-          </a:lnRef>
-          <a:fillRef idx="0">
-            <a:schemeClr val="accent1"/>
-          </a:fillRef>
-          <a:effectRef idx="0">
-            <a:schemeClr val="accent1"/>
-          </a:effectRef>
-          <a:fontRef idx="minor">
-            <a:schemeClr val="tx1"/>
-          </a:fontRef>
-        </p:style>
-      </p:cxnSp>
-      <p:cxnSp>
-        <p:nvCxnSpPr>
-          <p:cNvPr id="127" name="Connector: Elbow 126">
-            <a:extLst>
-              <a:ext uri="{FF2B5EF4-FFF2-40B4-BE49-F238E27FC236}">
-                <a16:creationId xmlns:a16="http://schemas.microsoft.com/office/drawing/2014/main" id="{06F7C2A5-01AD-4181-B101-3CF0F11BE2B8}"/>
-              </a:ext>
-            </a:extLst>
-          </p:cNvPr>
-          <p:cNvCxnSpPr>
-            <a:cxnSpLocks/>
-            <a:stCxn id="40" idx="2"/>
-            <a:endCxn id="120" idx="1"/>
-          </p:cNvCxnSpPr>
-          <p:nvPr/>
-        </p:nvCxnSpPr>
-        <p:spPr>
-          <a:xfrm>
-            <a:off x="3672898" y="3325373"/>
-            <a:ext cx="335266" cy="925"/>
-          </a:xfrm>
-          <a:prstGeom prst="bentConnector3">
-            <a:avLst>
-              <a:gd name="adj1" fmla="val 50000"/>
-            </a:avLst>
-          </a:prstGeom>
-          <a:ln>
-            <a:tailEnd type="triangle"/>
-          </a:ln>
-        </p:spPr>
-        <p:style>
-          <a:lnRef idx="1">
-            <a:schemeClr val="accent1"/>
-          </a:lnRef>
-          <a:fillRef idx="0">
-            <a:schemeClr val="accent1"/>
-          </a:fillRef>
-          <a:effectRef idx="0">
-            <a:schemeClr val="accent1"/>
-          </a:effectRef>
-          <a:fontRef idx="minor">
-            <a:schemeClr val="tx1"/>
-          </a:fontRef>
-        </p:style>
-      </p:cxnSp>
-      <p:cxnSp>
-        <p:nvCxnSpPr>
-          <p:cNvPr id="134" name="Connector: Elbow 133">
-            <a:extLst>
-              <a:ext uri="{FF2B5EF4-FFF2-40B4-BE49-F238E27FC236}">
-                <a16:creationId xmlns:a16="http://schemas.microsoft.com/office/drawing/2014/main" id="{6C8D7A4A-4E00-4E2B-A752-9407B9B8DC70}"/>
-              </a:ext>
-            </a:extLst>
-          </p:cNvPr>
-          <p:cNvCxnSpPr>
-            <a:cxnSpLocks/>
-            <a:stCxn id="72" idx="0"/>
             <a:endCxn id="121" idx="3"/>
           </p:cNvCxnSpPr>
           <p:nvPr/>
         </p:nvCxnSpPr>
         <p:spPr>
           <a:xfrm rot="10800000" flipV="1">
-            <a:off x="3685687" y="4926642"/>
-            <a:ext cx="397376" cy="3849"/>
+            <a:off x="3569049" y="4930490"/>
+            <a:ext cx="150404" cy="1"/>
           </a:xfrm>
           <a:prstGeom prst="bentConnector3">
             <a:avLst/>
@@ -6442,7 +5150,7 @@
         <p:spPr>
           <a:xfrm flipH="1" flipV="1">
             <a:off x="2052479" y="4925851"/>
-            <a:ext cx="282773" cy="4641"/>
+            <a:ext cx="166135" cy="4641"/>
           </a:xfrm>
           <a:prstGeom prst="straightConnector1">
             <a:avLst/>
@@ -6536,19 +5244,20 @@
           </p:cNvPr>
           <p:cNvCxnSpPr>
             <a:cxnSpLocks/>
-            <a:stCxn id="110" idx="0"/>
-            <a:endCxn id="14" idx="0"/>
+            <a:stCxn id="111" idx="0"/>
+            <a:endCxn id="12" idx="0"/>
           </p:cNvCxnSpPr>
           <p:nvPr/>
         </p:nvCxnSpPr>
         <p:spPr>
           <a:xfrm rot="10800000">
-            <a:off x="5818749" y="4150013"/>
-            <a:ext cx="3153055" cy="793647"/>
+            <a:off x="6556592" y="2610581"/>
+            <a:ext cx="1975122" cy="721846"/>
           </a:xfrm>
-          <a:prstGeom prst="bentConnector3">
+          <a:prstGeom prst="bentConnector4">
             <a:avLst>
-              <a:gd name="adj1" fmla="val 112217"/>
+              <a:gd name="adj1" fmla="val 33251"/>
+              <a:gd name="adj2" fmla="val 131669"/>
             </a:avLst>
           </a:prstGeom>
           <a:ln>
@@ -6587,7 +5296,7 @@
         </p:nvCxnSpPr>
         <p:spPr>
           <a:xfrm>
-            <a:off x="10101319" y="3502272"/>
+            <a:off x="9661230" y="3502272"/>
             <a:ext cx="311852" cy="0"/>
           </a:xfrm>
           <a:prstGeom prst="straightConnector1">
@@ -6627,7 +5336,7 @@
         </p:nvSpPr>
         <p:spPr>
           <a:xfrm rot="16200000">
-            <a:off x="10086062" y="3318158"/>
+            <a:off x="9645973" y="3318158"/>
             <a:ext cx="1022445" cy="368228"/>
           </a:xfrm>
           <a:prstGeom prst="rect">
@@ -6685,7 +5394,7 @@
         </p:nvSpPr>
         <p:spPr>
           <a:xfrm>
-            <a:off x="8692145" y="2113631"/>
+            <a:off x="8252056" y="2181696"/>
             <a:ext cx="2089254" cy="224589"/>
           </a:xfrm>
           <a:prstGeom prst="rect">
@@ -6737,7 +5446,7 @@
         </p:nvSpPr>
         <p:spPr>
           <a:xfrm>
-            <a:off x="8692145" y="2348203"/>
+            <a:off x="8252056" y="2416268"/>
             <a:ext cx="2089254" cy="240643"/>
           </a:xfrm>
           <a:prstGeom prst="rect">
@@ -6782,48 +5491,6 @@
           </a:p>
         </p:txBody>
       </p:sp>
-      <p:cxnSp>
-        <p:nvCxnSpPr>
-          <p:cNvPr id="17" name="Straight Arrow Connector 16">
-            <a:extLst>
-              <a:ext uri="{FF2B5EF4-FFF2-40B4-BE49-F238E27FC236}">
-                <a16:creationId xmlns:a16="http://schemas.microsoft.com/office/drawing/2014/main" id="{415C7822-4030-42AD-AB86-5852B4DD265D}"/>
-              </a:ext>
-            </a:extLst>
-          </p:cNvPr>
-          <p:cNvCxnSpPr>
-            <a:stCxn id="138" idx="0"/>
-            <a:endCxn id="41" idx="0"/>
-          </p:cNvCxnSpPr>
-          <p:nvPr/>
-        </p:nvCxnSpPr>
-        <p:spPr>
-          <a:xfrm>
-            <a:off x="2052479" y="3314619"/>
-            <a:ext cx="347768" cy="10754"/>
-          </a:xfrm>
-          <a:prstGeom prst="straightConnector1">
-            <a:avLst/>
-          </a:prstGeom>
-          <a:ln>
-            <a:tailEnd type="triangle"/>
-          </a:ln>
-        </p:spPr>
-        <p:style>
-          <a:lnRef idx="1">
-            <a:schemeClr val="accent1"/>
-          </a:lnRef>
-          <a:fillRef idx="0">
-            <a:schemeClr val="accent1"/>
-          </a:fillRef>
-          <a:effectRef idx="0">
-            <a:schemeClr val="accent1"/>
-          </a:effectRef>
-          <a:fontRef idx="minor">
-            <a:schemeClr val="tx1"/>
-          </a:fontRef>
-        </p:style>
-      </p:cxnSp>
       <p:sp>
         <p:nvSpPr>
           <p:cNvPr id="110" name="Isosceles Triangle 109">
@@ -6838,7 +5505,7 @@
         </p:nvSpPr>
         <p:spPr>
           <a:xfrm rot="16200000">
-            <a:off x="8757559" y="4829463"/>
+            <a:off x="8317470" y="4829463"/>
             <a:ext cx="656879" cy="228392"/>
           </a:xfrm>
           <a:prstGeom prst="triangle">
@@ -6892,7 +5559,7 @@
         </p:nvSpPr>
         <p:spPr>
           <a:xfrm rot="16200000">
-            <a:off x="8757559" y="3218231"/>
+            <a:off x="8317470" y="3218231"/>
             <a:ext cx="656879" cy="228392"/>
           </a:xfrm>
           <a:prstGeom prst="triangle">
@@ -6932,223 +5599,12 @@
           </a:p>
         </p:txBody>
       </p:sp>
-      <p:cxnSp>
-        <p:nvCxnSpPr>
-          <p:cNvPr id="112" name="Connector: Elbow 111">
-            <a:extLst>
-              <a:ext uri="{FF2B5EF4-FFF2-40B4-BE49-F238E27FC236}">
-                <a16:creationId xmlns:a16="http://schemas.microsoft.com/office/drawing/2014/main" id="{C64DEB71-3093-431E-88AF-4C2BE81668EF}"/>
-              </a:ext>
-            </a:extLst>
-          </p:cNvPr>
-          <p:cNvCxnSpPr>
-            <a:cxnSpLocks/>
-          </p:cNvCxnSpPr>
-          <p:nvPr/>
-        </p:nvCxnSpPr>
-        <p:spPr>
-          <a:xfrm rot="5400000" flipV="1">
-            <a:off x="8993077" y="3726372"/>
-            <a:ext cx="715787" cy="301552"/>
-          </a:xfrm>
-          <a:prstGeom prst="bentConnector3">
-            <a:avLst>
-              <a:gd name="adj1" fmla="val -3572"/>
-            </a:avLst>
-          </a:prstGeom>
-          <a:ln>
-            <a:tailEnd type="none"/>
-          </a:ln>
-        </p:spPr>
-        <p:style>
-          <a:lnRef idx="1">
-            <a:schemeClr val="accent1"/>
-          </a:lnRef>
-          <a:fillRef idx="0">
-            <a:schemeClr val="accent1"/>
-          </a:fillRef>
-          <a:effectRef idx="0">
-            <a:schemeClr val="accent1"/>
-          </a:effectRef>
-          <a:fontRef idx="minor">
-            <a:schemeClr val="tx1"/>
-          </a:fontRef>
-        </p:style>
-      </p:cxnSp>
-      <p:cxnSp>
-        <p:nvCxnSpPr>
-          <p:cNvPr id="115" name="Connector: Elbow 114">
-            <a:extLst>
-              <a:ext uri="{FF2B5EF4-FFF2-40B4-BE49-F238E27FC236}">
-                <a16:creationId xmlns:a16="http://schemas.microsoft.com/office/drawing/2014/main" id="{368C70F1-7509-412A-8F1A-A518E73EEB07}"/>
-              </a:ext>
-            </a:extLst>
-          </p:cNvPr>
-          <p:cNvCxnSpPr>
-            <a:cxnSpLocks/>
-          </p:cNvCxnSpPr>
-          <p:nvPr/>
-        </p:nvCxnSpPr>
-        <p:spPr>
-          <a:xfrm rot="16200000" flipH="1" flipV="1">
-            <a:off x="9072285" y="4344340"/>
-            <a:ext cx="554346" cy="298527"/>
-          </a:xfrm>
-          <a:prstGeom prst="bentConnector3">
-            <a:avLst>
-              <a:gd name="adj1" fmla="val 99663"/>
-            </a:avLst>
-          </a:prstGeom>
-          <a:ln>
-            <a:tailEnd type="triangle"/>
-          </a:ln>
-        </p:spPr>
-        <p:style>
-          <a:lnRef idx="1">
-            <a:schemeClr val="accent1"/>
-          </a:lnRef>
-          <a:fillRef idx="0">
-            <a:schemeClr val="accent1"/>
-          </a:fillRef>
-          <a:effectRef idx="0">
-            <a:schemeClr val="accent1"/>
-          </a:effectRef>
-          <a:fontRef idx="minor">
-            <a:schemeClr val="tx1"/>
-          </a:fontRef>
-        </p:style>
-      </p:cxnSp>
-      <p:cxnSp>
-        <p:nvCxnSpPr>
-          <p:cNvPr id="116" name="Straight Arrow Connector 115">
-            <a:extLst>
-              <a:ext uri="{FF2B5EF4-FFF2-40B4-BE49-F238E27FC236}">
-                <a16:creationId xmlns:a16="http://schemas.microsoft.com/office/drawing/2014/main" id="{D6EAE7FF-ED18-4376-A74D-07B093B5896D}"/>
-              </a:ext>
-            </a:extLst>
-          </p:cNvPr>
-          <p:cNvCxnSpPr>
-            <a:cxnSpLocks/>
-          </p:cNvCxnSpPr>
-          <p:nvPr/>
-        </p:nvCxnSpPr>
-        <p:spPr>
-          <a:xfrm rot="10800000">
-            <a:off x="9204576" y="5095376"/>
-            <a:ext cx="494377" cy="1"/>
-          </a:xfrm>
-          <a:prstGeom prst="straightConnector1">
-            <a:avLst/>
-          </a:prstGeom>
-          <a:ln>
-            <a:tailEnd type="triangle"/>
-          </a:ln>
-        </p:spPr>
-        <p:style>
-          <a:lnRef idx="1">
-            <a:schemeClr val="accent1"/>
-          </a:lnRef>
-          <a:fillRef idx="0">
-            <a:schemeClr val="accent1"/>
-          </a:fillRef>
-          <a:effectRef idx="0">
-            <a:schemeClr val="accent1"/>
-          </a:effectRef>
-          <a:fontRef idx="minor">
-            <a:schemeClr val="tx1"/>
-          </a:fontRef>
-        </p:style>
-      </p:cxnSp>
-      <p:cxnSp>
-        <p:nvCxnSpPr>
-          <p:cNvPr id="117" name="Straight Arrow Connector 116">
-            <a:extLst>
-              <a:ext uri="{FF2B5EF4-FFF2-40B4-BE49-F238E27FC236}">
-                <a16:creationId xmlns:a16="http://schemas.microsoft.com/office/drawing/2014/main" id="{2B8B9C9F-8E4C-4C30-AB47-9A5A956DF566}"/>
-              </a:ext>
-            </a:extLst>
-          </p:cNvPr>
-          <p:cNvCxnSpPr>
-            <a:cxnSpLocks/>
-          </p:cNvCxnSpPr>
-          <p:nvPr/>
-        </p:nvCxnSpPr>
-        <p:spPr>
-          <a:xfrm rot="10800000" flipH="1">
-            <a:off x="9204576" y="3180321"/>
-            <a:ext cx="487249" cy="0"/>
-          </a:xfrm>
-          <a:prstGeom prst="straightConnector1">
-            <a:avLst/>
-          </a:prstGeom>
-          <a:ln>
-            <a:tailEnd type="triangle"/>
-          </a:ln>
-        </p:spPr>
-        <p:style>
-          <a:lnRef idx="1">
-            <a:schemeClr val="accent1"/>
-          </a:lnRef>
-          <a:fillRef idx="0">
-            <a:schemeClr val="accent1"/>
-          </a:fillRef>
-          <a:effectRef idx="0">
-            <a:schemeClr val="accent1"/>
-          </a:effectRef>
-          <a:fontRef idx="minor">
-            <a:schemeClr val="tx1"/>
-          </a:fontRef>
-        </p:style>
-      </p:cxnSp>
-      <p:cxnSp>
-        <p:nvCxnSpPr>
-          <p:cNvPr id="118" name="Straight Arrow Connector 117">
-            <a:extLst>
-              <a:ext uri="{FF2B5EF4-FFF2-40B4-BE49-F238E27FC236}">
-                <a16:creationId xmlns:a16="http://schemas.microsoft.com/office/drawing/2014/main" id="{40462665-FCF8-4E8C-943A-0EF224BA3563}"/>
-              </a:ext>
-            </a:extLst>
-          </p:cNvPr>
-          <p:cNvCxnSpPr>
-            <a:cxnSpLocks/>
-            <a:stCxn id="86" idx="0"/>
-            <a:endCxn id="111" idx="0"/>
-          </p:cNvCxnSpPr>
-          <p:nvPr/>
-        </p:nvCxnSpPr>
-        <p:spPr>
-          <a:xfrm>
-            <a:off x="8793185" y="3328996"/>
-            <a:ext cx="178618" cy="3431"/>
-          </a:xfrm>
-          <a:prstGeom prst="straightConnector1">
-            <a:avLst/>
-          </a:prstGeom>
-          <a:ln>
-            <a:tailEnd type="triangle"/>
-          </a:ln>
-        </p:spPr>
-        <p:style>
-          <a:lnRef idx="1">
-            <a:schemeClr val="accent1"/>
-          </a:lnRef>
-          <a:fillRef idx="0">
-            <a:schemeClr val="accent1"/>
-          </a:fillRef>
-          <a:effectRef idx="0">
-            <a:schemeClr val="accent1"/>
-          </a:effectRef>
-          <a:fontRef idx="minor">
-            <a:schemeClr val="tx1"/>
-          </a:fontRef>
-        </p:style>
-      </p:cxnSp>
       <p:grpSp>
         <p:nvGrpSpPr>
-          <p:cNvPr id="163" name="Group 162">
-            <a:extLst>
-              <a:ext uri="{FF2B5EF4-FFF2-40B4-BE49-F238E27FC236}">
-                <a16:creationId xmlns:a16="http://schemas.microsoft.com/office/drawing/2014/main" id="{8608615B-EB0D-4D19-94C6-BA8F0B161E4B}"/>
+          <p:cNvPr id="25" name="Group 24">
+            <a:extLst>
+              <a:ext uri="{FF2B5EF4-FFF2-40B4-BE49-F238E27FC236}">
+                <a16:creationId xmlns:a16="http://schemas.microsoft.com/office/drawing/2014/main" id="{E69DD46B-B87C-437F-BA55-C57AF60D765B}"/>
               </a:ext>
             </a:extLst>
           </p:cNvPr>
@@ -7156,19 +5612,19 @@
           <p:nvPr/>
         </p:nvGrpSpPr>
         <p:grpSpPr>
-          <a:xfrm>
-            <a:off x="5606135" y="2733762"/>
-            <a:ext cx="2092231" cy="410729"/>
-            <a:chOff x="5782914" y="2733762"/>
-            <a:chExt cx="2092231" cy="410729"/>
+          <a:xfrm flipV="1">
+            <a:off x="8760105" y="3519254"/>
+            <a:ext cx="301553" cy="1251523"/>
+            <a:chOff x="9200194" y="3519254"/>
+            <a:chExt cx="301553" cy="1251523"/>
           </a:xfrm>
         </p:grpSpPr>
         <p:cxnSp>
           <p:nvCxnSpPr>
-            <p:cNvPr id="105" name="Connector: Elbow 104">
+            <p:cNvPr id="112" name="Connector: Elbow 111">
               <a:extLst>
                 <a:ext uri="{FF2B5EF4-FFF2-40B4-BE49-F238E27FC236}">
-                  <a16:creationId xmlns:a16="http://schemas.microsoft.com/office/drawing/2014/main" id="{AAD870DC-10F4-46EA-8DD1-22D68B525CA7}"/>
+                  <a16:creationId xmlns:a16="http://schemas.microsoft.com/office/drawing/2014/main" id="{C64DEB71-3093-431E-88AF-4C2BE81668EF}"/>
                 </a:ext>
               </a:extLst>
             </p:cNvPr>
@@ -7178,13 +5634,13 @@
             <p:nvPr/>
           </p:nvCxnSpPr>
           <p:spPr>
-            <a:xfrm rot="5400000" flipH="1" flipV="1">
-              <a:off x="7560841" y="2827921"/>
-              <a:ext cx="408463" cy="220145"/>
+            <a:xfrm rot="5400000" flipV="1">
+              <a:off x="8993077" y="3726372"/>
+              <a:ext cx="715787" cy="301552"/>
             </a:xfrm>
             <a:prstGeom prst="bentConnector3">
               <a:avLst>
-                <a:gd name="adj1" fmla="val -369"/>
+                <a:gd name="adj1" fmla="val -3572"/>
               </a:avLst>
             </a:prstGeom>
             <a:ln>
@@ -7208,24 +5664,1375 @@
         </p:cxnSp>
         <p:cxnSp>
           <p:nvCxnSpPr>
-            <p:cNvPr id="126" name="Connector: Elbow 125">
+            <p:cNvPr id="115" name="Connector: Elbow 114">
               <a:extLst>
                 <a:ext uri="{FF2B5EF4-FFF2-40B4-BE49-F238E27FC236}">
-                  <a16:creationId xmlns:a16="http://schemas.microsoft.com/office/drawing/2014/main" id="{6D1D99B2-0E86-47B6-9123-9267435A5C00}"/>
+                  <a16:creationId xmlns:a16="http://schemas.microsoft.com/office/drawing/2014/main" id="{368C70F1-7509-412A-8F1A-A518E73EEB07}"/>
                 </a:ext>
               </a:extLst>
             </p:cNvPr>
-            <p:cNvCxnSpPr/>
+            <p:cNvCxnSpPr>
+              <a:cxnSpLocks/>
+            </p:cNvCxnSpPr>
             <p:nvPr/>
           </p:nvCxnSpPr>
           <p:spPr>
-            <a:xfrm rot="16200000" flipH="1">
-              <a:off x="5682254" y="2836324"/>
-              <a:ext cx="408827" cy="207508"/>
+            <a:xfrm rot="16200000" flipH="1" flipV="1">
+              <a:off x="9072285" y="4344340"/>
+              <a:ext cx="554346" cy="298527"/>
             </a:xfrm>
             <a:prstGeom prst="bentConnector3">
               <a:avLst>
-                <a:gd name="adj1" fmla="val 100325"/>
+                <a:gd name="adj1" fmla="val 99663"/>
+              </a:avLst>
+            </a:prstGeom>
+            <a:ln>
+              <a:tailEnd type="triangle"/>
+            </a:ln>
+          </p:spPr>
+          <p:style>
+            <a:lnRef idx="1">
+              <a:schemeClr val="accent1"/>
+            </a:lnRef>
+            <a:fillRef idx="0">
+              <a:schemeClr val="accent1"/>
+            </a:fillRef>
+            <a:effectRef idx="0">
+              <a:schemeClr val="accent1"/>
+            </a:effectRef>
+            <a:fontRef idx="minor">
+              <a:schemeClr val="tx1"/>
+            </a:fontRef>
+          </p:style>
+        </p:cxnSp>
+      </p:grpSp>
+      <p:cxnSp>
+        <p:nvCxnSpPr>
+          <p:cNvPr id="116" name="Straight Arrow Connector 115">
+            <a:extLst>
+              <a:ext uri="{FF2B5EF4-FFF2-40B4-BE49-F238E27FC236}">
+                <a16:creationId xmlns:a16="http://schemas.microsoft.com/office/drawing/2014/main" id="{D6EAE7FF-ED18-4376-A74D-07B093B5896D}"/>
+              </a:ext>
+            </a:extLst>
+          </p:cNvPr>
+          <p:cNvCxnSpPr>
+            <a:cxnSpLocks/>
+          </p:cNvCxnSpPr>
+          <p:nvPr/>
+        </p:nvCxnSpPr>
+        <p:spPr>
+          <a:xfrm rot="10800000" flipH="1">
+            <a:off x="8764487" y="5095376"/>
+            <a:ext cx="494377" cy="1"/>
+          </a:xfrm>
+          <a:prstGeom prst="straightConnector1">
+            <a:avLst/>
+          </a:prstGeom>
+          <a:ln>
+            <a:tailEnd type="triangle"/>
+          </a:ln>
+        </p:spPr>
+        <p:style>
+          <a:lnRef idx="1">
+            <a:schemeClr val="accent1"/>
+          </a:lnRef>
+          <a:fillRef idx="0">
+            <a:schemeClr val="accent1"/>
+          </a:fillRef>
+          <a:effectRef idx="0">
+            <a:schemeClr val="accent1"/>
+          </a:effectRef>
+          <a:fontRef idx="minor">
+            <a:schemeClr val="tx1"/>
+          </a:fontRef>
+        </p:style>
+      </p:cxnSp>
+      <p:cxnSp>
+        <p:nvCxnSpPr>
+          <p:cNvPr id="117" name="Straight Arrow Connector 116">
+            <a:extLst>
+              <a:ext uri="{FF2B5EF4-FFF2-40B4-BE49-F238E27FC236}">
+                <a16:creationId xmlns:a16="http://schemas.microsoft.com/office/drawing/2014/main" id="{2B8B9C9F-8E4C-4C30-AB47-9A5A956DF566}"/>
+              </a:ext>
+            </a:extLst>
+          </p:cNvPr>
+          <p:cNvCxnSpPr>
+            <a:cxnSpLocks/>
+          </p:cNvCxnSpPr>
+          <p:nvPr/>
+        </p:nvCxnSpPr>
+        <p:spPr>
+          <a:xfrm rot="10800000">
+            <a:off x="8764487" y="3180321"/>
+            <a:ext cx="487249" cy="0"/>
+          </a:xfrm>
+          <a:prstGeom prst="straightConnector1">
+            <a:avLst/>
+          </a:prstGeom>
+          <a:ln>
+            <a:tailEnd type="triangle"/>
+          </a:ln>
+        </p:spPr>
+        <p:style>
+          <a:lnRef idx="1">
+            <a:schemeClr val="accent1"/>
+          </a:lnRef>
+          <a:fillRef idx="0">
+            <a:schemeClr val="accent1"/>
+          </a:fillRef>
+          <a:effectRef idx="0">
+            <a:schemeClr val="accent1"/>
+          </a:effectRef>
+          <a:fontRef idx="minor">
+            <a:schemeClr val="tx1"/>
+          </a:fontRef>
+        </p:style>
+      </p:cxnSp>
+      <p:cxnSp>
+        <p:nvCxnSpPr>
+          <p:cNvPr id="118" name="Straight Arrow Connector 117">
+            <a:extLst>
+              <a:ext uri="{FF2B5EF4-FFF2-40B4-BE49-F238E27FC236}">
+                <a16:creationId xmlns:a16="http://schemas.microsoft.com/office/drawing/2014/main" id="{40462665-FCF8-4E8C-943A-0EF224BA3563}"/>
+              </a:ext>
+            </a:extLst>
+          </p:cNvPr>
+          <p:cNvCxnSpPr>
+            <a:cxnSpLocks/>
+            <a:stCxn id="86" idx="0"/>
+          </p:cNvCxnSpPr>
+          <p:nvPr/>
+        </p:nvCxnSpPr>
+        <p:spPr>
+          <a:xfrm>
+            <a:off x="8353096" y="4929659"/>
+            <a:ext cx="178618" cy="3431"/>
+          </a:xfrm>
+          <a:prstGeom prst="straightConnector1">
+            <a:avLst/>
+          </a:prstGeom>
+          <a:ln>
+            <a:tailEnd type="triangle"/>
+          </a:ln>
+        </p:spPr>
+        <p:style>
+          <a:lnRef idx="1">
+            <a:schemeClr val="accent1"/>
+          </a:lnRef>
+          <a:fillRef idx="0">
+            <a:schemeClr val="accent1"/>
+          </a:fillRef>
+          <a:effectRef idx="0">
+            <a:schemeClr val="accent1"/>
+          </a:effectRef>
+          <a:fontRef idx="minor">
+            <a:schemeClr val="tx1"/>
+          </a:fontRef>
+        </p:style>
+      </p:cxnSp>
+      <p:cxnSp>
+        <p:nvCxnSpPr>
+          <p:cNvPr id="106" name="Connector: Elbow 105">
+            <a:extLst>
+              <a:ext uri="{FF2B5EF4-FFF2-40B4-BE49-F238E27FC236}">
+                <a16:creationId xmlns:a16="http://schemas.microsoft.com/office/drawing/2014/main" id="{16B1E8FE-E0AE-4FF6-AC2B-2BC0EAF5B4C8}"/>
+              </a:ext>
+            </a:extLst>
+          </p:cNvPr>
+          <p:cNvCxnSpPr>
+            <a:cxnSpLocks/>
+            <a:stCxn id="138" idx="0"/>
+            <a:endCxn id="14" idx="0"/>
+          </p:cNvCxnSpPr>
+          <p:nvPr/>
+        </p:nvCxnSpPr>
+        <p:spPr>
+          <a:xfrm flipV="1">
+            <a:off x="2052479" y="2619690"/>
+            <a:ext cx="3641244" cy="694929"/>
+          </a:xfrm>
+          <a:prstGeom prst="bentConnector4">
+            <a:avLst>
+              <a:gd name="adj1" fmla="val 41487"/>
+              <a:gd name="adj2" fmla="val 132895"/>
+            </a:avLst>
+          </a:prstGeom>
+          <a:ln>
+            <a:tailEnd type="triangle"/>
+          </a:ln>
+        </p:spPr>
+        <p:style>
+          <a:lnRef idx="1">
+            <a:schemeClr val="accent1"/>
+          </a:lnRef>
+          <a:fillRef idx="0">
+            <a:schemeClr val="accent1"/>
+          </a:fillRef>
+          <a:effectRef idx="0">
+            <a:schemeClr val="accent1"/>
+          </a:effectRef>
+          <a:fontRef idx="minor">
+            <a:schemeClr val="tx1"/>
+          </a:fontRef>
+        </p:style>
+      </p:cxnSp>
+      <p:sp>
+        <p:nvSpPr>
+          <p:cNvPr id="101" name="Rectangle 100">
+            <a:extLst>
+              <a:ext uri="{FF2B5EF4-FFF2-40B4-BE49-F238E27FC236}">
+                <a16:creationId xmlns:a16="http://schemas.microsoft.com/office/drawing/2014/main" id="{5BEE2C53-F970-432C-9EF0-B16395497DDB}"/>
+              </a:ext>
+            </a:extLst>
+          </p:cNvPr>
+          <p:cNvSpPr/>
+          <p:nvPr/>
+        </p:nvSpPr>
+        <p:spPr>
+          <a:xfrm rot="16200000">
+            <a:off x="9645973" y="4578852"/>
+            <a:ext cx="1022445" cy="368228"/>
+          </a:xfrm>
+          <a:prstGeom prst="rect">
+            <a:avLst/>
+          </a:prstGeom>
+          <a:solidFill>
+            <a:schemeClr val="bg2">
+              <a:lumMod val="90000"/>
+            </a:schemeClr>
+          </a:solidFill>
+        </p:spPr>
+        <p:style>
+          <a:lnRef idx="2">
+            <a:schemeClr val="accent1">
+              <a:shade val="50000"/>
+            </a:schemeClr>
+          </a:lnRef>
+          <a:fillRef idx="1">
+            <a:schemeClr val="accent1"/>
+          </a:fillRef>
+          <a:effectRef idx="0">
+            <a:schemeClr val="accent1"/>
+          </a:effectRef>
+          <a:fontRef idx="minor">
+            <a:schemeClr val="lt1"/>
+          </a:fontRef>
+        </p:style>
+        <p:txBody>
+          <a:bodyPr rtlCol="0" anchor="ctr"/>
+          <a:lstStyle/>
+          <a:p>
+            <a:pPr algn="ctr"/>
+            <a:r>
+              <a:rPr lang="en-US" dirty="0">
+                <a:solidFill>
+                  <a:schemeClr val="tx1"/>
+                </a:solidFill>
+              </a:rPr>
+              <a:t>Host N</a:t>
+            </a:r>
+          </a:p>
+        </p:txBody>
+      </p:sp>
+      <p:cxnSp>
+        <p:nvCxnSpPr>
+          <p:cNvPr id="102" name="Straight Arrow Connector 101">
+            <a:extLst>
+              <a:ext uri="{FF2B5EF4-FFF2-40B4-BE49-F238E27FC236}">
+                <a16:creationId xmlns:a16="http://schemas.microsoft.com/office/drawing/2014/main" id="{EB96FCB9-19D5-432B-B874-01E971C45BF4}"/>
+              </a:ext>
+            </a:extLst>
+          </p:cNvPr>
+          <p:cNvCxnSpPr>
+            <a:cxnSpLocks/>
+            <a:endCxn id="101" idx="0"/>
+          </p:cNvCxnSpPr>
+          <p:nvPr/>
+        </p:nvCxnSpPr>
+        <p:spPr>
+          <a:xfrm>
+            <a:off x="9661230" y="4762966"/>
+            <a:ext cx="311852" cy="0"/>
+          </a:xfrm>
+          <a:prstGeom prst="straightConnector1">
+            <a:avLst/>
+          </a:prstGeom>
+          <a:ln>
+            <a:headEnd type="triangle"/>
+            <a:tailEnd type="triangle"/>
+          </a:ln>
+        </p:spPr>
+        <p:style>
+          <a:lnRef idx="1">
+            <a:schemeClr val="accent1"/>
+          </a:lnRef>
+          <a:fillRef idx="0">
+            <a:schemeClr val="accent1"/>
+          </a:fillRef>
+          <a:effectRef idx="0">
+            <a:schemeClr val="accent1"/>
+          </a:effectRef>
+          <a:fontRef idx="minor">
+            <a:schemeClr val="tx1"/>
+          </a:fontRef>
+        </p:style>
+      </p:cxnSp>
+      <p:sp>
+        <p:nvSpPr>
+          <p:cNvPr id="107" name="TextBox 106">
+            <a:extLst>
+              <a:ext uri="{FF2B5EF4-FFF2-40B4-BE49-F238E27FC236}">
+                <a16:creationId xmlns:a16="http://schemas.microsoft.com/office/drawing/2014/main" id="{A6F5D3B7-9CD0-4224-9762-C76C79E1371B}"/>
+              </a:ext>
+            </a:extLst>
+          </p:cNvPr>
+          <p:cNvSpPr txBox="1"/>
+          <p:nvPr/>
+        </p:nvSpPr>
+        <p:spPr>
+          <a:xfrm rot="16200000">
+            <a:off x="10004586" y="4005660"/>
+            <a:ext cx="238248" cy="253916"/>
+          </a:xfrm>
+          <a:prstGeom prst="rect">
+            <a:avLst/>
+          </a:prstGeom>
+          <a:noFill/>
+        </p:spPr>
+        <p:txBody>
+          <a:bodyPr wrap="square" rtlCol="0">
+            <a:spAutoFit/>
+          </a:bodyPr>
+          <a:lstStyle/>
+          <a:p>
+            <a:pPr algn="ctr"/>
+            <a:r>
+              <a:rPr lang="en-US" sz="1050" dirty="0"/>
+              <a:t>…</a:t>
+            </a:r>
+          </a:p>
+        </p:txBody>
+      </p:sp>
+      <p:sp>
+        <p:nvSpPr>
+          <p:cNvPr id="7" name="Rectangle 6">
+            <a:extLst>
+              <a:ext uri="{FF2B5EF4-FFF2-40B4-BE49-F238E27FC236}">
+                <a16:creationId xmlns:a16="http://schemas.microsoft.com/office/drawing/2014/main" id="{9719FC3C-4B0A-4BE8-AD6C-44B06ECD8204}"/>
+              </a:ext>
+            </a:extLst>
+          </p:cNvPr>
+          <p:cNvSpPr/>
+          <p:nvPr/>
+        </p:nvSpPr>
+        <p:spPr>
+          <a:xfrm>
+            <a:off x="5308532" y="2623749"/>
+            <a:ext cx="1621162" cy="2032069"/>
+          </a:xfrm>
+          <a:prstGeom prst="rect">
+            <a:avLst/>
+          </a:prstGeom>
+          <a:solidFill>
+            <a:schemeClr val="accent5">
+              <a:lumMod val="40000"/>
+              <a:lumOff val="60000"/>
+            </a:schemeClr>
+          </a:solidFill>
+        </p:spPr>
+        <p:style>
+          <a:lnRef idx="2">
+            <a:schemeClr val="accent1">
+              <a:shade val="50000"/>
+            </a:schemeClr>
+          </a:lnRef>
+          <a:fillRef idx="1">
+            <a:schemeClr val="accent1"/>
+          </a:fillRef>
+          <a:effectRef idx="0">
+            <a:schemeClr val="accent1"/>
+          </a:effectRef>
+          <a:fontRef idx="minor">
+            <a:schemeClr val="lt1"/>
+          </a:fontRef>
+        </p:style>
+        <p:txBody>
+          <a:bodyPr rtlCol="0" anchor="ctr"/>
+          <a:lstStyle/>
+          <a:p>
+            <a:endParaRPr lang="en-US" dirty="0">
+              <a:solidFill>
+                <a:schemeClr val="tx1"/>
+              </a:solidFill>
+            </a:endParaRPr>
+          </a:p>
+        </p:txBody>
+      </p:sp>
+      <p:sp>
+        <p:nvSpPr>
+          <p:cNvPr id="9" name="Rectangle 8">
+            <a:extLst>
+              <a:ext uri="{FF2B5EF4-FFF2-40B4-BE49-F238E27FC236}">
+                <a16:creationId xmlns:a16="http://schemas.microsoft.com/office/drawing/2014/main" id="{08CD8402-7233-47B1-A1B5-23D2E88AF40D}"/>
+              </a:ext>
+            </a:extLst>
+          </p:cNvPr>
+          <p:cNvSpPr/>
+          <p:nvPr/>
+        </p:nvSpPr>
+        <p:spPr>
+          <a:xfrm>
+            <a:off x="5374452" y="3015970"/>
+            <a:ext cx="1494503" cy="224589"/>
+          </a:xfrm>
+          <a:prstGeom prst="rect">
+            <a:avLst/>
+          </a:prstGeom>
+          <a:solidFill>
+            <a:srgbClr val="00B050"/>
+          </a:solidFill>
+        </p:spPr>
+        <p:style>
+          <a:lnRef idx="2">
+            <a:schemeClr val="accent1">
+              <a:shade val="50000"/>
+            </a:schemeClr>
+          </a:lnRef>
+          <a:fillRef idx="1">
+            <a:schemeClr val="accent1"/>
+          </a:fillRef>
+          <a:effectRef idx="0">
+            <a:schemeClr val="accent1"/>
+          </a:effectRef>
+          <a:fontRef idx="minor">
+            <a:schemeClr val="lt1"/>
+          </a:fontRef>
+        </p:style>
+        <p:txBody>
+          <a:bodyPr rtlCol="0" anchor="ctr"/>
+          <a:lstStyle/>
+          <a:p>
+            <a:pPr algn="ctr"/>
+            <a:r>
+              <a:rPr lang="en-US" dirty="0"/>
+              <a:t>Main Parser</a:t>
+            </a:r>
+          </a:p>
+        </p:txBody>
+      </p:sp>
+      <p:sp>
+        <p:nvSpPr>
+          <p:cNvPr id="10" name="Rectangle 9">
+            <a:extLst>
+              <a:ext uri="{FF2B5EF4-FFF2-40B4-BE49-F238E27FC236}">
+                <a16:creationId xmlns:a16="http://schemas.microsoft.com/office/drawing/2014/main" id="{4DA835D9-811A-4207-86BD-82A8C24C1D85}"/>
+              </a:ext>
+            </a:extLst>
+          </p:cNvPr>
+          <p:cNvSpPr/>
+          <p:nvPr/>
+        </p:nvSpPr>
+        <p:spPr>
+          <a:xfrm>
+            <a:off x="5370661" y="3722364"/>
+            <a:ext cx="1494503" cy="200960"/>
+          </a:xfrm>
+          <a:prstGeom prst="rect">
+            <a:avLst/>
+          </a:prstGeom>
+          <a:solidFill>
+            <a:srgbClr val="00B050"/>
+          </a:solidFill>
+        </p:spPr>
+        <p:style>
+          <a:lnRef idx="2">
+            <a:schemeClr val="accent1">
+              <a:shade val="50000"/>
+            </a:schemeClr>
+          </a:lnRef>
+          <a:fillRef idx="1">
+            <a:schemeClr val="accent1"/>
+          </a:fillRef>
+          <a:effectRef idx="0">
+            <a:schemeClr val="accent1"/>
+          </a:effectRef>
+          <a:fontRef idx="minor">
+            <a:schemeClr val="lt1"/>
+          </a:fontRef>
+        </p:style>
+        <p:txBody>
+          <a:bodyPr rtlCol="0" anchor="ctr"/>
+          <a:lstStyle/>
+          <a:p>
+            <a:pPr algn="ctr"/>
+            <a:r>
+              <a:rPr lang="en-US" dirty="0"/>
+              <a:t>Main control</a:t>
+            </a:r>
+          </a:p>
+        </p:txBody>
+      </p:sp>
+      <p:sp>
+        <p:nvSpPr>
+          <p:cNvPr id="11" name="Rectangle 10">
+            <a:extLst>
+              <a:ext uri="{FF2B5EF4-FFF2-40B4-BE49-F238E27FC236}">
+                <a16:creationId xmlns:a16="http://schemas.microsoft.com/office/drawing/2014/main" id="{C5E0B604-11FA-4D85-8C27-1B6B6D7746A0}"/>
+              </a:ext>
+            </a:extLst>
+          </p:cNvPr>
+          <p:cNvSpPr/>
+          <p:nvPr/>
+        </p:nvSpPr>
+        <p:spPr>
+          <a:xfrm>
+            <a:off x="5370662" y="4060951"/>
+            <a:ext cx="1494503" cy="234880"/>
+          </a:xfrm>
+          <a:prstGeom prst="rect">
+            <a:avLst/>
+          </a:prstGeom>
+          <a:solidFill>
+            <a:srgbClr val="00B050"/>
+          </a:solidFill>
+        </p:spPr>
+        <p:style>
+          <a:lnRef idx="2">
+            <a:schemeClr val="accent1">
+              <a:shade val="50000"/>
+            </a:schemeClr>
+          </a:lnRef>
+          <a:fillRef idx="1">
+            <a:schemeClr val="accent1"/>
+          </a:fillRef>
+          <a:effectRef idx="0">
+            <a:schemeClr val="accent1"/>
+          </a:effectRef>
+          <a:fontRef idx="minor">
+            <a:schemeClr val="lt1"/>
+          </a:fontRef>
+        </p:style>
+        <p:txBody>
+          <a:bodyPr rtlCol="0" anchor="ctr"/>
+          <a:lstStyle/>
+          <a:p>
+            <a:pPr algn="ctr"/>
+            <a:r>
+              <a:rPr lang="en-US" sz="1600" dirty="0"/>
+              <a:t>Main Deparser</a:t>
+            </a:r>
+          </a:p>
+        </p:txBody>
+      </p:sp>
+      <p:sp>
+        <p:nvSpPr>
+          <p:cNvPr id="12" name="TextBox 11">
+            <a:extLst>
+              <a:ext uri="{FF2B5EF4-FFF2-40B4-BE49-F238E27FC236}">
+                <a16:creationId xmlns:a16="http://schemas.microsoft.com/office/drawing/2014/main" id="{A57A30FC-8EBC-4414-9C3F-8F53C01E89DB}"/>
+              </a:ext>
+            </a:extLst>
+          </p:cNvPr>
+          <p:cNvSpPr txBox="1"/>
+          <p:nvPr/>
+        </p:nvSpPr>
+        <p:spPr>
+          <a:xfrm>
+            <a:off x="6109193" y="2610581"/>
+            <a:ext cx="894797" cy="253916"/>
+          </a:xfrm>
+          <a:prstGeom prst="rect">
+            <a:avLst/>
+          </a:prstGeom>
+          <a:noFill/>
+        </p:spPr>
+        <p:txBody>
+          <a:bodyPr wrap="none" rtlCol="0">
+            <a:spAutoFit/>
+          </a:bodyPr>
+          <a:lstStyle/>
+          <a:p>
+            <a:r>
+              <a:rPr lang="en-US" sz="1050" dirty="0"/>
+              <a:t>FROM_HOST</a:t>
+            </a:r>
+          </a:p>
+        </p:txBody>
+      </p:sp>
+      <p:sp>
+        <p:nvSpPr>
+          <p:cNvPr id="13" name="TextBox 12">
+            <a:extLst>
+              <a:ext uri="{FF2B5EF4-FFF2-40B4-BE49-F238E27FC236}">
+                <a16:creationId xmlns:a16="http://schemas.microsoft.com/office/drawing/2014/main" id="{1CFDA1D5-F37B-4541-B9D2-E055C8630AC5}"/>
+              </a:ext>
+            </a:extLst>
+          </p:cNvPr>
+          <p:cNvSpPr txBox="1"/>
+          <p:nvPr/>
+        </p:nvSpPr>
+        <p:spPr>
+          <a:xfrm>
+            <a:off x="5349421" y="4403753"/>
+            <a:ext cx="708848" cy="253916"/>
+          </a:xfrm>
+          <a:prstGeom prst="rect">
+            <a:avLst/>
+          </a:prstGeom>
+          <a:noFill/>
+        </p:spPr>
+        <p:txBody>
+          <a:bodyPr wrap="none" rtlCol="0">
+            <a:spAutoFit/>
+          </a:bodyPr>
+          <a:lstStyle/>
+          <a:p>
+            <a:r>
+              <a:rPr lang="en-US" sz="1050" dirty="0"/>
+              <a:t>TO_HOST</a:t>
+            </a:r>
+          </a:p>
+        </p:txBody>
+      </p:sp>
+      <p:sp>
+        <p:nvSpPr>
+          <p:cNvPr id="14" name="TextBox 13">
+            <a:extLst>
+              <a:ext uri="{FF2B5EF4-FFF2-40B4-BE49-F238E27FC236}">
+                <a16:creationId xmlns:a16="http://schemas.microsoft.com/office/drawing/2014/main" id="{1334AC9D-6D71-45C5-B180-594CD48DA462}"/>
+              </a:ext>
+            </a:extLst>
+          </p:cNvPr>
+          <p:cNvSpPr txBox="1"/>
+          <p:nvPr/>
+        </p:nvSpPr>
+        <p:spPr>
+          <a:xfrm>
+            <a:off x="5288002" y="2619690"/>
+            <a:ext cx="811441" cy="253916"/>
+          </a:xfrm>
+          <a:prstGeom prst="rect">
+            <a:avLst/>
+          </a:prstGeom>
+          <a:noFill/>
+        </p:spPr>
+        <p:txBody>
+          <a:bodyPr wrap="none" rtlCol="0">
+            <a:spAutoFit/>
+          </a:bodyPr>
+          <a:lstStyle/>
+          <a:p>
+            <a:r>
+              <a:rPr lang="en-US" sz="1050" dirty="0"/>
+              <a:t>FROM_NET</a:t>
+            </a:r>
+          </a:p>
+        </p:txBody>
+      </p:sp>
+      <p:sp>
+        <p:nvSpPr>
+          <p:cNvPr id="15" name="TextBox 14">
+            <a:extLst>
+              <a:ext uri="{FF2B5EF4-FFF2-40B4-BE49-F238E27FC236}">
+                <a16:creationId xmlns:a16="http://schemas.microsoft.com/office/drawing/2014/main" id="{962C12F2-DD96-4A51-B663-4E2BD4690C21}"/>
+              </a:ext>
+            </a:extLst>
+          </p:cNvPr>
+          <p:cNvSpPr txBox="1"/>
+          <p:nvPr/>
+        </p:nvSpPr>
+        <p:spPr>
+          <a:xfrm>
+            <a:off x="6231065" y="4397065"/>
+            <a:ext cx="625492" cy="253916"/>
+          </a:xfrm>
+          <a:prstGeom prst="rect">
+            <a:avLst/>
+          </a:prstGeom>
+          <a:noFill/>
+        </p:spPr>
+        <p:txBody>
+          <a:bodyPr wrap="none" rtlCol="0">
+            <a:spAutoFit/>
+          </a:bodyPr>
+          <a:lstStyle/>
+          <a:p>
+            <a:r>
+              <a:rPr lang="en-US" sz="1050" dirty="0"/>
+              <a:t>TO_NET</a:t>
+            </a:r>
+          </a:p>
+        </p:txBody>
+      </p:sp>
+      <p:cxnSp>
+        <p:nvCxnSpPr>
+          <p:cNvPr id="8" name="Straight Arrow Connector 7">
+            <a:extLst>
+              <a:ext uri="{FF2B5EF4-FFF2-40B4-BE49-F238E27FC236}">
+                <a16:creationId xmlns:a16="http://schemas.microsoft.com/office/drawing/2014/main" id="{BB801080-B3EB-43D3-BDB6-AD0E67A57AA2}"/>
+              </a:ext>
+            </a:extLst>
+          </p:cNvPr>
+          <p:cNvCxnSpPr>
+            <a:cxnSpLocks/>
+          </p:cNvCxnSpPr>
+          <p:nvPr/>
+        </p:nvCxnSpPr>
+        <p:spPr>
+          <a:xfrm>
+            <a:off x="5690436" y="2870862"/>
+            <a:ext cx="0" cy="145108"/>
+          </a:xfrm>
+          <a:prstGeom prst="straightConnector1">
+            <a:avLst/>
+          </a:prstGeom>
+          <a:ln>
+            <a:tailEnd type="triangle"/>
+          </a:ln>
+        </p:spPr>
+        <p:style>
+          <a:lnRef idx="1">
+            <a:schemeClr val="accent1"/>
+          </a:lnRef>
+          <a:fillRef idx="0">
+            <a:schemeClr val="accent1"/>
+          </a:fillRef>
+          <a:effectRef idx="0">
+            <a:schemeClr val="accent1"/>
+          </a:effectRef>
+          <a:fontRef idx="minor">
+            <a:schemeClr val="tx1"/>
+          </a:fontRef>
+        </p:style>
+      </p:cxnSp>
+      <p:cxnSp>
+        <p:nvCxnSpPr>
+          <p:cNvPr id="18" name="Straight Arrow Connector 17">
+            <a:extLst>
+              <a:ext uri="{FF2B5EF4-FFF2-40B4-BE49-F238E27FC236}">
+                <a16:creationId xmlns:a16="http://schemas.microsoft.com/office/drawing/2014/main" id="{78AD3BE8-DF3A-4F04-908C-973DFE021940}"/>
+              </a:ext>
+            </a:extLst>
+          </p:cNvPr>
+          <p:cNvCxnSpPr>
+            <a:cxnSpLocks/>
+          </p:cNvCxnSpPr>
+          <p:nvPr/>
+        </p:nvCxnSpPr>
+        <p:spPr>
+          <a:xfrm>
+            <a:off x="6559873" y="3591246"/>
+            <a:ext cx="0" cy="138113"/>
+          </a:xfrm>
+          <a:prstGeom prst="straightConnector1">
+            <a:avLst/>
+          </a:prstGeom>
+          <a:ln>
+            <a:tailEnd type="triangle"/>
+          </a:ln>
+        </p:spPr>
+        <p:style>
+          <a:lnRef idx="1">
+            <a:schemeClr val="accent1"/>
+          </a:lnRef>
+          <a:fillRef idx="0">
+            <a:schemeClr val="accent1"/>
+          </a:fillRef>
+          <a:effectRef idx="0">
+            <a:schemeClr val="accent1"/>
+          </a:effectRef>
+          <a:fontRef idx="minor">
+            <a:schemeClr val="tx1"/>
+          </a:fontRef>
+        </p:style>
+      </p:cxnSp>
+      <p:cxnSp>
+        <p:nvCxnSpPr>
+          <p:cNvPr id="21" name="Straight Arrow Connector 20">
+            <a:extLst>
+              <a:ext uri="{FF2B5EF4-FFF2-40B4-BE49-F238E27FC236}">
+                <a16:creationId xmlns:a16="http://schemas.microsoft.com/office/drawing/2014/main" id="{118C6842-6E5E-4C24-B95F-914E14CD1B9C}"/>
+              </a:ext>
+            </a:extLst>
+          </p:cNvPr>
+          <p:cNvCxnSpPr>
+            <a:cxnSpLocks/>
+          </p:cNvCxnSpPr>
+          <p:nvPr/>
+        </p:nvCxnSpPr>
+        <p:spPr>
+          <a:xfrm>
+            <a:off x="6555326" y="3923324"/>
+            <a:ext cx="0" cy="137627"/>
+          </a:xfrm>
+          <a:prstGeom prst="straightConnector1">
+            <a:avLst/>
+          </a:prstGeom>
+          <a:ln>
+            <a:tailEnd type="triangle"/>
+          </a:ln>
+        </p:spPr>
+        <p:style>
+          <a:lnRef idx="1">
+            <a:schemeClr val="accent1"/>
+          </a:lnRef>
+          <a:fillRef idx="0">
+            <a:schemeClr val="accent1"/>
+          </a:fillRef>
+          <a:effectRef idx="0">
+            <a:schemeClr val="accent1"/>
+          </a:effectRef>
+          <a:fontRef idx="minor">
+            <a:schemeClr val="tx1"/>
+          </a:fontRef>
+        </p:style>
+      </p:cxnSp>
+      <p:cxnSp>
+        <p:nvCxnSpPr>
+          <p:cNvPr id="29" name="Straight Arrow Connector 28">
+            <a:extLst>
+              <a:ext uri="{FF2B5EF4-FFF2-40B4-BE49-F238E27FC236}">
+                <a16:creationId xmlns:a16="http://schemas.microsoft.com/office/drawing/2014/main" id="{6E973354-BD42-4475-A807-8DE90F54F8A4}"/>
+              </a:ext>
+            </a:extLst>
+          </p:cNvPr>
+          <p:cNvCxnSpPr>
+            <a:cxnSpLocks/>
+          </p:cNvCxnSpPr>
+          <p:nvPr/>
+        </p:nvCxnSpPr>
+        <p:spPr>
+          <a:xfrm>
+            <a:off x="6559116" y="2870862"/>
+            <a:ext cx="0" cy="145108"/>
+          </a:xfrm>
+          <a:prstGeom prst="straightConnector1">
+            <a:avLst/>
+          </a:prstGeom>
+          <a:ln>
+            <a:tailEnd type="triangle"/>
+          </a:ln>
+        </p:spPr>
+        <p:style>
+          <a:lnRef idx="1">
+            <a:schemeClr val="accent1"/>
+          </a:lnRef>
+          <a:fillRef idx="0">
+            <a:schemeClr val="accent1"/>
+          </a:fillRef>
+          <a:effectRef idx="0">
+            <a:schemeClr val="accent1"/>
+          </a:effectRef>
+          <a:fontRef idx="minor">
+            <a:schemeClr val="tx1"/>
+          </a:fontRef>
+        </p:style>
+      </p:cxnSp>
+      <p:cxnSp>
+        <p:nvCxnSpPr>
+          <p:cNvPr id="30" name="Straight Arrow Connector 29">
+            <a:extLst>
+              <a:ext uri="{FF2B5EF4-FFF2-40B4-BE49-F238E27FC236}">
+                <a16:creationId xmlns:a16="http://schemas.microsoft.com/office/drawing/2014/main" id="{D4BD033C-95E1-41B3-B6D8-C9EAC2E4C393}"/>
+              </a:ext>
+            </a:extLst>
+          </p:cNvPr>
+          <p:cNvCxnSpPr>
+            <a:cxnSpLocks/>
+          </p:cNvCxnSpPr>
+          <p:nvPr/>
+        </p:nvCxnSpPr>
+        <p:spPr>
+          <a:xfrm>
+            <a:off x="5686646" y="4295831"/>
+            <a:ext cx="0" cy="145108"/>
+          </a:xfrm>
+          <a:prstGeom prst="straightConnector1">
+            <a:avLst/>
+          </a:prstGeom>
+          <a:ln>
+            <a:tailEnd type="triangle"/>
+          </a:ln>
+        </p:spPr>
+        <p:style>
+          <a:lnRef idx="1">
+            <a:schemeClr val="accent1"/>
+          </a:lnRef>
+          <a:fillRef idx="0">
+            <a:schemeClr val="accent1"/>
+          </a:fillRef>
+          <a:effectRef idx="0">
+            <a:schemeClr val="accent1"/>
+          </a:effectRef>
+          <a:fontRef idx="minor">
+            <a:schemeClr val="tx1"/>
+          </a:fontRef>
+        </p:style>
+      </p:cxnSp>
+      <p:cxnSp>
+        <p:nvCxnSpPr>
+          <p:cNvPr id="31" name="Straight Arrow Connector 30">
+            <a:extLst>
+              <a:ext uri="{FF2B5EF4-FFF2-40B4-BE49-F238E27FC236}">
+                <a16:creationId xmlns:a16="http://schemas.microsoft.com/office/drawing/2014/main" id="{3B2C21DB-6C35-4435-AF14-F51CB6679761}"/>
+              </a:ext>
+            </a:extLst>
+          </p:cNvPr>
+          <p:cNvCxnSpPr>
+            <a:cxnSpLocks/>
+          </p:cNvCxnSpPr>
+          <p:nvPr/>
+        </p:nvCxnSpPr>
+        <p:spPr>
+          <a:xfrm>
+            <a:off x="6555326" y="4295831"/>
+            <a:ext cx="0" cy="145108"/>
+          </a:xfrm>
+          <a:prstGeom prst="straightConnector1">
+            <a:avLst/>
+          </a:prstGeom>
+          <a:ln>
+            <a:tailEnd type="triangle"/>
+          </a:ln>
+        </p:spPr>
+        <p:style>
+          <a:lnRef idx="1">
+            <a:schemeClr val="accent1"/>
+          </a:lnRef>
+          <a:fillRef idx="0">
+            <a:schemeClr val="accent1"/>
+          </a:fillRef>
+          <a:effectRef idx="0">
+            <a:schemeClr val="accent1"/>
+          </a:effectRef>
+          <a:fontRef idx="minor">
+            <a:schemeClr val="tx1"/>
+          </a:fontRef>
+        </p:style>
+      </p:cxnSp>
+      <p:cxnSp>
+        <p:nvCxnSpPr>
+          <p:cNvPr id="32" name="Straight Arrow Connector 31">
+            <a:extLst>
+              <a:ext uri="{FF2B5EF4-FFF2-40B4-BE49-F238E27FC236}">
+                <a16:creationId xmlns:a16="http://schemas.microsoft.com/office/drawing/2014/main" id="{92046405-9500-4397-B377-F93955C0070E}"/>
+              </a:ext>
+            </a:extLst>
+          </p:cNvPr>
+          <p:cNvCxnSpPr>
+            <a:cxnSpLocks/>
+          </p:cNvCxnSpPr>
+          <p:nvPr/>
+        </p:nvCxnSpPr>
+        <p:spPr>
+          <a:xfrm>
+            <a:off x="5686646" y="3584251"/>
+            <a:ext cx="0" cy="145108"/>
+          </a:xfrm>
+          <a:prstGeom prst="straightConnector1">
+            <a:avLst/>
+          </a:prstGeom>
+          <a:ln>
+            <a:tailEnd type="triangle"/>
+          </a:ln>
+        </p:spPr>
+        <p:style>
+          <a:lnRef idx="1">
+            <a:schemeClr val="accent1"/>
+          </a:lnRef>
+          <a:fillRef idx="0">
+            <a:schemeClr val="accent1"/>
+          </a:fillRef>
+          <a:effectRef idx="0">
+            <a:schemeClr val="accent1"/>
+          </a:effectRef>
+          <a:fontRef idx="minor">
+            <a:schemeClr val="tx1"/>
+          </a:fontRef>
+        </p:style>
+      </p:cxnSp>
+      <p:cxnSp>
+        <p:nvCxnSpPr>
+          <p:cNvPr id="33" name="Straight Arrow Connector 32">
+            <a:extLst>
+              <a:ext uri="{FF2B5EF4-FFF2-40B4-BE49-F238E27FC236}">
+                <a16:creationId xmlns:a16="http://schemas.microsoft.com/office/drawing/2014/main" id="{E38A593F-0DEE-408E-8DF2-68583A1E725F}"/>
+              </a:ext>
+            </a:extLst>
+          </p:cNvPr>
+          <p:cNvCxnSpPr>
+            <a:cxnSpLocks/>
+          </p:cNvCxnSpPr>
+          <p:nvPr/>
+        </p:nvCxnSpPr>
+        <p:spPr>
+          <a:xfrm>
+            <a:off x="5686646" y="3923324"/>
+            <a:ext cx="0" cy="145108"/>
+          </a:xfrm>
+          <a:prstGeom prst="straightConnector1">
+            <a:avLst/>
+          </a:prstGeom>
+          <a:ln>
+            <a:tailEnd type="triangle"/>
+          </a:ln>
+        </p:spPr>
+        <p:style>
+          <a:lnRef idx="1">
+            <a:schemeClr val="accent1"/>
+          </a:lnRef>
+          <a:fillRef idx="0">
+            <a:schemeClr val="accent1"/>
+          </a:fillRef>
+          <a:effectRef idx="0">
+            <a:schemeClr val="accent1"/>
+          </a:effectRef>
+          <a:fontRef idx="minor">
+            <a:schemeClr val="tx1"/>
+          </a:fontRef>
+        </p:style>
+      </p:cxnSp>
+      <p:sp>
+        <p:nvSpPr>
+          <p:cNvPr id="145" name="Rectangle 144">
+            <a:extLst>
+              <a:ext uri="{FF2B5EF4-FFF2-40B4-BE49-F238E27FC236}">
+                <a16:creationId xmlns:a16="http://schemas.microsoft.com/office/drawing/2014/main" id="{69B7E0ED-8772-44A6-BD46-8EBA68442208}"/>
+              </a:ext>
+            </a:extLst>
+          </p:cNvPr>
+          <p:cNvSpPr/>
+          <p:nvPr/>
+        </p:nvSpPr>
+        <p:spPr>
+          <a:xfrm>
+            <a:off x="5374452" y="3386966"/>
+            <a:ext cx="1494503" cy="200960"/>
+          </a:xfrm>
+          <a:prstGeom prst="rect">
+            <a:avLst/>
+          </a:prstGeom>
+          <a:solidFill>
+            <a:srgbClr val="00B050"/>
+          </a:solidFill>
+        </p:spPr>
+        <p:style>
+          <a:lnRef idx="2">
+            <a:schemeClr val="accent1">
+              <a:shade val="50000"/>
+            </a:schemeClr>
+          </a:lnRef>
+          <a:fillRef idx="1">
+            <a:schemeClr val="accent1"/>
+          </a:fillRef>
+          <a:effectRef idx="0">
+            <a:schemeClr val="accent1"/>
+          </a:effectRef>
+          <a:fontRef idx="minor">
+            <a:schemeClr val="lt1"/>
+          </a:fontRef>
+        </p:style>
+        <p:txBody>
+          <a:bodyPr rtlCol="0" anchor="ctr"/>
+          <a:lstStyle/>
+          <a:p>
+            <a:pPr algn="ctr"/>
+            <a:r>
+              <a:rPr lang="en-US" dirty="0"/>
+              <a:t>Pre control</a:t>
+            </a:r>
+          </a:p>
+        </p:txBody>
+      </p:sp>
+      <p:cxnSp>
+        <p:nvCxnSpPr>
+          <p:cNvPr id="146" name="Straight Arrow Connector 145">
+            <a:extLst>
+              <a:ext uri="{FF2B5EF4-FFF2-40B4-BE49-F238E27FC236}">
+                <a16:creationId xmlns:a16="http://schemas.microsoft.com/office/drawing/2014/main" id="{57FA4F80-C4C0-4859-884B-41920790CA7A}"/>
+              </a:ext>
+            </a:extLst>
+          </p:cNvPr>
+          <p:cNvCxnSpPr>
+            <a:cxnSpLocks/>
+          </p:cNvCxnSpPr>
+          <p:nvPr/>
+        </p:nvCxnSpPr>
+        <p:spPr>
+          <a:xfrm>
+            <a:off x="6563664" y="3255848"/>
+            <a:ext cx="0" cy="138113"/>
+          </a:xfrm>
+          <a:prstGeom prst="straightConnector1">
+            <a:avLst/>
+          </a:prstGeom>
+          <a:ln>
+            <a:tailEnd type="triangle"/>
+          </a:ln>
+        </p:spPr>
+        <p:style>
+          <a:lnRef idx="1">
+            <a:schemeClr val="accent1"/>
+          </a:lnRef>
+          <a:fillRef idx="0">
+            <a:schemeClr val="accent1"/>
+          </a:fillRef>
+          <a:effectRef idx="0">
+            <a:schemeClr val="accent1"/>
+          </a:effectRef>
+          <a:fontRef idx="minor">
+            <a:schemeClr val="tx1"/>
+          </a:fontRef>
+        </p:style>
+      </p:cxnSp>
+      <p:cxnSp>
+        <p:nvCxnSpPr>
+          <p:cNvPr id="147" name="Straight Arrow Connector 146">
+            <a:extLst>
+              <a:ext uri="{FF2B5EF4-FFF2-40B4-BE49-F238E27FC236}">
+                <a16:creationId xmlns:a16="http://schemas.microsoft.com/office/drawing/2014/main" id="{BCD7B2CD-4139-4CA0-8F3D-C2F75675CAD0}"/>
+              </a:ext>
+            </a:extLst>
+          </p:cNvPr>
+          <p:cNvCxnSpPr>
+            <a:cxnSpLocks/>
+          </p:cNvCxnSpPr>
+          <p:nvPr/>
+        </p:nvCxnSpPr>
+        <p:spPr>
+          <a:xfrm>
+            <a:off x="5690437" y="3248853"/>
+            <a:ext cx="0" cy="145108"/>
+          </a:xfrm>
+          <a:prstGeom prst="straightConnector1">
+            <a:avLst/>
+          </a:prstGeom>
+          <a:ln>
+            <a:tailEnd type="triangle"/>
+          </a:ln>
+        </p:spPr>
+        <p:style>
+          <a:lnRef idx="1">
+            <a:schemeClr val="accent1"/>
+          </a:lnRef>
+          <a:fillRef idx="0">
+            <a:schemeClr val="accent1"/>
+          </a:fillRef>
+          <a:effectRef idx="0">
+            <a:schemeClr val="accent1"/>
+          </a:effectRef>
+          <a:fontRef idx="minor">
+            <a:schemeClr val="tx1"/>
+          </a:fontRef>
+        </p:style>
+      </p:cxnSp>
+      <p:cxnSp>
+        <p:nvCxnSpPr>
+          <p:cNvPr id="99" name="Connector: Elbow 98">
+            <a:extLst>
+              <a:ext uri="{FF2B5EF4-FFF2-40B4-BE49-F238E27FC236}">
+                <a16:creationId xmlns:a16="http://schemas.microsoft.com/office/drawing/2014/main" id="{F5BF228F-7392-4163-85E4-ED62A7AC1794}"/>
+              </a:ext>
+            </a:extLst>
+          </p:cNvPr>
+          <p:cNvCxnSpPr>
+            <a:cxnSpLocks/>
+            <a:stCxn id="15" idx="2"/>
+          </p:cNvCxnSpPr>
+          <p:nvPr/>
+        </p:nvCxnSpPr>
+        <p:spPr>
+          <a:xfrm rot="5400000">
+            <a:off x="5506054" y="3907622"/>
+            <a:ext cx="294399" cy="1781116"/>
+          </a:xfrm>
+          <a:prstGeom prst="bentConnector2">
+            <a:avLst/>
+          </a:prstGeom>
+          <a:ln>
+            <a:tailEnd type="triangle"/>
+          </a:ln>
+        </p:spPr>
+        <p:style>
+          <a:lnRef idx="1">
+            <a:schemeClr val="accent1"/>
+          </a:lnRef>
+          <a:fillRef idx="0">
+            <a:schemeClr val="accent1"/>
+          </a:fillRef>
+          <a:effectRef idx="0">
+            <a:schemeClr val="accent1"/>
+          </a:effectRef>
+          <a:fontRef idx="minor">
+            <a:schemeClr val="tx1"/>
+          </a:fontRef>
+        </p:style>
+      </p:cxnSp>
+      <p:cxnSp>
+        <p:nvCxnSpPr>
+          <p:cNvPr id="140" name="Connector: Elbow 139">
+            <a:extLst>
+              <a:ext uri="{FF2B5EF4-FFF2-40B4-BE49-F238E27FC236}">
+                <a16:creationId xmlns:a16="http://schemas.microsoft.com/office/drawing/2014/main" id="{E9876982-0570-44F5-B12B-B2063F961DF8}"/>
+              </a:ext>
+            </a:extLst>
+          </p:cNvPr>
+          <p:cNvCxnSpPr>
+            <a:cxnSpLocks/>
+            <a:stCxn id="13" idx="2"/>
+          </p:cNvCxnSpPr>
+          <p:nvPr/>
+        </p:nvCxnSpPr>
+        <p:spPr>
+          <a:xfrm rot="16200000" flipH="1">
+            <a:off x="6262431" y="4099083"/>
+            <a:ext cx="190304" cy="1307476"/>
+          </a:xfrm>
+          <a:prstGeom prst="bentConnector2">
+            <a:avLst/>
+          </a:prstGeom>
+          <a:ln>
+            <a:tailEnd type="none"/>
+          </a:ln>
+        </p:spPr>
+        <p:style>
+          <a:lnRef idx="1">
+            <a:schemeClr val="accent1"/>
+          </a:lnRef>
+          <a:fillRef idx="0">
+            <a:schemeClr val="accent1"/>
+          </a:fillRef>
+          <a:effectRef idx="0">
+            <a:schemeClr val="accent1"/>
+          </a:effectRef>
+          <a:fontRef idx="minor">
+            <a:schemeClr val="tx1"/>
+          </a:fontRef>
+        </p:style>
+      </p:cxnSp>
+      <p:cxnSp>
+        <p:nvCxnSpPr>
+          <p:cNvPr id="141" name="Straight Connector 140">
+            <a:extLst>
+              <a:ext uri="{FF2B5EF4-FFF2-40B4-BE49-F238E27FC236}">
+                <a16:creationId xmlns:a16="http://schemas.microsoft.com/office/drawing/2014/main" id="{956C68FF-B872-470E-8F89-290953F628E9}"/>
+              </a:ext>
+            </a:extLst>
+          </p:cNvPr>
+          <p:cNvCxnSpPr>
+            <a:cxnSpLocks/>
+          </p:cNvCxnSpPr>
+          <p:nvPr/>
+        </p:nvCxnSpPr>
+        <p:spPr>
+          <a:xfrm flipV="1">
+            <a:off x="7009006" y="4847973"/>
+            <a:ext cx="0" cy="85118"/>
+          </a:xfrm>
+          <a:prstGeom prst="line">
+            <a:avLst/>
+          </a:prstGeom>
+        </p:spPr>
+        <p:style>
+          <a:lnRef idx="1">
+            <a:schemeClr val="accent1"/>
+          </a:lnRef>
+          <a:fillRef idx="0">
+            <a:schemeClr val="accent1"/>
+          </a:fillRef>
+          <a:effectRef idx="0">
+            <a:schemeClr val="accent1"/>
+          </a:effectRef>
+          <a:fontRef idx="minor">
+            <a:schemeClr val="tx1"/>
+          </a:fontRef>
+        </p:style>
+      </p:cxnSp>
+      <p:grpSp>
+        <p:nvGrpSpPr>
+          <p:cNvPr id="130" name="Group 129">
+            <a:extLst>
+              <a:ext uri="{FF2B5EF4-FFF2-40B4-BE49-F238E27FC236}">
+                <a16:creationId xmlns:a16="http://schemas.microsoft.com/office/drawing/2014/main" id="{2D698BE8-3C15-496F-9E33-6CDA16B84D33}"/>
+              </a:ext>
+            </a:extLst>
+          </p:cNvPr>
+          <p:cNvGrpSpPr/>
+          <p:nvPr/>
+        </p:nvGrpSpPr>
+        <p:grpSpPr>
+          <a:xfrm flipH="1">
+            <a:off x="6662769" y="2484867"/>
+            <a:ext cx="408827" cy="2285957"/>
+            <a:chOff x="5547388" y="-106133"/>
+            <a:chExt cx="408827" cy="2285957"/>
+          </a:xfrm>
+        </p:grpSpPr>
+        <p:cxnSp>
+          <p:nvCxnSpPr>
+            <p:cNvPr id="153" name="Connector: Elbow 152">
+              <a:extLst>
+                <a:ext uri="{FF2B5EF4-FFF2-40B4-BE49-F238E27FC236}">
+                  <a16:creationId xmlns:a16="http://schemas.microsoft.com/office/drawing/2014/main" id="{0A298E79-BB8F-4FCE-8F51-69445642F1B6}"/>
+                </a:ext>
+              </a:extLst>
+            </p:cNvPr>
+            <p:cNvCxnSpPr>
+              <a:cxnSpLocks/>
+            </p:cNvCxnSpPr>
+            <p:nvPr/>
+          </p:nvCxnSpPr>
+          <p:spPr>
+            <a:xfrm flipH="1">
+              <a:off x="5549960" y="2064496"/>
+              <a:ext cx="403990" cy="115327"/>
+            </a:xfrm>
+            <a:prstGeom prst="bentConnector3">
+              <a:avLst>
+                <a:gd name="adj1" fmla="val 960"/>
+              </a:avLst>
+            </a:prstGeom>
+            <a:ln>
+              <a:tailEnd type="none"/>
+            </a:ln>
+          </p:spPr>
+          <p:style>
+            <a:lnRef idx="1">
+              <a:schemeClr val="accent1"/>
+            </a:lnRef>
+            <a:fillRef idx="0">
+              <a:schemeClr val="accent1"/>
+            </a:fillRef>
+            <a:effectRef idx="0">
+              <a:schemeClr val="accent1"/>
+            </a:effectRef>
+            <a:fontRef idx="minor">
+              <a:schemeClr val="tx1"/>
+            </a:fontRef>
+          </p:style>
+        </p:cxnSp>
+        <p:cxnSp>
+          <p:nvCxnSpPr>
+            <p:cNvPr id="154" name="Connector: Elbow 153">
+              <a:extLst>
+                <a:ext uri="{FF2B5EF4-FFF2-40B4-BE49-F238E27FC236}">
+                  <a16:creationId xmlns:a16="http://schemas.microsoft.com/office/drawing/2014/main" id="{23E5A02B-F0BE-4FBD-8B4B-640E6650DBC7}"/>
+                </a:ext>
+              </a:extLst>
+            </p:cNvPr>
+            <p:cNvCxnSpPr>
+              <a:cxnSpLocks/>
+            </p:cNvCxnSpPr>
+            <p:nvPr/>
+          </p:nvCxnSpPr>
+          <p:spPr>
+            <a:xfrm rot="10800000" flipH="1" flipV="1">
+              <a:off x="5547388" y="-106133"/>
+              <a:ext cx="408827" cy="135459"/>
+            </a:xfrm>
+            <a:prstGeom prst="bentConnector3">
+              <a:avLst>
+                <a:gd name="adj1" fmla="val 99393"/>
               </a:avLst>
             </a:prstGeom>
             <a:ln>
@@ -7249,10 +7056,10 @@
         </p:cxnSp>
         <p:cxnSp>
           <p:nvCxnSpPr>
-            <p:cNvPr id="150" name="Straight Connector 149">
+            <p:cNvPr id="156" name="Straight Connector 155">
               <a:extLst>
                 <a:ext uri="{FF2B5EF4-FFF2-40B4-BE49-F238E27FC236}">
-                  <a16:creationId xmlns:a16="http://schemas.microsoft.com/office/drawing/2014/main" id="{A5C1AA9D-F6C3-45F8-8EF2-65A29333F671}"/>
+                  <a16:creationId xmlns:a16="http://schemas.microsoft.com/office/drawing/2014/main" id="{4A5E2129-B58F-401B-84C8-766C2777479C}"/>
                 </a:ext>
               </a:extLst>
             </p:cNvPr>
@@ -7262,9 +7069,9 @@
             <p:nvPr/>
           </p:nvCxnSpPr>
           <p:spPr>
-            <a:xfrm flipH="1">
-              <a:off x="5782914" y="2735664"/>
-              <a:ext cx="2092230" cy="0"/>
+            <a:xfrm rot="5400000" flipH="1">
+              <a:off x="4407017" y="1034240"/>
+              <a:ext cx="2285956" cy="5212"/>
             </a:xfrm>
             <a:prstGeom prst="line">
               <a:avLst/>
@@ -7286,284 +7093,12 @@
           </p:style>
         </p:cxnSp>
       </p:grpSp>
-      <p:grpSp>
-        <p:nvGrpSpPr>
-          <p:cNvPr id="177" name="Group 176">
-            <a:extLst>
-              <a:ext uri="{FF2B5EF4-FFF2-40B4-BE49-F238E27FC236}">
-                <a16:creationId xmlns:a16="http://schemas.microsoft.com/office/drawing/2014/main" id="{AAC1F68D-05B8-4B51-8587-059500FE3478}"/>
-              </a:ext>
-            </a:extLst>
-          </p:cNvPr>
-          <p:cNvGrpSpPr/>
-          <p:nvPr/>
-        </p:nvGrpSpPr>
-        <p:grpSpPr>
-          <a:xfrm flipV="1">
-            <a:off x="5603834" y="4343679"/>
-            <a:ext cx="2092231" cy="410729"/>
-            <a:chOff x="5782914" y="2733762"/>
-            <a:chExt cx="2092231" cy="410729"/>
-          </a:xfrm>
-        </p:grpSpPr>
-        <p:cxnSp>
-          <p:nvCxnSpPr>
-            <p:cNvPr id="178" name="Connector: Elbow 177">
-              <a:extLst>
-                <a:ext uri="{FF2B5EF4-FFF2-40B4-BE49-F238E27FC236}">
-                  <a16:creationId xmlns:a16="http://schemas.microsoft.com/office/drawing/2014/main" id="{A750F747-27DB-43AF-84FE-43C67DC6B905}"/>
-                </a:ext>
-              </a:extLst>
-            </p:cNvPr>
-            <p:cNvCxnSpPr>
-              <a:cxnSpLocks/>
-            </p:cNvCxnSpPr>
-            <p:nvPr/>
-          </p:nvCxnSpPr>
-          <p:spPr>
-            <a:xfrm rot="5400000" flipH="1" flipV="1">
-              <a:off x="7560841" y="2827921"/>
-              <a:ext cx="408463" cy="220145"/>
-            </a:xfrm>
-            <a:prstGeom prst="bentConnector3">
-              <a:avLst>
-                <a:gd name="adj1" fmla="val -369"/>
-              </a:avLst>
-            </a:prstGeom>
-            <a:ln>
-              <a:tailEnd type="none"/>
-            </a:ln>
-          </p:spPr>
-          <p:style>
-            <a:lnRef idx="1">
-              <a:schemeClr val="accent1"/>
-            </a:lnRef>
-            <a:fillRef idx="0">
-              <a:schemeClr val="accent1"/>
-            </a:fillRef>
-            <a:effectRef idx="0">
-              <a:schemeClr val="accent1"/>
-            </a:effectRef>
-            <a:fontRef idx="minor">
-              <a:schemeClr val="tx1"/>
-            </a:fontRef>
-          </p:style>
-        </p:cxnSp>
-        <p:cxnSp>
-          <p:nvCxnSpPr>
-            <p:cNvPr id="180" name="Connector: Elbow 179">
-              <a:extLst>
-                <a:ext uri="{FF2B5EF4-FFF2-40B4-BE49-F238E27FC236}">
-                  <a16:creationId xmlns:a16="http://schemas.microsoft.com/office/drawing/2014/main" id="{7C40998A-C287-47CA-9A06-025F2A66B1EE}"/>
-                </a:ext>
-              </a:extLst>
-            </p:cNvPr>
-            <p:cNvCxnSpPr/>
-            <p:nvPr/>
-          </p:nvCxnSpPr>
-          <p:spPr>
-            <a:xfrm rot="16200000" flipH="1">
-              <a:off x="5682254" y="2836324"/>
-              <a:ext cx="408827" cy="207508"/>
-            </a:xfrm>
-            <a:prstGeom prst="bentConnector3">
-              <a:avLst>
-                <a:gd name="adj1" fmla="val 100325"/>
-              </a:avLst>
-            </a:prstGeom>
-            <a:ln>
-              <a:tailEnd type="triangle"/>
-            </a:ln>
-          </p:spPr>
-          <p:style>
-            <a:lnRef idx="1">
-              <a:schemeClr val="accent1"/>
-            </a:lnRef>
-            <a:fillRef idx="0">
-              <a:schemeClr val="accent1"/>
-            </a:fillRef>
-            <a:effectRef idx="0">
-              <a:schemeClr val="accent1"/>
-            </a:effectRef>
-            <a:fontRef idx="minor">
-              <a:schemeClr val="tx1"/>
-            </a:fontRef>
-          </p:style>
-        </p:cxnSp>
-        <p:cxnSp>
-          <p:nvCxnSpPr>
-            <p:cNvPr id="182" name="Straight Connector 181">
-              <a:extLst>
-                <a:ext uri="{FF2B5EF4-FFF2-40B4-BE49-F238E27FC236}">
-                  <a16:creationId xmlns:a16="http://schemas.microsoft.com/office/drawing/2014/main" id="{24155A40-B988-46ED-BC5E-C58015564533}"/>
-                </a:ext>
-              </a:extLst>
-            </p:cNvPr>
-            <p:cNvCxnSpPr>
-              <a:cxnSpLocks/>
-            </p:cNvCxnSpPr>
-            <p:nvPr/>
-          </p:nvCxnSpPr>
-          <p:spPr>
-            <a:xfrm flipH="1">
-              <a:off x="5782914" y="2735664"/>
-              <a:ext cx="2092230" cy="0"/>
-            </a:xfrm>
-            <a:prstGeom prst="line">
-              <a:avLst/>
-            </a:prstGeom>
-          </p:spPr>
-          <p:style>
-            <a:lnRef idx="1">
-              <a:schemeClr val="accent1"/>
-            </a:lnRef>
-            <a:fillRef idx="0">
-              <a:schemeClr val="accent1"/>
-            </a:fillRef>
-            <a:effectRef idx="0">
-              <a:schemeClr val="accent1"/>
-            </a:effectRef>
-            <a:fontRef idx="minor">
-              <a:schemeClr val="tx1"/>
-            </a:fontRef>
-          </p:style>
-        </p:cxnSp>
-      </p:grpSp>
-      <p:cxnSp>
-        <p:nvCxnSpPr>
-          <p:cNvPr id="99" name="Connector: Elbow 98">
-            <a:extLst>
-              <a:ext uri="{FF2B5EF4-FFF2-40B4-BE49-F238E27FC236}">
-                <a16:creationId xmlns:a16="http://schemas.microsoft.com/office/drawing/2014/main" id="{ADD4493A-5BBC-4D15-B581-A433EADD11C6}"/>
-              </a:ext>
-            </a:extLst>
-          </p:cNvPr>
-          <p:cNvCxnSpPr>
-            <a:cxnSpLocks/>
-          </p:cNvCxnSpPr>
-          <p:nvPr/>
-        </p:nvCxnSpPr>
-        <p:spPr>
-          <a:xfrm>
-            <a:off x="3685686" y="3429000"/>
-            <a:ext cx="935132" cy="302094"/>
-          </a:xfrm>
-          <a:prstGeom prst="bentConnector3">
-            <a:avLst>
-              <a:gd name="adj1" fmla="val 18424"/>
-            </a:avLst>
-          </a:prstGeom>
-          <a:ln>
-            <a:tailEnd type="none"/>
-          </a:ln>
-        </p:spPr>
-        <p:style>
-          <a:lnRef idx="1">
-            <a:schemeClr val="accent1"/>
-          </a:lnRef>
-          <a:fillRef idx="0">
-            <a:schemeClr val="accent1"/>
-          </a:fillRef>
-          <a:effectRef idx="0">
-            <a:schemeClr val="accent1"/>
-          </a:effectRef>
-          <a:fontRef idx="minor">
-            <a:schemeClr val="tx1"/>
-          </a:fontRef>
-        </p:style>
-      </p:cxnSp>
-      <p:cxnSp>
-        <p:nvCxnSpPr>
-          <p:cNvPr id="106" name="Connector: Elbow 105">
-            <a:extLst>
-              <a:ext uri="{FF2B5EF4-FFF2-40B4-BE49-F238E27FC236}">
-                <a16:creationId xmlns:a16="http://schemas.microsoft.com/office/drawing/2014/main" id="{16B1E8FE-E0AE-4FF6-AC2B-2BC0EAF5B4C8}"/>
-              </a:ext>
-            </a:extLst>
-          </p:cNvPr>
-          <p:cNvCxnSpPr>
-            <a:cxnSpLocks/>
-          </p:cNvCxnSpPr>
-          <p:nvPr/>
-        </p:nvCxnSpPr>
-        <p:spPr>
-          <a:xfrm flipV="1">
-            <a:off x="4444039" y="3429000"/>
-            <a:ext cx="1374708" cy="302094"/>
-          </a:xfrm>
-          <a:prstGeom prst="bentConnector3">
-            <a:avLst>
-              <a:gd name="adj1" fmla="val 79619"/>
-            </a:avLst>
-          </a:prstGeom>
-          <a:ln>
-            <a:tailEnd type="triangle"/>
-          </a:ln>
-        </p:spPr>
-        <p:style>
-          <a:lnRef idx="1">
-            <a:schemeClr val="accent1"/>
-          </a:lnRef>
-          <a:fillRef idx="0">
-            <a:schemeClr val="accent1"/>
-          </a:fillRef>
-          <a:effectRef idx="0">
-            <a:schemeClr val="accent1"/>
-          </a:effectRef>
-          <a:fontRef idx="minor">
-            <a:schemeClr val="tx1"/>
-          </a:fontRef>
-        </p:style>
-      </p:cxnSp>
       <p:sp>
         <p:nvSpPr>
-          <p:cNvPr id="122" name="TextBox 121">
-            <a:extLst>
-              <a:ext uri="{FF2B5EF4-FFF2-40B4-BE49-F238E27FC236}">
-                <a16:creationId xmlns:a16="http://schemas.microsoft.com/office/drawing/2014/main" id="{AAFB021B-F573-4955-A61C-CA26210E375D}"/>
-              </a:ext>
-            </a:extLst>
-          </p:cNvPr>
-          <p:cNvSpPr txBox="1"/>
-          <p:nvPr/>
-        </p:nvSpPr>
-        <p:spPr>
-          <a:xfrm>
-            <a:off x="4192463" y="3743997"/>
-            <a:ext cx="898003" cy="415498"/>
-          </a:xfrm>
-          <a:prstGeom prst="rect">
-            <a:avLst/>
-          </a:prstGeom>
-          <a:noFill/>
-        </p:spPr>
-        <p:txBody>
-          <a:bodyPr wrap="none" rtlCol="0">
-            <a:spAutoFit/>
-          </a:bodyPr>
-          <a:lstStyle/>
-          <a:p>
-            <a:pPr algn="ctr"/>
-            <a:r>
-              <a:rPr lang="en-US" sz="1050" dirty="0"/>
-              <a:t>User-defined</a:t>
-            </a:r>
-          </a:p>
-          <a:p>
-            <a:pPr algn="ctr"/>
-            <a:r>
-              <a:rPr lang="en-US" sz="1050" dirty="0"/>
-              <a:t>metadata</a:t>
-            </a:r>
-          </a:p>
-        </p:txBody>
-      </p:sp>
-      <p:sp>
-        <p:nvSpPr>
-          <p:cNvPr id="101" name="Rectangle 100">
-            <a:extLst>
-              <a:ext uri="{FF2B5EF4-FFF2-40B4-BE49-F238E27FC236}">
-                <a16:creationId xmlns:a16="http://schemas.microsoft.com/office/drawing/2014/main" id="{5BEE2C53-F970-432C-9EF0-B16395497DDB}"/>
+          <p:cNvPr id="157" name="Rectangle 156">
+            <a:extLst>
+              <a:ext uri="{FF2B5EF4-FFF2-40B4-BE49-F238E27FC236}">
+                <a16:creationId xmlns:a16="http://schemas.microsoft.com/office/drawing/2014/main" id="{63589632-E957-4E7E-BD65-62A7B15EAC3E}"/>
               </a:ext>
             </a:extLst>
           </p:cNvPr>
@@ -7571,16 +7106,17 @@
           <p:nvPr/>
         </p:nvSpPr>
         <p:spPr>
-          <a:xfrm rot="16200000">
-            <a:off x="10086062" y="4578852"/>
-            <a:ext cx="1022445" cy="368228"/>
+          <a:xfrm rot="16200000" flipH="1">
+            <a:off x="4447810" y="3416557"/>
+            <a:ext cx="1121778" cy="467855"/>
           </a:xfrm>
           <a:prstGeom prst="rect">
             <a:avLst/>
           </a:prstGeom>
           <a:solidFill>
-            <a:schemeClr val="bg2">
-              <a:lumMod val="90000"/>
+            <a:schemeClr val="accent4">
+              <a:lumMod val="40000"/>
+              <a:lumOff val="60000"/>
             </a:schemeClr>
           </a:solidFill>
         </p:spPr>
@@ -7606,41 +7142,203 @@
           <a:p>
             <a:pPr algn="ctr"/>
             <a:r>
-              <a:rPr lang="en-US" dirty="0">
+              <a:rPr lang="en-US" sz="1400" dirty="0">
                 <a:solidFill>
                   <a:schemeClr val="tx1"/>
                 </a:solidFill>
               </a:rPr>
-              <a:t>Host N</a:t>
+              <a:t>Net-to-host inline extern</a:t>
             </a:r>
           </a:p>
         </p:txBody>
       </p:sp>
       <p:cxnSp>
         <p:nvCxnSpPr>
-          <p:cNvPr id="102" name="Straight Arrow Connector 101">
-            <a:extLst>
-              <a:ext uri="{FF2B5EF4-FFF2-40B4-BE49-F238E27FC236}">
-                <a16:creationId xmlns:a16="http://schemas.microsoft.com/office/drawing/2014/main" id="{EB96FCB9-19D5-432B-B874-01E971C45BF4}"/>
+          <p:cNvPr id="158" name="Connector: Elbow 157">
+            <a:extLst>
+              <a:ext uri="{FF2B5EF4-FFF2-40B4-BE49-F238E27FC236}">
+                <a16:creationId xmlns:a16="http://schemas.microsoft.com/office/drawing/2014/main" id="{9AD9CF24-6711-4BF0-AED5-D7D1F9DB12EB}"/>
               </a:ext>
             </a:extLst>
           </p:cNvPr>
           <p:cNvCxnSpPr>
             <a:cxnSpLocks/>
-            <a:endCxn id="101" idx="0"/>
+          </p:cNvCxnSpPr>
+          <p:nvPr/>
+        </p:nvCxnSpPr>
+        <p:spPr>
+          <a:xfrm flipH="1">
+            <a:off x="5008699" y="4661491"/>
+            <a:ext cx="592233" cy="119599"/>
+          </a:xfrm>
+          <a:prstGeom prst="bentConnector3">
+            <a:avLst>
+              <a:gd name="adj1" fmla="val -180"/>
+            </a:avLst>
+          </a:prstGeom>
+          <a:ln>
+            <a:tailEnd type="none"/>
+          </a:ln>
+        </p:spPr>
+        <p:style>
+          <a:lnRef idx="1">
+            <a:schemeClr val="accent1"/>
+          </a:lnRef>
+          <a:fillRef idx="0">
+            <a:schemeClr val="accent1"/>
+          </a:fillRef>
+          <a:effectRef idx="0">
+            <a:schemeClr val="accent1"/>
+          </a:effectRef>
+          <a:fontRef idx="minor">
+            <a:schemeClr val="tx1"/>
+          </a:fontRef>
+        </p:style>
+      </p:cxnSp>
+      <p:cxnSp>
+        <p:nvCxnSpPr>
+          <p:cNvPr id="159" name="Connector: Elbow 158">
+            <a:extLst>
+              <a:ext uri="{FF2B5EF4-FFF2-40B4-BE49-F238E27FC236}">
+                <a16:creationId xmlns:a16="http://schemas.microsoft.com/office/drawing/2014/main" id="{5221A856-95B9-4D0D-9AEA-E2DED9F7DABF}"/>
+              </a:ext>
+            </a:extLst>
+          </p:cNvPr>
+          <p:cNvCxnSpPr>
+            <a:cxnSpLocks/>
+          </p:cNvCxnSpPr>
+          <p:nvPr/>
+        </p:nvCxnSpPr>
+        <p:spPr>
+          <a:xfrm rot="10800000" flipH="1" flipV="1">
+            <a:off x="5008698" y="2484867"/>
+            <a:ext cx="595249" cy="133072"/>
+          </a:xfrm>
+          <a:prstGeom prst="bentConnector3">
+            <a:avLst>
+              <a:gd name="adj1" fmla="val 99925"/>
+            </a:avLst>
+          </a:prstGeom>
+          <a:ln>
+            <a:tailEnd type="triangle"/>
+          </a:ln>
+        </p:spPr>
+        <p:style>
+          <a:lnRef idx="1">
+            <a:schemeClr val="accent1"/>
+          </a:lnRef>
+          <a:fillRef idx="0">
+            <a:schemeClr val="accent1"/>
+          </a:fillRef>
+          <a:effectRef idx="0">
+            <a:schemeClr val="accent1"/>
+          </a:effectRef>
+          <a:fontRef idx="minor">
+            <a:schemeClr val="tx1"/>
+          </a:fontRef>
+        </p:style>
+      </p:cxnSp>
+      <p:cxnSp>
+        <p:nvCxnSpPr>
+          <p:cNvPr id="160" name="Straight Connector 159">
+            <a:extLst>
+              <a:ext uri="{FF2B5EF4-FFF2-40B4-BE49-F238E27FC236}">
+                <a16:creationId xmlns:a16="http://schemas.microsoft.com/office/drawing/2014/main" id="{70746428-D555-43AA-9FBF-C46ACFCA17FD}"/>
+              </a:ext>
+            </a:extLst>
+          </p:cNvPr>
+          <p:cNvCxnSpPr>
+            <a:cxnSpLocks/>
+            <a:stCxn id="157" idx="1"/>
+          </p:cNvCxnSpPr>
+          <p:nvPr/>
+        </p:nvCxnSpPr>
+        <p:spPr>
+          <a:xfrm flipH="1" flipV="1">
+            <a:off x="5008699" y="2484867"/>
+            <a:ext cx="0" cy="604729"/>
+          </a:xfrm>
+          <a:prstGeom prst="line">
+            <a:avLst/>
+          </a:prstGeom>
+        </p:spPr>
+        <p:style>
+          <a:lnRef idx="1">
+            <a:schemeClr val="accent1"/>
+          </a:lnRef>
+          <a:fillRef idx="0">
+            <a:schemeClr val="accent1"/>
+          </a:fillRef>
+          <a:effectRef idx="0">
+            <a:schemeClr val="accent1"/>
+          </a:effectRef>
+          <a:fontRef idx="minor">
+            <a:schemeClr val="tx1"/>
+          </a:fontRef>
+        </p:style>
+      </p:cxnSp>
+      <p:cxnSp>
+        <p:nvCxnSpPr>
+          <p:cNvPr id="161" name="Straight Connector 160">
+            <a:extLst>
+              <a:ext uri="{FF2B5EF4-FFF2-40B4-BE49-F238E27FC236}">
+                <a16:creationId xmlns:a16="http://schemas.microsoft.com/office/drawing/2014/main" id="{B6ED4961-067E-44B0-A854-66E8C044105E}"/>
+              </a:ext>
+            </a:extLst>
+          </p:cNvPr>
+          <p:cNvCxnSpPr>
+            <a:cxnSpLocks/>
+            <a:endCxn id="157" idx="3"/>
+          </p:cNvCxnSpPr>
+          <p:nvPr/>
+        </p:nvCxnSpPr>
+        <p:spPr>
+          <a:xfrm flipH="1" flipV="1">
+            <a:off x="5008699" y="4211374"/>
+            <a:ext cx="0" cy="569716"/>
+          </a:xfrm>
+          <a:prstGeom prst="line">
+            <a:avLst/>
+          </a:prstGeom>
+        </p:spPr>
+        <p:style>
+          <a:lnRef idx="1">
+            <a:schemeClr val="accent1"/>
+          </a:lnRef>
+          <a:fillRef idx="0">
+            <a:schemeClr val="accent1"/>
+          </a:fillRef>
+          <a:effectRef idx="0">
+            <a:schemeClr val="accent1"/>
+          </a:effectRef>
+          <a:fontRef idx="minor">
+            <a:schemeClr val="tx1"/>
+          </a:fontRef>
+        </p:style>
+      </p:cxnSp>
+      <p:cxnSp>
+        <p:nvCxnSpPr>
+          <p:cNvPr id="104" name="Straight Arrow Connector 103">
+            <a:extLst>
+              <a:ext uri="{FF2B5EF4-FFF2-40B4-BE49-F238E27FC236}">
+                <a16:creationId xmlns:a16="http://schemas.microsoft.com/office/drawing/2014/main" id="{C456DBB3-732A-47A6-BC0F-02D56B7BFF6B}"/>
+              </a:ext>
+            </a:extLst>
+          </p:cNvPr>
+          <p:cNvCxnSpPr>
+            <a:cxnSpLocks/>
           </p:cNvCxnSpPr>
           <p:nvPr/>
         </p:nvCxnSpPr>
         <p:spPr>
           <a:xfrm>
-            <a:off x="10101319" y="4762966"/>
-            <a:ext cx="311852" cy="0"/>
+            <a:off x="7009006" y="4933090"/>
+            <a:ext cx="307223" cy="0"/>
           </a:xfrm>
           <a:prstGeom prst="straightConnector1">
             <a:avLst/>
           </a:prstGeom>
           <a:ln>
-            <a:headEnd type="triangle"/>
             <a:tailEnd type="triangle"/>
           </a:ln>
         </p:spPr>
@@ -7661,46 +7359,10 @@
       </p:cxnSp>
       <p:sp>
         <p:nvSpPr>
-          <p:cNvPr id="107" name="TextBox 106">
-            <a:extLst>
-              <a:ext uri="{FF2B5EF4-FFF2-40B4-BE49-F238E27FC236}">
-                <a16:creationId xmlns:a16="http://schemas.microsoft.com/office/drawing/2014/main" id="{A6F5D3B7-9CD0-4224-9762-C76C79E1371B}"/>
-              </a:ext>
-            </a:extLst>
-          </p:cNvPr>
-          <p:cNvSpPr txBox="1"/>
-          <p:nvPr/>
-        </p:nvSpPr>
-        <p:spPr>
-          <a:xfrm rot="16200000">
-            <a:off x="10444675" y="4005660"/>
-            <a:ext cx="238248" cy="253916"/>
-          </a:xfrm>
-          <a:prstGeom prst="rect">
-            <a:avLst/>
-          </a:prstGeom>
-          <a:noFill/>
-        </p:spPr>
-        <p:txBody>
-          <a:bodyPr wrap="square" rtlCol="0">
-            <a:spAutoFit/>
-          </a:bodyPr>
-          <a:lstStyle/>
-          <a:p>
-            <a:pPr algn="ctr"/>
-            <a:r>
-              <a:rPr lang="en-US" sz="1050" dirty="0"/>
-              <a:t>…</a:t>
-            </a:r>
-          </a:p>
-        </p:txBody>
-      </p:sp>
-      <p:sp>
-        <p:nvSpPr>
-          <p:cNvPr id="2" name="Freeform: Shape 1">
-            <a:extLst>
-              <a:ext uri="{FF2B5EF4-FFF2-40B4-BE49-F238E27FC236}">
-                <a16:creationId xmlns:a16="http://schemas.microsoft.com/office/drawing/2014/main" id="{00F816EC-A0CB-4148-88E8-08B4A0808DCA}"/>
+          <p:cNvPr id="103" name="Freeform: Shape 102">
+            <a:extLst>
+              <a:ext uri="{FF2B5EF4-FFF2-40B4-BE49-F238E27FC236}">
+                <a16:creationId xmlns:a16="http://schemas.microsoft.com/office/drawing/2014/main" id="{4A35EDA1-0A85-40E8-B400-8872957932A3}"/>
               </a:ext>
             </a:extLst>
           </p:cNvPr>
@@ -7709,8 +7371,8 @@
         </p:nvSpPr>
         <p:spPr>
           <a:xfrm>
-            <a:off x="1504797" y="3088478"/>
-            <a:ext cx="9636616" cy="1956217"/>
+            <a:off x="1538233" y="2301524"/>
+            <a:ext cx="8710044" cy="2730023"/>
           </a:xfrm>
           <a:custGeom>
             <a:avLst/>
@@ -8013,6 +7675,776 @@
               <a:gd name="connsiteY9" fmla="*/ 109827 h 1919616"/>
               <a:gd name="connsiteX10" fmla="*/ 9636616 w 9636616"/>
               <a:gd name="connsiteY10" fmla="*/ 137866 h 1919616"/>
+              <a:gd name="connsiteX0" fmla="*/ 9534678 w 9636616"/>
+              <a:gd name="connsiteY0" fmla="*/ 2349180 h 2703554"/>
+              <a:gd name="connsiteX1" fmla="*/ 7591578 w 9636616"/>
+              <a:gd name="connsiteY1" fmla="*/ 2558730 h 2703554"/>
+              <a:gd name="connsiteX2" fmla="*/ 5245548 w 9636616"/>
+              <a:gd name="connsiteY2" fmla="*/ 7492 h 2703554"/>
+              <a:gd name="connsiteX3" fmla="*/ 4162578 w 9636616"/>
+              <a:gd name="connsiteY3" fmla="*/ 1777680 h 2703554"/>
+              <a:gd name="connsiteX4" fmla="*/ 6115203 w 9636616"/>
+              <a:gd name="connsiteY4" fmla="*/ 1778036 h 2703554"/>
+              <a:gd name="connsiteX5" fmla="*/ 6077103 w 9636616"/>
+              <a:gd name="connsiteY5" fmla="*/ 2520630 h 2703554"/>
+              <a:gd name="connsiteX6" fmla="*/ 1228878 w 9636616"/>
+              <a:gd name="connsiteY6" fmla="*/ 2558730 h 2703554"/>
+              <a:gd name="connsiteX7" fmla="*/ 153 w 9636616"/>
+              <a:gd name="connsiteY7" fmla="*/ 1897961 h 2703554"/>
+              <a:gd name="connsiteX8" fmla="*/ 981228 w 9636616"/>
+              <a:gd name="connsiteY8" fmla="*/ 879161 h 2703554"/>
+              <a:gd name="connsiteX9" fmla="*/ 5429403 w 9636616"/>
+              <a:gd name="connsiteY9" fmla="*/ 851122 h 2703554"/>
+              <a:gd name="connsiteX10" fmla="*/ 9636616 w 9636616"/>
+              <a:gd name="connsiteY10" fmla="*/ 879161 h 2703554"/>
+              <a:gd name="connsiteX0" fmla="*/ 9534678 w 9636616"/>
+              <a:gd name="connsiteY0" fmla="*/ 2342113 h 2696487"/>
+              <a:gd name="connsiteX1" fmla="*/ 7591578 w 9636616"/>
+              <a:gd name="connsiteY1" fmla="*/ 2551663 h 2696487"/>
+              <a:gd name="connsiteX2" fmla="*/ 5245548 w 9636616"/>
+              <a:gd name="connsiteY2" fmla="*/ 425 h 2696487"/>
+              <a:gd name="connsiteX3" fmla="*/ 4981285 w 9636616"/>
+              <a:gd name="connsiteY3" fmla="*/ 2344463 h 2696487"/>
+              <a:gd name="connsiteX4" fmla="*/ 6115203 w 9636616"/>
+              <a:gd name="connsiteY4" fmla="*/ 1770969 h 2696487"/>
+              <a:gd name="connsiteX5" fmla="*/ 6077103 w 9636616"/>
+              <a:gd name="connsiteY5" fmla="*/ 2513563 h 2696487"/>
+              <a:gd name="connsiteX6" fmla="*/ 1228878 w 9636616"/>
+              <a:gd name="connsiteY6" fmla="*/ 2551663 h 2696487"/>
+              <a:gd name="connsiteX7" fmla="*/ 153 w 9636616"/>
+              <a:gd name="connsiteY7" fmla="*/ 1890894 h 2696487"/>
+              <a:gd name="connsiteX8" fmla="*/ 981228 w 9636616"/>
+              <a:gd name="connsiteY8" fmla="*/ 872094 h 2696487"/>
+              <a:gd name="connsiteX9" fmla="*/ 5429403 w 9636616"/>
+              <a:gd name="connsiteY9" fmla="*/ 844055 h 2696487"/>
+              <a:gd name="connsiteX10" fmla="*/ 9636616 w 9636616"/>
+              <a:gd name="connsiteY10" fmla="*/ 872094 h 2696487"/>
+              <a:gd name="connsiteX0" fmla="*/ 9534678 w 9636616"/>
+              <a:gd name="connsiteY0" fmla="*/ 2342142 h 2696516"/>
+              <a:gd name="connsiteX1" fmla="*/ 7591578 w 9636616"/>
+              <a:gd name="connsiteY1" fmla="*/ 2551692 h 2696516"/>
+              <a:gd name="connsiteX2" fmla="*/ 5245548 w 9636616"/>
+              <a:gd name="connsiteY2" fmla="*/ 454 h 2696516"/>
+              <a:gd name="connsiteX3" fmla="*/ 4981285 w 9636616"/>
+              <a:gd name="connsiteY3" fmla="*/ 2344492 h 2696516"/>
+              <a:gd name="connsiteX4" fmla="*/ 2829742 w 9636616"/>
+              <a:gd name="connsiteY4" fmla="*/ 2616122 h 2696516"/>
+              <a:gd name="connsiteX5" fmla="*/ 6077103 w 9636616"/>
+              <a:gd name="connsiteY5" fmla="*/ 2513592 h 2696516"/>
+              <a:gd name="connsiteX6" fmla="*/ 1228878 w 9636616"/>
+              <a:gd name="connsiteY6" fmla="*/ 2551692 h 2696516"/>
+              <a:gd name="connsiteX7" fmla="*/ 153 w 9636616"/>
+              <a:gd name="connsiteY7" fmla="*/ 1890923 h 2696516"/>
+              <a:gd name="connsiteX8" fmla="*/ 981228 w 9636616"/>
+              <a:gd name="connsiteY8" fmla="*/ 872123 h 2696516"/>
+              <a:gd name="connsiteX9" fmla="*/ 5429403 w 9636616"/>
+              <a:gd name="connsiteY9" fmla="*/ 844084 h 2696516"/>
+              <a:gd name="connsiteX10" fmla="*/ 9636616 w 9636616"/>
+              <a:gd name="connsiteY10" fmla="*/ 872123 h 2696516"/>
+              <a:gd name="connsiteX0" fmla="*/ 9534545 w 9636483"/>
+              <a:gd name="connsiteY0" fmla="*/ 2342142 h 2696516"/>
+              <a:gd name="connsiteX1" fmla="*/ 7591445 w 9636483"/>
+              <a:gd name="connsiteY1" fmla="*/ 2551692 h 2696516"/>
+              <a:gd name="connsiteX2" fmla="*/ 5245415 w 9636483"/>
+              <a:gd name="connsiteY2" fmla="*/ 454 h 2696516"/>
+              <a:gd name="connsiteX3" fmla="*/ 4981152 w 9636483"/>
+              <a:gd name="connsiteY3" fmla="*/ 2344492 h 2696516"/>
+              <a:gd name="connsiteX4" fmla="*/ 2829609 w 9636483"/>
+              <a:gd name="connsiteY4" fmla="*/ 2616122 h 2696516"/>
+              <a:gd name="connsiteX5" fmla="*/ 2259882 w 9636483"/>
+              <a:gd name="connsiteY5" fmla="*/ 2638796 h 2696516"/>
+              <a:gd name="connsiteX6" fmla="*/ 1228745 w 9636483"/>
+              <a:gd name="connsiteY6" fmla="*/ 2551692 h 2696516"/>
+              <a:gd name="connsiteX7" fmla="*/ 20 w 9636483"/>
+              <a:gd name="connsiteY7" fmla="*/ 1890923 h 2696516"/>
+              <a:gd name="connsiteX8" fmla="*/ 981095 w 9636483"/>
+              <a:gd name="connsiteY8" fmla="*/ 872123 h 2696516"/>
+              <a:gd name="connsiteX9" fmla="*/ 5429270 w 9636483"/>
+              <a:gd name="connsiteY9" fmla="*/ 844084 h 2696516"/>
+              <a:gd name="connsiteX10" fmla="*/ 9636483 w 9636483"/>
+              <a:gd name="connsiteY10" fmla="*/ 872123 h 2696516"/>
+              <a:gd name="connsiteX0" fmla="*/ 9610802 w 9712740"/>
+              <a:gd name="connsiteY0" fmla="*/ 2342142 h 2696516"/>
+              <a:gd name="connsiteX1" fmla="*/ 7667702 w 9712740"/>
+              <a:gd name="connsiteY1" fmla="*/ 2551692 h 2696516"/>
+              <a:gd name="connsiteX2" fmla="*/ 5321672 w 9712740"/>
+              <a:gd name="connsiteY2" fmla="*/ 454 h 2696516"/>
+              <a:gd name="connsiteX3" fmla="*/ 5057409 w 9712740"/>
+              <a:gd name="connsiteY3" fmla="*/ 2344492 h 2696516"/>
+              <a:gd name="connsiteX4" fmla="*/ 2905866 w 9712740"/>
+              <a:gd name="connsiteY4" fmla="*/ 2616122 h 2696516"/>
+              <a:gd name="connsiteX5" fmla="*/ 2336139 w 9712740"/>
+              <a:gd name="connsiteY5" fmla="*/ 2638796 h 2696516"/>
+              <a:gd name="connsiteX6" fmla="*/ 1305002 w 9712740"/>
+              <a:gd name="connsiteY6" fmla="*/ 2551692 h 2696516"/>
+              <a:gd name="connsiteX7" fmla="*/ 76277 w 9712740"/>
+              <a:gd name="connsiteY7" fmla="*/ 1890923 h 2696516"/>
+              <a:gd name="connsiteX8" fmla="*/ 3672961 w 9712740"/>
+              <a:gd name="connsiteY8" fmla="*/ 68734 h 2696516"/>
+              <a:gd name="connsiteX9" fmla="*/ 5505527 w 9712740"/>
+              <a:gd name="connsiteY9" fmla="*/ 844084 h 2696516"/>
+              <a:gd name="connsiteX10" fmla="*/ 9712740 w 9712740"/>
+              <a:gd name="connsiteY10" fmla="*/ 872123 h 2696516"/>
+              <a:gd name="connsiteX0" fmla="*/ 9610802 w 9712740"/>
+              <a:gd name="connsiteY0" fmla="*/ 2342142 h 2696516"/>
+              <a:gd name="connsiteX1" fmla="*/ 7667702 w 9712740"/>
+              <a:gd name="connsiteY1" fmla="*/ 2551692 h 2696516"/>
+              <a:gd name="connsiteX2" fmla="*/ 5321672 w 9712740"/>
+              <a:gd name="connsiteY2" fmla="*/ 454 h 2696516"/>
+              <a:gd name="connsiteX3" fmla="*/ 5057409 w 9712740"/>
+              <a:gd name="connsiteY3" fmla="*/ 2344492 h 2696516"/>
+              <a:gd name="connsiteX4" fmla="*/ 2905866 w 9712740"/>
+              <a:gd name="connsiteY4" fmla="*/ 2616122 h 2696516"/>
+              <a:gd name="connsiteX5" fmla="*/ 2336139 w 9712740"/>
+              <a:gd name="connsiteY5" fmla="*/ 2638796 h 2696516"/>
+              <a:gd name="connsiteX6" fmla="*/ 1305002 w 9712740"/>
+              <a:gd name="connsiteY6" fmla="*/ 2551692 h 2696516"/>
+              <a:gd name="connsiteX7" fmla="*/ 76277 w 9712740"/>
+              <a:gd name="connsiteY7" fmla="*/ 1890923 h 2696516"/>
+              <a:gd name="connsiteX8" fmla="*/ 3672961 w 9712740"/>
+              <a:gd name="connsiteY8" fmla="*/ 68734 h 2696516"/>
+              <a:gd name="connsiteX9" fmla="*/ 5250346 w 9712740"/>
+              <a:gd name="connsiteY9" fmla="*/ 2471730 h 2696516"/>
+              <a:gd name="connsiteX10" fmla="*/ 9712740 w 9712740"/>
+              <a:gd name="connsiteY10" fmla="*/ 872123 h 2696516"/>
+              <a:gd name="connsiteX0" fmla="*/ 9610802 w 9712740"/>
+              <a:gd name="connsiteY0" fmla="*/ 2342142 h 2696516"/>
+              <a:gd name="connsiteX1" fmla="*/ 7667702 w 9712740"/>
+              <a:gd name="connsiteY1" fmla="*/ 2551692 h 2696516"/>
+              <a:gd name="connsiteX2" fmla="*/ 5321672 w 9712740"/>
+              <a:gd name="connsiteY2" fmla="*/ 454 h 2696516"/>
+              <a:gd name="connsiteX3" fmla="*/ 5057409 w 9712740"/>
+              <a:gd name="connsiteY3" fmla="*/ 2344492 h 2696516"/>
+              <a:gd name="connsiteX4" fmla="*/ 2905866 w 9712740"/>
+              <a:gd name="connsiteY4" fmla="*/ 2616122 h 2696516"/>
+              <a:gd name="connsiteX5" fmla="*/ 2336139 w 9712740"/>
+              <a:gd name="connsiteY5" fmla="*/ 2638796 h 2696516"/>
+              <a:gd name="connsiteX6" fmla="*/ 1305002 w 9712740"/>
+              <a:gd name="connsiteY6" fmla="*/ 2551692 h 2696516"/>
+              <a:gd name="connsiteX7" fmla="*/ 76277 w 9712740"/>
+              <a:gd name="connsiteY7" fmla="*/ 1890923 h 2696516"/>
+              <a:gd name="connsiteX8" fmla="*/ 3672961 w 9712740"/>
+              <a:gd name="connsiteY8" fmla="*/ 68734 h 2696516"/>
+              <a:gd name="connsiteX9" fmla="*/ 4835676 w 9712740"/>
+              <a:gd name="connsiteY9" fmla="*/ 2461297 h 2696516"/>
+              <a:gd name="connsiteX10" fmla="*/ 9712740 w 9712740"/>
+              <a:gd name="connsiteY10" fmla="*/ 872123 h 2696516"/>
+              <a:gd name="connsiteX0" fmla="*/ 9633454 w 9735392"/>
+              <a:gd name="connsiteY0" fmla="*/ 2342142 h 2696516"/>
+              <a:gd name="connsiteX1" fmla="*/ 7690354 w 9735392"/>
+              <a:gd name="connsiteY1" fmla="*/ 2551692 h 2696516"/>
+              <a:gd name="connsiteX2" fmla="*/ 5344324 w 9735392"/>
+              <a:gd name="connsiteY2" fmla="*/ 454 h 2696516"/>
+              <a:gd name="connsiteX3" fmla="*/ 5080061 w 9735392"/>
+              <a:gd name="connsiteY3" fmla="*/ 2344492 h 2696516"/>
+              <a:gd name="connsiteX4" fmla="*/ 2928518 w 9735392"/>
+              <a:gd name="connsiteY4" fmla="*/ 2616122 h 2696516"/>
+              <a:gd name="connsiteX5" fmla="*/ 2358791 w 9735392"/>
+              <a:gd name="connsiteY5" fmla="*/ 2638796 h 2696516"/>
+              <a:gd name="connsiteX6" fmla="*/ 1327654 w 9735392"/>
+              <a:gd name="connsiteY6" fmla="*/ 2551692 h 2696516"/>
+              <a:gd name="connsiteX7" fmla="*/ 98929 w 9735392"/>
+              <a:gd name="connsiteY7" fmla="*/ 1890923 h 2696516"/>
+              <a:gd name="connsiteX8" fmla="*/ 4131548 w 9735392"/>
+              <a:gd name="connsiteY8" fmla="*/ 26999 h 2696516"/>
+              <a:gd name="connsiteX9" fmla="*/ 4858328 w 9735392"/>
+              <a:gd name="connsiteY9" fmla="*/ 2461297 h 2696516"/>
+              <a:gd name="connsiteX10" fmla="*/ 9735392 w 9735392"/>
+              <a:gd name="connsiteY10" fmla="*/ 872123 h 2696516"/>
+              <a:gd name="connsiteX0" fmla="*/ 9166593 w 9268531"/>
+              <a:gd name="connsiteY0" fmla="*/ 2366354 h 2725753"/>
+              <a:gd name="connsiteX1" fmla="*/ 7223493 w 9268531"/>
+              <a:gd name="connsiteY1" fmla="*/ 2575904 h 2725753"/>
+              <a:gd name="connsiteX2" fmla="*/ 4877463 w 9268531"/>
+              <a:gd name="connsiteY2" fmla="*/ 24666 h 2725753"/>
+              <a:gd name="connsiteX3" fmla="*/ 4613200 w 9268531"/>
+              <a:gd name="connsiteY3" fmla="*/ 2368704 h 2725753"/>
+              <a:gd name="connsiteX4" fmla="*/ 2461657 w 9268531"/>
+              <a:gd name="connsiteY4" fmla="*/ 2640334 h 2725753"/>
+              <a:gd name="connsiteX5" fmla="*/ 1891930 w 9268531"/>
+              <a:gd name="connsiteY5" fmla="*/ 2663008 h 2725753"/>
+              <a:gd name="connsiteX6" fmla="*/ 860793 w 9268531"/>
+              <a:gd name="connsiteY6" fmla="*/ 2575904 h 2725753"/>
+              <a:gd name="connsiteX7" fmla="*/ 131798 w 9268531"/>
+              <a:gd name="connsiteY7" fmla="*/ 965675 h 2725753"/>
+              <a:gd name="connsiteX8" fmla="*/ 3664687 w 9268531"/>
+              <a:gd name="connsiteY8" fmla="*/ 51211 h 2725753"/>
+              <a:gd name="connsiteX9" fmla="*/ 4391467 w 9268531"/>
+              <a:gd name="connsiteY9" fmla="*/ 2485509 h 2725753"/>
+              <a:gd name="connsiteX10" fmla="*/ 9268531 w 9268531"/>
+              <a:gd name="connsiteY10" fmla="*/ 896335 h 2725753"/>
+              <a:gd name="connsiteX0" fmla="*/ 9535603 w 9637541"/>
+              <a:gd name="connsiteY0" fmla="*/ 2364660 h 2719034"/>
+              <a:gd name="connsiteX1" fmla="*/ 7592503 w 9637541"/>
+              <a:gd name="connsiteY1" fmla="*/ 2574210 h 2719034"/>
+              <a:gd name="connsiteX2" fmla="*/ 5246473 w 9637541"/>
+              <a:gd name="connsiteY2" fmla="*/ 22972 h 2719034"/>
+              <a:gd name="connsiteX3" fmla="*/ 4982210 w 9637541"/>
+              <a:gd name="connsiteY3" fmla="*/ 2367010 h 2719034"/>
+              <a:gd name="connsiteX4" fmla="*/ 2830667 w 9637541"/>
+              <a:gd name="connsiteY4" fmla="*/ 2638640 h 2719034"/>
+              <a:gd name="connsiteX5" fmla="*/ 2260940 w 9637541"/>
+              <a:gd name="connsiteY5" fmla="*/ 2661314 h 2719034"/>
+              <a:gd name="connsiteX6" fmla="*/ 209078 w 9637541"/>
+              <a:gd name="connsiteY6" fmla="*/ 2365538 h 2719034"/>
+              <a:gd name="connsiteX7" fmla="*/ 500808 w 9637541"/>
+              <a:gd name="connsiteY7" fmla="*/ 963981 h 2719034"/>
+              <a:gd name="connsiteX8" fmla="*/ 4033697 w 9637541"/>
+              <a:gd name="connsiteY8" fmla="*/ 49517 h 2719034"/>
+              <a:gd name="connsiteX9" fmla="*/ 4760477 w 9637541"/>
+              <a:gd name="connsiteY9" fmla="*/ 2483815 h 2719034"/>
+              <a:gd name="connsiteX10" fmla="*/ 9637541 w 9637541"/>
+              <a:gd name="connsiteY10" fmla="*/ 894641 h 2719034"/>
+              <a:gd name="connsiteX0" fmla="*/ 9501242 w 9603180"/>
+              <a:gd name="connsiteY0" fmla="*/ 2364660 h 2719034"/>
+              <a:gd name="connsiteX1" fmla="*/ 7558142 w 9603180"/>
+              <a:gd name="connsiteY1" fmla="*/ 2574210 h 2719034"/>
+              <a:gd name="connsiteX2" fmla="*/ 5212112 w 9603180"/>
+              <a:gd name="connsiteY2" fmla="*/ 22972 h 2719034"/>
+              <a:gd name="connsiteX3" fmla="*/ 4947849 w 9603180"/>
+              <a:gd name="connsiteY3" fmla="*/ 2367010 h 2719034"/>
+              <a:gd name="connsiteX4" fmla="*/ 2796306 w 9603180"/>
+              <a:gd name="connsiteY4" fmla="*/ 2638640 h 2719034"/>
+              <a:gd name="connsiteX5" fmla="*/ 1726848 w 9603180"/>
+              <a:gd name="connsiteY5" fmla="*/ 2630013 h 2719034"/>
+              <a:gd name="connsiteX6" fmla="*/ 174717 w 9603180"/>
+              <a:gd name="connsiteY6" fmla="*/ 2365538 h 2719034"/>
+              <a:gd name="connsiteX7" fmla="*/ 466447 w 9603180"/>
+              <a:gd name="connsiteY7" fmla="*/ 963981 h 2719034"/>
+              <a:gd name="connsiteX8" fmla="*/ 3999336 w 9603180"/>
+              <a:gd name="connsiteY8" fmla="*/ 49517 h 2719034"/>
+              <a:gd name="connsiteX9" fmla="*/ 4726116 w 9603180"/>
+              <a:gd name="connsiteY9" fmla="*/ 2483815 h 2719034"/>
+              <a:gd name="connsiteX10" fmla="*/ 9603180 w 9603180"/>
+              <a:gd name="connsiteY10" fmla="*/ 894641 h 2719034"/>
+              <a:gd name="connsiteX0" fmla="*/ 9501242 w 9603180"/>
+              <a:gd name="connsiteY0" fmla="*/ 2364660 h 2719034"/>
+              <a:gd name="connsiteX1" fmla="*/ 7558142 w 9603180"/>
+              <a:gd name="connsiteY1" fmla="*/ 2574210 h 2719034"/>
+              <a:gd name="connsiteX2" fmla="*/ 5212112 w 9603180"/>
+              <a:gd name="connsiteY2" fmla="*/ 22972 h 2719034"/>
+              <a:gd name="connsiteX3" fmla="*/ 4947849 w 9603180"/>
+              <a:gd name="connsiteY3" fmla="*/ 2367010 h 2719034"/>
+              <a:gd name="connsiteX4" fmla="*/ 2838836 w 9603180"/>
+              <a:gd name="connsiteY4" fmla="*/ 2690808 h 2719034"/>
+              <a:gd name="connsiteX5" fmla="*/ 1726848 w 9603180"/>
+              <a:gd name="connsiteY5" fmla="*/ 2630013 h 2719034"/>
+              <a:gd name="connsiteX6" fmla="*/ 174717 w 9603180"/>
+              <a:gd name="connsiteY6" fmla="*/ 2365538 h 2719034"/>
+              <a:gd name="connsiteX7" fmla="*/ 466447 w 9603180"/>
+              <a:gd name="connsiteY7" fmla="*/ 963981 h 2719034"/>
+              <a:gd name="connsiteX8" fmla="*/ 3999336 w 9603180"/>
+              <a:gd name="connsiteY8" fmla="*/ 49517 h 2719034"/>
+              <a:gd name="connsiteX9" fmla="*/ 4726116 w 9603180"/>
+              <a:gd name="connsiteY9" fmla="*/ 2483815 h 2719034"/>
+              <a:gd name="connsiteX10" fmla="*/ 9603180 w 9603180"/>
+              <a:gd name="connsiteY10" fmla="*/ 894641 h 2719034"/>
+              <a:gd name="connsiteX0" fmla="*/ 9501242 w 9603180"/>
+              <a:gd name="connsiteY0" fmla="*/ 2364660 h 2719034"/>
+              <a:gd name="connsiteX1" fmla="*/ 7558142 w 9603180"/>
+              <a:gd name="connsiteY1" fmla="*/ 2574210 h 2719034"/>
+              <a:gd name="connsiteX2" fmla="*/ 5212112 w 9603180"/>
+              <a:gd name="connsiteY2" fmla="*/ 22972 h 2719034"/>
+              <a:gd name="connsiteX3" fmla="*/ 4947849 w 9603180"/>
+              <a:gd name="connsiteY3" fmla="*/ 2367010 h 2719034"/>
+              <a:gd name="connsiteX4" fmla="*/ 2838836 w 9603180"/>
+              <a:gd name="connsiteY4" fmla="*/ 2690808 h 2719034"/>
+              <a:gd name="connsiteX5" fmla="*/ 1726848 w 9603180"/>
+              <a:gd name="connsiteY5" fmla="*/ 2630013 h 2719034"/>
+              <a:gd name="connsiteX6" fmla="*/ 174717 w 9603180"/>
+              <a:gd name="connsiteY6" fmla="*/ 2365538 h 2719034"/>
+              <a:gd name="connsiteX7" fmla="*/ 466447 w 9603180"/>
+              <a:gd name="connsiteY7" fmla="*/ 963981 h 2719034"/>
+              <a:gd name="connsiteX8" fmla="*/ 3999336 w 9603180"/>
+              <a:gd name="connsiteY8" fmla="*/ 49517 h 2719034"/>
+              <a:gd name="connsiteX9" fmla="*/ 4726116 w 9603180"/>
+              <a:gd name="connsiteY9" fmla="*/ 2483815 h 2719034"/>
+              <a:gd name="connsiteX10" fmla="*/ 6638203 w 9603180"/>
+              <a:gd name="connsiteY10" fmla="*/ 1941267 h 2719034"/>
+              <a:gd name="connsiteX11" fmla="*/ 9603180 w 9603180"/>
+              <a:gd name="connsiteY11" fmla="*/ 894641 h 2719034"/>
+              <a:gd name="connsiteX0" fmla="*/ 9501242 w 9603180"/>
+              <a:gd name="connsiteY0" fmla="*/ 2364660 h 2745299"/>
+              <a:gd name="connsiteX1" fmla="*/ 7558142 w 9603180"/>
+              <a:gd name="connsiteY1" fmla="*/ 2574210 h 2745299"/>
+              <a:gd name="connsiteX2" fmla="*/ 5212112 w 9603180"/>
+              <a:gd name="connsiteY2" fmla="*/ 22972 h 2745299"/>
+              <a:gd name="connsiteX3" fmla="*/ 4947849 w 9603180"/>
+              <a:gd name="connsiteY3" fmla="*/ 2367010 h 2745299"/>
+              <a:gd name="connsiteX4" fmla="*/ 2838836 w 9603180"/>
+              <a:gd name="connsiteY4" fmla="*/ 2690808 h 2745299"/>
+              <a:gd name="connsiteX5" fmla="*/ 1726848 w 9603180"/>
+              <a:gd name="connsiteY5" fmla="*/ 2630013 h 2745299"/>
+              <a:gd name="connsiteX6" fmla="*/ 174717 w 9603180"/>
+              <a:gd name="connsiteY6" fmla="*/ 2365538 h 2745299"/>
+              <a:gd name="connsiteX7" fmla="*/ 466447 w 9603180"/>
+              <a:gd name="connsiteY7" fmla="*/ 963981 h 2745299"/>
+              <a:gd name="connsiteX8" fmla="*/ 3999336 w 9603180"/>
+              <a:gd name="connsiteY8" fmla="*/ 49517 h 2745299"/>
+              <a:gd name="connsiteX9" fmla="*/ 4726116 w 9603180"/>
+              <a:gd name="connsiteY9" fmla="*/ 2483815 h 2745299"/>
+              <a:gd name="connsiteX10" fmla="*/ 7222993 w 9603180"/>
+              <a:gd name="connsiteY10" fmla="*/ 2567285 h 2745299"/>
+              <a:gd name="connsiteX11" fmla="*/ 9603180 w 9603180"/>
+              <a:gd name="connsiteY11" fmla="*/ 894641 h 2745299"/>
+              <a:gd name="connsiteX0" fmla="*/ 9501242 w 9603180"/>
+              <a:gd name="connsiteY0" fmla="*/ 2364660 h 2745299"/>
+              <a:gd name="connsiteX1" fmla="*/ 7356124 w 9603180"/>
+              <a:gd name="connsiteY1" fmla="*/ 1280441 h 2745299"/>
+              <a:gd name="connsiteX2" fmla="*/ 5212112 w 9603180"/>
+              <a:gd name="connsiteY2" fmla="*/ 22972 h 2745299"/>
+              <a:gd name="connsiteX3" fmla="*/ 4947849 w 9603180"/>
+              <a:gd name="connsiteY3" fmla="*/ 2367010 h 2745299"/>
+              <a:gd name="connsiteX4" fmla="*/ 2838836 w 9603180"/>
+              <a:gd name="connsiteY4" fmla="*/ 2690808 h 2745299"/>
+              <a:gd name="connsiteX5" fmla="*/ 1726848 w 9603180"/>
+              <a:gd name="connsiteY5" fmla="*/ 2630013 h 2745299"/>
+              <a:gd name="connsiteX6" fmla="*/ 174717 w 9603180"/>
+              <a:gd name="connsiteY6" fmla="*/ 2365538 h 2745299"/>
+              <a:gd name="connsiteX7" fmla="*/ 466447 w 9603180"/>
+              <a:gd name="connsiteY7" fmla="*/ 963981 h 2745299"/>
+              <a:gd name="connsiteX8" fmla="*/ 3999336 w 9603180"/>
+              <a:gd name="connsiteY8" fmla="*/ 49517 h 2745299"/>
+              <a:gd name="connsiteX9" fmla="*/ 4726116 w 9603180"/>
+              <a:gd name="connsiteY9" fmla="*/ 2483815 h 2745299"/>
+              <a:gd name="connsiteX10" fmla="*/ 7222993 w 9603180"/>
+              <a:gd name="connsiteY10" fmla="*/ 2567285 h 2745299"/>
+              <a:gd name="connsiteX11" fmla="*/ 9603180 w 9603180"/>
+              <a:gd name="connsiteY11" fmla="*/ 894641 h 2745299"/>
+              <a:gd name="connsiteX0" fmla="*/ 9501242 w 9501242"/>
+              <a:gd name="connsiteY0" fmla="*/ 2364660 h 2745299"/>
+              <a:gd name="connsiteX1" fmla="*/ 7356124 w 9501242"/>
+              <a:gd name="connsiteY1" fmla="*/ 1280441 h 2745299"/>
+              <a:gd name="connsiteX2" fmla="*/ 5212112 w 9501242"/>
+              <a:gd name="connsiteY2" fmla="*/ 22972 h 2745299"/>
+              <a:gd name="connsiteX3" fmla="*/ 4947849 w 9501242"/>
+              <a:gd name="connsiteY3" fmla="*/ 2367010 h 2745299"/>
+              <a:gd name="connsiteX4" fmla="*/ 2838836 w 9501242"/>
+              <a:gd name="connsiteY4" fmla="*/ 2690808 h 2745299"/>
+              <a:gd name="connsiteX5" fmla="*/ 1726848 w 9501242"/>
+              <a:gd name="connsiteY5" fmla="*/ 2630013 h 2745299"/>
+              <a:gd name="connsiteX6" fmla="*/ 174717 w 9501242"/>
+              <a:gd name="connsiteY6" fmla="*/ 2365538 h 2745299"/>
+              <a:gd name="connsiteX7" fmla="*/ 466447 w 9501242"/>
+              <a:gd name="connsiteY7" fmla="*/ 963981 h 2745299"/>
+              <a:gd name="connsiteX8" fmla="*/ 3999336 w 9501242"/>
+              <a:gd name="connsiteY8" fmla="*/ 49517 h 2745299"/>
+              <a:gd name="connsiteX9" fmla="*/ 4726116 w 9501242"/>
+              <a:gd name="connsiteY9" fmla="*/ 2483815 h 2745299"/>
+              <a:gd name="connsiteX10" fmla="*/ 7222993 w 9501242"/>
+              <a:gd name="connsiteY10" fmla="*/ 2567285 h 2745299"/>
+              <a:gd name="connsiteX11" fmla="*/ 9390529 w 9501242"/>
+              <a:gd name="connsiteY11" fmla="*/ 2543153 h 2745299"/>
+              <a:gd name="connsiteX0" fmla="*/ 9256693 w 9390529"/>
+              <a:gd name="connsiteY0" fmla="*/ 987422 h 2745299"/>
+              <a:gd name="connsiteX1" fmla="*/ 7356124 w 9390529"/>
+              <a:gd name="connsiteY1" fmla="*/ 1280441 h 2745299"/>
+              <a:gd name="connsiteX2" fmla="*/ 5212112 w 9390529"/>
+              <a:gd name="connsiteY2" fmla="*/ 22972 h 2745299"/>
+              <a:gd name="connsiteX3" fmla="*/ 4947849 w 9390529"/>
+              <a:gd name="connsiteY3" fmla="*/ 2367010 h 2745299"/>
+              <a:gd name="connsiteX4" fmla="*/ 2838836 w 9390529"/>
+              <a:gd name="connsiteY4" fmla="*/ 2690808 h 2745299"/>
+              <a:gd name="connsiteX5" fmla="*/ 1726848 w 9390529"/>
+              <a:gd name="connsiteY5" fmla="*/ 2630013 h 2745299"/>
+              <a:gd name="connsiteX6" fmla="*/ 174717 w 9390529"/>
+              <a:gd name="connsiteY6" fmla="*/ 2365538 h 2745299"/>
+              <a:gd name="connsiteX7" fmla="*/ 466447 w 9390529"/>
+              <a:gd name="connsiteY7" fmla="*/ 963981 h 2745299"/>
+              <a:gd name="connsiteX8" fmla="*/ 3999336 w 9390529"/>
+              <a:gd name="connsiteY8" fmla="*/ 49517 h 2745299"/>
+              <a:gd name="connsiteX9" fmla="*/ 4726116 w 9390529"/>
+              <a:gd name="connsiteY9" fmla="*/ 2483815 h 2745299"/>
+              <a:gd name="connsiteX10" fmla="*/ 7222993 w 9390529"/>
+              <a:gd name="connsiteY10" fmla="*/ 2567285 h 2745299"/>
+              <a:gd name="connsiteX11" fmla="*/ 9390529 w 9390529"/>
+              <a:gd name="connsiteY11" fmla="*/ 2543153 h 2745299"/>
+              <a:gd name="connsiteX0" fmla="*/ 9256693 w 9390529"/>
+              <a:gd name="connsiteY0" fmla="*/ 1002874 h 2760751"/>
+              <a:gd name="connsiteX1" fmla="*/ 7366757 w 9390529"/>
+              <a:gd name="connsiteY1" fmla="*/ 930716 h 2760751"/>
+              <a:gd name="connsiteX2" fmla="*/ 5212112 w 9390529"/>
+              <a:gd name="connsiteY2" fmla="*/ 38424 h 2760751"/>
+              <a:gd name="connsiteX3" fmla="*/ 4947849 w 9390529"/>
+              <a:gd name="connsiteY3" fmla="*/ 2382462 h 2760751"/>
+              <a:gd name="connsiteX4" fmla="*/ 2838836 w 9390529"/>
+              <a:gd name="connsiteY4" fmla="*/ 2706260 h 2760751"/>
+              <a:gd name="connsiteX5" fmla="*/ 1726848 w 9390529"/>
+              <a:gd name="connsiteY5" fmla="*/ 2645465 h 2760751"/>
+              <a:gd name="connsiteX6" fmla="*/ 174717 w 9390529"/>
+              <a:gd name="connsiteY6" fmla="*/ 2380990 h 2760751"/>
+              <a:gd name="connsiteX7" fmla="*/ 466447 w 9390529"/>
+              <a:gd name="connsiteY7" fmla="*/ 979433 h 2760751"/>
+              <a:gd name="connsiteX8" fmla="*/ 3999336 w 9390529"/>
+              <a:gd name="connsiteY8" fmla="*/ 64969 h 2760751"/>
+              <a:gd name="connsiteX9" fmla="*/ 4726116 w 9390529"/>
+              <a:gd name="connsiteY9" fmla="*/ 2499267 h 2760751"/>
+              <a:gd name="connsiteX10" fmla="*/ 7222993 w 9390529"/>
+              <a:gd name="connsiteY10" fmla="*/ 2582737 h 2760751"/>
+              <a:gd name="connsiteX11" fmla="*/ 9390529 w 9390529"/>
+              <a:gd name="connsiteY11" fmla="*/ 2558605 h 2760751"/>
+              <a:gd name="connsiteX0" fmla="*/ 9256693 w 9256693"/>
+              <a:gd name="connsiteY0" fmla="*/ 1002874 h 2760751"/>
+              <a:gd name="connsiteX1" fmla="*/ 7366757 w 9256693"/>
+              <a:gd name="connsiteY1" fmla="*/ 930716 h 2760751"/>
+              <a:gd name="connsiteX2" fmla="*/ 5212112 w 9256693"/>
+              <a:gd name="connsiteY2" fmla="*/ 38424 h 2760751"/>
+              <a:gd name="connsiteX3" fmla="*/ 4947849 w 9256693"/>
+              <a:gd name="connsiteY3" fmla="*/ 2382462 h 2760751"/>
+              <a:gd name="connsiteX4" fmla="*/ 2838836 w 9256693"/>
+              <a:gd name="connsiteY4" fmla="*/ 2706260 h 2760751"/>
+              <a:gd name="connsiteX5" fmla="*/ 1726848 w 9256693"/>
+              <a:gd name="connsiteY5" fmla="*/ 2645465 h 2760751"/>
+              <a:gd name="connsiteX6" fmla="*/ 174717 w 9256693"/>
+              <a:gd name="connsiteY6" fmla="*/ 2380990 h 2760751"/>
+              <a:gd name="connsiteX7" fmla="*/ 466447 w 9256693"/>
+              <a:gd name="connsiteY7" fmla="*/ 979433 h 2760751"/>
+              <a:gd name="connsiteX8" fmla="*/ 3999336 w 9256693"/>
+              <a:gd name="connsiteY8" fmla="*/ 64969 h 2760751"/>
+              <a:gd name="connsiteX9" fmla="*/ 4726116 w 9256693"/>
+              <a:gd name="connsiteY9" fmla="*/ 2499267 h 2760751"/>
+              <a:gd name="connsiteX10" fmla="*/ 7222993 w 9256693"/>
+              <a:gd name="connsiteY10" fmla="*/ 2582737 h 2760751"/>
+              <a:gd name="connsiteX11" fmla="*/ 9188510 w 9256693"/>
+              <a:gd name="connsiteY11" fmla="*/ 2454269 h 2760751"/>
+              <a:gd name="connsiteX0" fmla="*/ 9012144 w 9188510"/>
+              <a:gd name="connsiteY0" fmla="*/ 1002874 h 2760751"/>
+              <a:gd name="connsiteX1" fmla="*/ 7366757 w 9188510"/>
+              <a:gd name="connsiteY1" fmla="*/ 930716 h 2760751"/>
+              <a:gd name="connsiteX2" fmla="*/ 5212112 w 9188510"/>
+              <a:gd name="connsiteY2" fmla="*/ 38424 h 2760751"/>
+              <a:gd name="connsiteX3" fmla="*/ 4947849 w 9188510"/>
+              <a:gd name="connsiteY3" fmla="*/ 2382462 h 2760751"/>
+              <a:gd name="connsiteX4" fmla="*/ 2838836 w 9188510"/>
+              <a:gd name="connsiteY4" fmla="*/ 2706260 h 2760751"/>
+              <a:gd name="connsiteX5" fmla="*/ 1726848 w 9188510"/>
+              <a:gd name="connsiteY5" fmla="*/ 2645465 h 2760751"/>
+              <a:gd name="connsiteX6" fmla="*/ 174717 w 9188510"/>
+              <a:gd name="connsiteY6" fmla="*/ 2380990 h 2760751"/>
+              <a:gd name="connsiteX7" fmla="*/ 466447 w 9188510"/>
+              <a:gd name="connsiteY7" fmla="*/ 979433 h 2760751"/>
+              <a:gd name="connsiteX8" fmla="*/ 3999336 w 9188510"/>
+              <a:gd name="connsiteY8" fmla="*/ 64969 h 2760751"/>
+              <a:gd name="connsiteX9" fmla="*/ 4726116 w 9188510"/>
+              <a:gd name="connsiteY9" fmla="*/ 2499267 h 2760751"/>
+              <a:gd name="connsiteX10" fmla="*/ 7222993 w 9188510"/>
+              <a:gd name="connsiteY10" fmla="*/ 2582737 h 2760751"/>
+              <a:gd name="connsiteX11" fmla="*/ 9188510 w 9188510"/>
+              <a:gd name="connsiteY11" fmla="*/ 2454269 h 2760751"/>
+              <a:gd name="connsiteX0" fmla="*/ 9012144 w 9012144"/>
+              <a:gd name="connsiteY0" fmla="*/ 1002874 h 2760751"/>
+              <a:gd name="connsiteX1" fmla="*/ 7366757 w 9012144"/>
+              <a:gd name="connsiteY1" fmla="*/ 930716 h 2760751"/>
+              <a:gd name="connsiteX2" fmla="*/ 5212112 w 9012144"/>
+              <a:gd name="connsiteY2" fmla="*/ 38424 h 2760751"/>
+              <a:gd name="connsiteX3" fmla="*/ 4947849 w 9012144"/>
+              <a:gd name="connsiteY3" fmla="*/ 2382462 h 2760751"/>
+              <a:gd name="connsiteX4" fmla="*/ 2838836 w 9012144"/>
+              <a:gd name="connsiteY4" fmla="*/ 2706260 h 2760751"/>
+              <a:gd name="connsiteX5" fmla="*/ 1726848 w 9012144"/>
+              <a:gd name="connsiteY5" fmla="*/ 2645465 h 2760751"/>
+              <a:gd name="connsiteX6" fmla="*/ 174717 w 9012144"/>
+              <a:gd name="connsiteY6" fmla="*/ 2380990 h 2760751"/>
+              <a:gd name="connsiteX7" fmla="*/ 466447 w 9012144"/>
+              <a:gd name="connsiteY7" fmla="*/ 979433 h 2760751"/>
+              <a:gd name="connsiteX8" fmla="*/ 3999336 w 9012144"/>
+              <a:gd name="connsiteY8" fmla="*/ 64969 h 2760751"/>
+              <a:gd name="connsiteX9" fmla="*/ 4726116 w 9012144"/>
+              <a:gd name="connsiteY9" fmla="*/ 2499267 h 2760751"/>
+              <a:gd name="connsiteX10" fmla="*/ 7222993 w 9012144"/>
+              <a:gd name="connsiteY10" fmla="*/ 2582737 h 2760751"/>
+              <a:gd name="connsiteX11" fmla="*/ 8710044 w 9012144"/>
+              <a:gd name="connsiteY11" fmla="*/ 2454269 h 2760751"/>
+              <a:gd name="connsiteX0" fmla="*/ 8586842 w 8710044"/>
+              <a:gd name="connsiteY0" fmla="*/ 1002874 h 2760751"/>
+              <a:gd name="connsiteX1" fmla="*/ 7366757 w 8710044"/>
+              <a:gd name="connsiteY1" fmla="*/ 930716 h 2760751"/>
+              <a:gd name="connsiteX2" fmla="*/ 5212112 w 8710044"/>
+              <a:gd name="connsiteY2" fmla="*/ 38424 h 2760751"/>
+              <a:gd name="connsiteX3" fmla="*/ 4947849 w 8710044"/>
+              <a:gd name="connsiteY3" fmla="*/ 2382462 h 2760751"/>
+              <a:gd name="connsiteX4" fmla="*/ 2838836 w 8710044"/>
+              <a:gd name="connsiteY4" fmla="*/ 2706260 h 2760751"/>
+              <a:gd name="connsiteX5" fmla="*/ 1726848 w 8710044"/>
+              <a:gd name="connsiteY5" fmla="*/ 2645465 h 2760751"/>
+              <a:gd name="connsiteX6" fmla="*/ 174717 w 8710044"/>
+              <a:gd name="connsiteY6" fmla="*/ 2380990 h 2760751"/>
+              <a:gd name="connsiteX7" fmla="*/ 466447 w 8710044"/>
+              <a:gd name="connsiteY7" fmla="*/ 979433 h 2760751"/>
+              <a:gd name="connsiteX8" fmla="*/ 3999336 w 8710044"/>
+              <a:gd name="connsiteY8" fmla="*/ 64969 h 2760751"/>
+              <a:gd name="connsiteX9" fmla="*/ 4726116 w 8710044"/>
+              <a:gd name="connsiteY9" fmla="*/ 2499267 h 2760751"/>
+              <a:gd name="connsiteX10" fmla="*/ 7222993 w 8710044"/>
+              <a:gd name="connsiteY10" fmla="*/ 2582737 h 2760751"/>
+              <a:gd name="connsiteX11" fmla="*/ 8710044 w 8710044"/>
+              <a:gd name="connsiteY11" fmla="*/ 2454269 h 2760751"/>
+              <a:gd name="connsiteX0" fmla="*/ 8586842 w 8710044"/>
+              <a:gd name="connsiteY0" fmla="*/ 1002874 h 2729493"/>
+              <a:gd name="connsiteX1" fmla="*/ 7366757 w 8710044"/>
+              <a:gd name="connsiteY1" fmla="*/ 930716 h 2729493"/>
+              <a:gd name="connsiteX2" fmla="*/ 5212112 w 8710044"/>
+              <a:gd name="connsiteY2" fmla="*/ 38424 h 2729493"/>
+              <a:gd name="connsiteX3" fmla="*/ 4947849 w 8710044"/>
+              <a:gd name="connsiteY3" fmla="*/ 2382462 h 2729493"/>
+              <a:gd name="connsiteX4" fmla="*/ 2838836 w 8710044"/>
+              <a:gd name="connsiteY4" fmla="*/ 2706260 h 2729493"/>
+              <a:gd name="connsiteX5" fmla="*/ 1726848 w 8710044"/>
+              <a:gd name="connsiteY5" fmla="*/ 2645465 h 2729493"/>
+              <a:gd name="connsiteX6" fmla="*/ 174717 w 8710044"/>
+              <a:gd name="connsiteY6" fmla="*/ 2380990 h 2729493"/>
+              <a:gd name="connsiteX7" fmla="*/ 466447 w 8710044"/>
+              <a:gd name="connsiteY7" fmla="*/ 979433 h 2729493"/>
+              <a:gd name="connsiteX8" fmla="*/ 3999336 w 8710044"/>
+              <a:gd name="connsiteY8" fmla="*/ 64969 h 2729493"/>
+              <a:gd name="connsiteX9" fmla="*/ 4449670 w 8710044"/>
+              <a:gd name="connsiteY9" fmla="*/ 2415797 h 2729493"/>
+              <a:gd name="connsiteX10" fmla="*/ 7222993 w 8710044"/>
+              <a:gd name="connsiteY10" fmla="*/ 2582737 h 2729493"/>
+              <a:gd name="connsiteX11" fmla="*/ 8710044 w 8710044"/>
+              <a:gd name="connsiteY11" fmla="*/ 2454269 h 2729493"/>
+              <a:gd name="connsiteX0" fmla="*/ 8586842 w 8710044"/>
+              <a:gd name="connsiteY0" fmla="*/ 1002874 h 2729493"/>
+              <a:gd name="connsiteX1" fmla="*/ 7366757 w 8710044"/>
+              <a:gd name="connsiteY1" fmla="*/ 930716 h 2729493"/>
+              <a:gd name="connsiteX2" fmla="*/ 5212112 w 8710044"/>
+              <a:gd name="connsiteY2" fmla="*/ 38424 h 2729493"/>
+              <a:gd name="connsiteX3" fmla="*/ 4947849 w 8710044"/>
+              <a:gd name="connsiteY3" fmla="*/ 2382462 h 2729493"/>
+              <a:gd name="connsiteX4" fmla="*/ 1726848 w 8710044"/>
+              <a:gd name="connsiteY4" fmla="*/ 2645465 h 2729493"/>
+              <a:gd name="connsiteX5" fmla="*/ 174717 w 8710044"/>
+              <a:gd name="connsiteY5" fmla="*/ 2380990 h 2729493"/>
+              <a:gd name="connsiteX6" fmla="*/ 466447 w 8710044"/>
+              <a:gd name="connsiteY6" fmla="*/ 979433 h 2729493"/>
+              <a:gd name="connsiteX7" fmla="*/ 3999336 w 8710044"/>
+              <a:gd name="connsiteY7" fmla="*/ 64969 h 2729493"/>
+              <a:gd name="connsiteX8" fmla="*/ 4449670 w 8710044"/>
+              <a:gd name="connsiteY8" fmla="*/ 2415797 h 2729493"/>
+              <a:gd name="connsiteX9" fmla="*/ 7222993 w 8710044"/>
+              <a:gd name="connsiteY9" fmla="*/ 2582737 h 2729493"/>
+              <a:gd name="connsiteX10" fmla="*/ 8710044 w 8710044"/>
+              <a:gd name="connsiteY10" fmla="*/ 2454269 h 2729493"/>
+              <a:gd name="connsiteX0" fmla="*/ 8586842 w 8710044"/>
+              <a:gd name="connsiteY0" fmla="*/ 1002874 h 2766013"/>
+              <a:gd name="connsiteX1" fmla="*/ 7366757 w 8710044"/>
+              <a:gd name="connsiteY1" fmla="*/ 930716 h 2766013"/>
+              <a:gd name="connsiteX2" fmla="*/ 5212112 w 8710044"/>
+              <a:gd name="connsiteY2" fmla="*/ 38424 h 2766013"/>
+              <a:gd name="connsiteX3" fmla="*/ 4947849 w 8710044"/>
+              <a:gd name="connsiteY3" fmla="*/ 2382462 h 2766013"/>
+              <a:gd name="connsiteX4" fmla="*/ 1726848 w 8710044"/>
+              <a:gd name="connsiteY4" fmla="*/ 2645465 h 2766013"/>
+              <a:gd name="connsiteX5" fmla="*/ 174717 w 8710044"/>
+              <a:gd name="connsiteY5" fmla="*/ 2380990 h 2766013"/>
+              <a:gd name="connsiteX6" fmla="*/ 466447 w 8710044"/>
+              <a:gd name="connsiteY6" fmla="*/ 979433 h 2766013"/>
+              <a:gd name="connsiteX7" fmla="*/ 3999336 w 8710044"/>
+              <a:gd name="connsiteY7" fmla="*/ 64969 h 2766013"/>
+              <a:gd name="connsiteX8" fmla="*/ 4449670 w 8710044"/>
+              <a:gd name="connsiteY8" fmla="*/ 2415797 h 2766013"/>
+              <a:gd name="connsiteX9" fmla="*/ 6329858 w 8710044"/>
+              <a:gd name="connsiteY9" fmla="*/ 2634905 h 2766013"/>
+              <a:gd name="connsiteX10" fmla="*/ 8710044 w 8710044"/>
+              <a:gd name="connsiteY10" fmla="*/ 2454269 h 2766013"/>
+              <a:gd name="connsiteX0" fmla="*/ 8586842 w 8710044"/>
+              <a:gd name="connsiteY0" fmla="*/ 1002874 h 2766013"/>
+              <a:gd name="connsiteX1" fmla="*/ 7366757 w 8710044"/>
+              <a:gd name="connsiteY1" fmla="*/ 930716 h 2766013"/>
+              <a:gd name="connsiteX2" fmla="*/ 5212112 w 8710044"/>
+              <a:gd name="connsiteY2" fmla="*/ 38424 h 2766013"/>
+              <a:gd name="connsiteX3" fmla="*/ 4947849 w 8710044"/>
+              <a:gd name="connsiteY3" fmla="*/ 2382462 h 2766013"/>
+              <a:gd name="connsiteX4" fmla="*/ 1726848 w 8710044"/>
+              <a:gd name="connsiteY4" fmla="*/ 2645465 h 2766013"/>
+              <a:gd name="connsiteX5" fmla="*/ 174717 w 8710044"/>
+              <a:gd name="connsiteY5" fmla="*/ 2380990 h 2766013"/>
+              <a:gd name="connsiteX6" fmla="*/ 466447 w 8710044"/>
+              <a:gd name="connsiteY6" fmla="*/ 979433 h 2766013"/>
+              <a:gd name="connsiteX7" fmla="*/ 3999336 w 8710044"/>
+              <a:gd name="connsiteY7" fmla="*/ 64969 h 2766013"/>
+              <a:gd name="connsiteX8" fmla="*/ 4449670 w 8710044"/>
+              <a:gd name="connsiteY8" fmla="*/ 2415797 h 2766013"/>
+              <a:gd name="connsiteX9" fmla="*/ 6329858 w 8710044"/>
+              <a:gd name="connsiteY9" fmla="*/ 2634905 h 2766013"/>
+              <a:gd name="connsiteX10" fmla="*/ 8710044 w 8710044"/>
+              <a:gd name="connsiteY10" fmla="*/ 2454269 h 2766013"/>
+              <a:gd name="connsiteX0" fmla="*/ 8586842 w 8710044"/>
+              <a:gd name="connsiteY0" fmla="*/ 1002874 h 2678944"/>
+              <a:gd name="connsiteX1" fmla="*/ 7366757 w 8710044"/>
+              <a:gd name="connsiteY1" fmla="*/ 930716 h 2678944"/>
+              <a:gd name="connsiteX2" fmla="*/ 5212112 w 8710044"/>
+              <a:gd name="connsiteY2" fmla="*/ 38424 h 2678944"/>
+              <a:gd name="connsiteX3" fmla="*/ 4947849 w 8710044"/>
+              <a:gd name="connsiteY3" fmla="*/ 2382462 h 2678944"/>
+              <a:gd name="connsiteX4" fmla="*/ 1726848 w 8710044"/>
+              <a:gd name="connsiteY4" fmla="*/ 2645465 h 2678944"/>
+              <a:gd name="connsiteX5" fmla="*/ 174717 w 8710044"/>
+              <a:gd name="connsiteY5" fmla="*/ 2380990 h 2678944"/>
+              <a:gd name="connsiteX6" fmla="*/ 466447 w 8710044"/>
+              <a:gd name="connsiteY6" fmla="*/ 979433 h 2678944"/>
+              <a:gd name="connsiteX7" fmla="*/ 3999336 w 8710044"/>
+              <a:gd name="connsiteY7" fmla="*/ 64969 h 2678944"/>
+              <a:gd name="connsiteX8" fmla="*/ 4449670 w 8710044"/>
+              <a:gd name="connsiteY8" fmla="*/ 2415797 h 2678944"/>
+              <a:gd name="connsiteX9" fmla="*/ 6329858 w 8710044"/>
+              <a:gd name="connsiteY9" fmla="*/ 2634905 h 2678944"/>
+              <a:gd name="connsiteX10" fmla="*/ 8710044 w 8710044"/>
+              <a:gd name="connsiteY10" fmla="*/ 2454269 h 2678944"/>
+              <a:gd name="connsiteX0" fmla="*/ 8586842 w 8710044"/>
+              <a:gd name="connsiteY0" fmla="*/ 1002874 h 2678944"/>
+              <a:gd name="connsiteX1" fmla="*/ 7366757 w 8710044"/>
+              <a:gd name="connsiteY1" fmla="*/ 930716 h 2678944"/>
+              <a:gd name="connsiteX2" fmla="*/ 5212112 w 8710044"/>
+              <a:gd name="connsiteY2" fmla="*/ 38424 h 2678944"/>
+              <a:gd name="connsiteX3" fmla="*/ 4947849 w 8710044"/>
+              <a:gd name="connsiteY3" fmla="*/ 2382462 h 2678944"/>
+              <a:gd name="connsiteX4" fmla="*/ 1726848 w 8710044"/>
+              <a:gd name="connsiteY4" fmla="*/ 2645465 h 2678944"/>
+              <a:gd name="connsiteX5" fmla="*/ 174717 w 8710044"/>
+              <a:gd name="connsiteY5" fmla="*/ 2380990 h 2678944"/>
+              <a:gd name="connsiteX6" fmla="*/ 466447 w 8710044"/>
+              <a:gd name="connsiteY6" fmla="*/ 979433 h 2678944"/>
+              <a:gd name="connsiteX7" fmla="*/ 3999336 w 8710044"/>
+              <a:gd name="connsiteY7" fmla="*/ 64969 h 2678944"/>
+              <a:gd name="connsiteX8" fmla="*/ 4449670 w 8710044"/>
+              <a:gd name="connsiteY8" fmla="*/ 2415797 h 2678944"/>
+              <a:gd name="connsiteX9" fmla="*/ 6329858 w 8710044"/>
+              <a:gd name="connsiteY9" fmla="*/ 2634905 h 2678944"/>
+              <a:gd name="connsiteX10" fmla="*/ 8710044 w 8710044"/>
+              <a:gd name="connsiteY10" fmla="*/ 2454269 h 2678944"/>
+              <a:gd name="connsiteX0" fmla="*/ 8586842 w 8710044"/>
+              <a:gd name="connsiteY0" fmla="*/ 1002874 h 2678944"/>
+              <a:gd name="connsiteX1" fmla="*/ 7366757 w 8710044"/>
+              <a:gd name="connsiteY1" fmla="*/ 930716 h 2678944"/>
+              <a:gd name="connsiteX2" fmla="*/ 5212112 w 8710044"/>
+              <a:gd name="connsiteY2" fmla="*/ 38424 h 2678944"/>
+              <a:gd name="connsiteX3" fmla="*/ 4947849 w 8710044"/>
+              <a:gd name="connsiteY3" fmla="*/ 2382462 h 2678944"/>
+              <a:gd name="connsiteX4" fmla="*/ 1726848 w 8710044"/>
+              <a:gd name="connsiteY4" fmla="*/ 2645465 h 2678944"/>
+              <a:gd name="connsiteX5" fmla="*/ 174717 w 8710044"/>
+              <a:gd name="connsiteY5" fmla="*/ 2380990 h 2678944"/>
+              <a:gd name="connsiteX6" fmla="*/ 466447 w 8710044"/>
+              <a:gd name="connsiteY6" fmla="*/ 979433 h 2678944"/>
+              <a:gd name="connsiteX7" fmla="*/ 3999336 w 8710044"/>
+              <a:gd name="connsiteY7" fmla="*/ 64969 h 2678944"/>
+              <a:gd name="connsiteX8" fmla="*/ 4449670 w 8710044"/>
+              <a:gd name="connsiteY8" fmla="*/ 2415797 h 2678944"/>
+              <a:gd name="connsiteX9" fmla="*/ 6404286 w 8710044"/>
+              <a:gd name="connsiteY9" fmla="*/ 2572302 h 2678944"/>
+              <a:gd name="connsiteX10" fmla="*/ 8710044 w 8710044"/>
+              <a:gd name="connsiteY10" fmla="*/ 2454269 h 2678944"/>
+              <a:gd name="connsiteX0" fmla="*/ 8586842 w 8710044"/>
+              <a:gd name="connsiteY0" fmla="*/ 1002874 h 2678944"/>
+              <a:gd name="connsiteX1" fmla="*/ 7366757 w 8710044"/>
+              <a:gd name="connsiteY1" fmla="*/ 930716 h 2678944"/>
+              <a:gd name="connsiteX2" fmla="*/ 5212112 w 8710044"/>
+              <a:gd name="connsiteY2" fmla="*/ 38424 h 2678944"/>
+              <a:gd name="connsiteX3" fmla="*/ 4947849 w 8710044"/>
+              <a:gd name="connsiteY3" fmla="*/ 2382462 h 2678944"/>
+              <a:gd name="connsiteX4" fmla="*/ 1726848 w 8710044"/>
+              <a:gd name="connsiteY4" fmla="*/ 2645465 h 2678944"/>
+              <a:gd name="connsiteX5" fmla="*/ 174717 w 8710044"/>
+              <a:gd name="connsiteY5" fmla="*/ 2380990 h 2678944"/>
+              <a:gd name="connsiteX6" fmla="*/ 466447 w 8710044"/>
+              <a:gd name="connsiteY6" fmla="*/ 979433 h 2678944"/>
+              <a:gd name="connsiteX7" fmla="*/ 3999336 w 8710044"/>
+              <a:gd name="connsiteY7" fmla="*/ 64969 h 2678944"/>
+              <a:gd name="connsiteX8" fmla="*/ 4449670 w 8710044"/>
+              <a:gd name="connsiteY8" fmla="*/ 2415797 h 2678944"/>
+              <a:gd name="connsiteX9" fmla="*/ 6404286 w 8710044"/>
+              <a:gd name="connsiteY9" fmla="*/ 2572302 h 2678944"/>
+              <a:gd name="connsiteX10" fmla="*/ 8710044 w 8710044"/>
+              <a:gd name="connsiteY10" fmla="*/ 2454269 h 2678944"/>
+              <a:gd name="connsiteX0" fmla="*/ 8586842 w 8710044"/>
+              <a:gd name="connsiteY0" fmla="*/ 1002874 h 2678944"/>
+              <a:gd name="connsiteX1" fmla="*/ 7366757 w 8710044"/>
+              <a:gd name="connsiteY1" fmla="*/ 930716 h 2678944"/>
+              <a:gd name="connsiteX2" fmla="*/ 5212112 w 8710044"/>
+              <a:gd name="connsiteY2" fmla="*/ 38424 h 2678944"/>
+              <a:gd name="connsiteX3" fmla="*/ 4947849 w 8710044"/>
+              <a:gd name="connsiteY3" fmla="*/ 2382462 h 2678944"/>
+              <a:gd name="connsiteX4" fmla="*/ 1726848 w 8710044"/>
+              <a:gd name="connsiteY4" fmla="*/ 2645465 h 2678944"/>
+              <a:gd name="connsiteX5" fmla="*/ 174717 w 8710044"/>
+              <a:gd name="connsiteY5" fmla="*/ 2380990 h 2678944"/>
+              <a:gd name="connsiteX6" fmla="*/ 466447 w 8710044"/>
+              <a:gd name="connsiteY6" fmla="*/ 979433 h 2678944"/>
+              <a:gd name="connsiteX7" fmla="*/ 3999336 w 8710044"/>
+              <a:gd name="connsiteY7" fmla="*/ 64969 h 2678944"/>
+              <a:gd name="connsiteX8" fmla="*/ 4449670 w 8710044"/>
+              <a:gd name="connsiteY8" fmla="*/ 2415797 h 2678944"/>
+              <a:gd name="connsiteX9" fmla="*/ 6521244 w 8710044"/>
+              <a:gd name="connsiteY9" fmla="*/ 2436665 h 2678944"/>
+              <a:gd name="connsiteX10" fmla="*/ 8710044 w 8710044"/>
+              <a:gd name="connsiteY10" fmla="*/ 2454269 h 2678944"/>
+              <a:gd name="connsiteX0" fmla="*/ 8586842 w 8710044"/>
+              <a:gd name="connsiteY0" fmla="*/ 1002874 h 2678944"/>
+              <a:gd name="connsiteX1" fmla="*/ 7366757 w 8710044"/>
+              <a:gd name="connsiteY1" fmla="*/ 930716 h 2678944"/>
+              <a:gd name="connsiteX2" fmla="*/ 5212112 w 8710044"/>
+              <a:gd name="connsiteY2" fmla="*/ 38424 h 2678944"/>
+              <a:gd name="connsiteX3" fmla="*/ 4947849 w 8710044"/>
+              <a:gd name="connsiteY3" fmla="*/ 2382462 h 2678944"/>
+              <a:gd name="connsiteX4" fmla="*/ 1726848 w 8710044"/>
+              <a:gd name="connsiteY4" fmla="*/ 2645465 h 2678944"/>
+              <a:gd name="connsiteX5" fmla="*/ 174717 w 8710044"/>
+              <a:gd name="connsiteY5" fmla="*/ 2380990 h 2678944"/>
+              <a:gd name="connsiteX6" fmla="*/ 466447 w 8710044"/>
+              <a:gd name="connsiteY6" fmla="*/ 979433 h 2678944"/>
+              <a:gd name="connsiteX7" fmla="*/ 3999336 w 8710044"/>
+              <a:gd name="connsiteY7" fmla="*/ 64969 h 2678944"/>
+              <a:gd name="connsiteX8" fmla="*/ 4449670 w 8710044"/>
+              <a:gd name="connsiteY8" fmla="*/ 2415797 h 2678944"/>
+              <a:gd name="connsiteX9" fmla="*/ 6521244 w 8710044"/>
+              <a:gd name="connsiteY9" fmla="*/ 2436665 h 2678944"/>
+              <a:gd name="connsiteX10" fmla="*/ 8710044 w 8710044"/>
+              <a:gd name="connsiteY10" fmla="*/ 2454269 h 2678944"/>
+              <a:gd name="connsiteX0" fmla="*/ 8586842 w 8710044"/>
+              <a:gd name="connsiteY0" fmla="*/ 1002874 h 2678944"/>
+              <a:gd name="connsiteX1" fmla="*/ 7366757 w 8710044"/>
+              <a:gd name="connsiteY1" fmla="*/ 930716 h 2678944"/>
+              <a:gd name="connsiteX2" fmla="*/ 5212112 w 8710044"/>
+              <a:gd name="connsiteY2" fmla="*/ 38424 h 2678944"/>
+              <a:gd name="connsiteX3" fmla="*/ 4947849 w 8710044"/>
+              <a:gd name="connsiteY3" fmla="*/ 2382462 h 2678944"/>
+              <a:gd name="connsiteX4" fmla="*/ 1726848 w 8710044"/>
+              <a:gd name="connsiteY4" fmla="*/ 2645465 h 2678944"/>
+              <a:gd name="connsiteX5" fmla="*/ 174717 w 8710044"/>
+              <a:gd name="connsiteY5" fmla="*/ 2380990 h 2678944"/>
+              <a:gd name="connsiteX6" fmla="*/ 466447 w 8710044"/>
+              <a:gd name="connsiteY6" fmla="*/ 979433 h 2678944"/>
+              <a:gd name="connsiteX7" fmla="*/ 3999336 w 8710044"/>
+              <a:gd name="connsiteY7" fmla="*/ 64969 h 2678944"/>
+              <a:gd name="connsiteX8" fmla="*/ 4449670 w 8710044"/>
+              <a:gd name="connsiteY8" fmla="*/ 2415797 h 2678944"/>
+              <a:gd name="connsiteX9" fmla="*/ 6521244 w 8710044"/>
+              <a:gd name="connsiteY9" fmla="*/ 2436665 h 2678944"/>
+              <a:gd name="connsiteX10" fmla="*/ 8710044 w 8710044"/>
+              <a:gd name="connsiteY10" fmla="*/ 2454269 h 2678944"/>
+              <a:gd name="connsiteX0" fmla="*/ 8586842 w 8710044"/>
+              <a:gd name="connsiteY0" fmla="*/ 1002874 h 2678944"/>
+              <a:gd name="connsiteX1" fmla="*/ 7366757 w 8710044"/>
+              <a:gd name="connsiteY1" fmla="*/ 930716 h 2678944"/>
+              <a:gd name="connsiteX2" fmla="*/ 5212112 w 8710044"/>
+              <a:gd name="connsiteY2" fmla="*/ 38424 h 2678944"/>
+              <a:gd name="connsiteX3" fmla="*/ 4947849 w 8710044"/>
+              <a:gd name="connsiteY3" fmla="*/ 2382462 h 2678944"/>
+              <a:gd name="connsiteX4" fmla="*/ 1726848 w 8710044"/>
+              <a:gd name="connsiteY4" fmla="*/ 2645465 h 2678944"/>
+              <a:gd name="connsiteX5" fmla="*/ 174717 w 8710044"/>
+              <a:gd name="connsiteY5" fmla="*/ 2380990 h 2678944"/>
+              <a:gd name="connsiteX6" fmla="*/ 466447 w 8710044"/>
+              <a:gd name="connsiteY6" fmla="*/ 979433 h 2678944"/>
+              <a:gd name="connsiteX7" fmla="*/ 3999336 w 8710044"/>
+              <a:gd name="connsiteY7" fmla="*/ 64969 h 2678944"/>
+              <a:gd name="connsiteX8" fmla="*/ 4343344 w 8710044"/>
+              <a:gd name="connsiteY8" fmla="*/ 2301028 h 2678944"/>
+              <a:gd name="connsiteX9" fmla="*/ 6521244 w 8710044"/>
+              <a:gd name="connsiteY9" fmla="*/ 2436665 h 2678944"/>
+              <a:gd name="connsiteX10" fmla="*/ 8710044 w 8710044"/>
+              <a:gd name="connsiteY10" fmla="*/ 2454269 h 2678944"/>
             </a:gdLst>
             <a:ahLst/>
             <a:cxnLst>
@@ -8052,59 +8484,59 @@
             </a:cxnLst>
             <a:rect l="l" t="t" r="r" b="b"/>
             <a:pathLst>
-              <a:path w="9636616" h="1919616">
+              <a:path w="8710044" h="2678944">
                 <a:moveTo>
-                  <a:pt x="9534678" y="1607885"/>
+                  <a:pt x="8586842" y="1002874"/>
                 </a:moveTo>
                 <a:cubicBezTo>
-                  <a:pt x="9025884" y="1695197"/>
-                  <a:pt x="8469465" y="1774721"/>
-                  <a:pt x="7591578" y="1817435"/>
+                  <a:pt x="8078048" y="1090186"/>
+                  <a:pt x="7929212" y="1091458"/>
+                  <a:pt x="7366757" y="930716"/>
                 </a:cubicBezTo>
                 <a:cubicBezTo>
-                  <a:pt x="6713691" y="1860149"/>
-                  <a:pt x="4838853" y="1994344"/>
-                  <a:pt x="4267353" y="1864169"/>
+                  <a:pt x="6804302" y="769974"/>
+                  <a:pt x="5615263" y="-203534"/>
+                  <a:pt x="5212112" y="38424"/>
                 </a:cubicBezTo>
                 <a:cubicBezTo>
-                  <a:pt x="3695853" y="1733994"/>
-                  <a:pt x="3854603" y="1174290"/>
-                  <a:pt x="4162578" y="1036385"/>
+                  <a:pt x="4808961" y="280382"/>
+                  <a:pt x="5528726" y="1947955"/>
+                  <a:pt x="4947849" y="2382462"/>
                 </a:cubicBezTo>
                 <a:cubicBezTo>
-                  <a:pt x="4470553" y="898480"/>
-                  <a:pt x="5796116" y="912916"/>
-                  <a:pt x="6115203" y="1036741"/>
+                  <a:pt x="4366972" y="2816969"/>
+                  <a:pt x="2522370" y="2645710"/>
+                  <a:pt x="1726848" y="2645465"/>
                 </a:cubicBezTo>
                 <a:cubicBezTo>
-                  <a:pt x="6434291" y="1160566"/>
-                  <a:pt x="6891491" y="1649219"/>
-                  <a:pt x="6077103" y="1779335"/>
+                  <a:pt x="931326" y="2645220"/>
+                  <a:pt x="384784" y="2658662"/>
+                  <a:pt x="174717" y="2380990"/>
                 </a:cubicBezTo>
                 <a:cubicBezTo>
-                  <a:pt x="5262716" y="1909451"/>
-                  <a:pt x="2362353" y="1790358"/>
-                  <a:pt x="1228878" y="1817435"/>
+                  <a:pt x="-35350" y="2103318"/>
+                  <a:pt x="-170989" y="1365436"/>
+                  <a:pt x="466447" y="979433"/>
                 </a:cubicBezTo>
                 <a:cubicBezTo>
-                  <a:pt x="95403" y="1844512"/>
-                  <a:pt x="-4609" y="1243427"/>
-                  <a:pt x="153" y="1156666"/>
+                  <a:pt x="1103883" y="593430"/>
+                  <a:pt x="3353187" y="-155297"/>
+                  <a:pt x="3999336" y="64969"/>
                 </a:cubicBezTo>
                 <a:cubicBezTo>
-                  <a:pt x="4915" y="1069905"/>
-                  <a:pt x="-44297" y="443194"/>
-                  <a:pt x="981228" y="137866"/>
+                  <a:pt x="4645485" y="285235"/>
+                  <a:pt x="3903533" y="1985736"/>
+                  <a:pt x="4343344" y="2301028"/>
                 </a:cubicBezTo>
                 <a:cubicBezTo>
-                  <a:pt x="2006753" y="-167462"/>
-                  <a:pt x="4032876" y="302994"/>
-                  <a:pt x="5429403" y="109827"/>
+                  <a:pt x="4783155" y="2616320"/>
+                  <a:pt x="5899787" y="2440688"/>
+                  <a:pt x="6521244" y="2436665"/>
                 </a:cubicBezTo>
                 <a:cubicBezTo>
-                  <a:pt x="7156130" y="-190828"/>
-                  <a:pt x="9064001" y="231334"/>
-                  <a:pt x="9636616" y="137866"/>
+                  <a:pt x="7397883" y="2474377"/>
+                  <a:pt x="8215881" y="2628707"/>
+                  <a:pt x="8710044" y="2454269"/>
                 </a:cubicBezTo>
               </a:path>
             </a:pathLst>
@@ -8147,7 +8579,7 @@
     </p:spTree>
     <p:extLst>
       <p:ext uri="{BB962C8B-B14F-4D97-AF65-F5344CB8AC3E}">
-        <p14:creationId xmlns:p14="http://schemas.microsoft.com/office/powerpoint/2010/main" val="1091789387"/>
+        <p14:creationId xmlns:p14="http://schemas.microsoft.com/office/powerpoint/2010/main" val="385545695"/>
       </p:ext>
     </p:extLst>
   </p:cSld>
@@ -8453,21 +8885,6 @@
 </file>
 
 <file path=customXml/item1.xml><?xml version="1.0" encoding="utf-8"?>
-<p:properties xmlns:p="http://schemas.microsoft.com/office/2006/metadata/properties" xmlns:xsi="http://www.w3.org/2001/XMLSchema-instance" xmlns:pc="http://schemas.microsoft.com/office/infopath/2007/PartnerControls">
-  <documentManagement/>
-</p:properties>
-</file>
-
-<file path=customXml/item2.xml><?xml version="1.0" encoding="utf-8"?>
-<?mso-contentType ?>
-<FormTemplates xmlns="http://schemas.microsoft.com/sharepoint/v3/contenttype/forms">
-  <Display>DocumentLibraryForm</Display>
-  <Edit>DocumentLibraryForm</Edit>
-  <New>DocumentLibraryForm</New>
-</FormTemplates>
-</file>
-
-<file path=customXml/item3.xml><?xml version="1.0" encoding="utf-8"?>
 <ct:contentTypeSchema xmlns:ct="http://schemas.microsoft.com/office/2006/metadata/contentType" xmlns:ma="http://schemas.microsoft.com/office/2006/metadata/properties/metaAttributes" ct:_="" ma:_="" ma:contentTypeName="Document" ma:contentTypeID="0x01010074D2001F796B5842ACB4675D256F8FDC" ma:contentTypeVersion="12" ma:contentTypeDescription="Create a new document." ma:contentTypeScope="" ma:versionID="c85e048fa781f40110e66b592c02dbca">
   <xsd:schema xmlns:xsd="http://www.w3.org/2001/XMLSchema" xmlns:xs="http://www.w3.org/2001/XMLSchema" xmlns:p="http://schemas.microsoft.com/office/2006/metadata/properties" xmlns:ns3="88a3e169-3f2e-4cb2-84e3-0f816f3920de" xmlns:ns4="6d44ab1e-4f7a-423e-9215-d8d8e61f56e6" targetNamespace="http://schemas.microsoft.com/office/2006/metadata/properties" ma:root="true" ma:fieldsID="6538c91a1e992d8cfb9fb30155d82126" ns3:_="" ns4:_="">
     <xsd:import namespace="88a3e169-3f2e-4cb2-84e3-0f816f3920de"/>
@@ -8684,24 +9101,22 @@
 </ct:contentTypeSchema>
 </file>
 
-<file path=customXml/itemProps1.xml><?xml version="1.0" encoding="utf-8"?>
-<ds:datastoreItem xmlns:ds="http://schemas.openxmlformats.org/officeDocument/2006/customXml" ds:itemID="{05F4B324-A6F8-4FC0-BBBB-05E2337781BA}">
-  <ds:schemaRefs>
-    <ds:schemaRef ds:uri="http://schemas.microsoft.com/office/2006/metadata/properties"/>
-    <ds:schemaRef ds:uri="http://schemas.microsoft.com/office/infopath/2007/PartnerControls"/>
-  </ds:schemaRefs>
-</ds:datastoreItem>
+<file path=customXml/item2.xml><?xml version="1.0" encoding="utf-8"?>
+<?mso-contentType ?>
+<FormTemplates xmlns="http://schemas.microsoft.com/sharepoint/v3/contenttype/forms">
+  <Display>DocumentLibraryForm</Display>
+  <Edit>DocumentLibraryForm</Edit>
+  <New>DocumentLibraryForm</New>
+</FormTemplates>
 </file>
 
-<file path=customXml/itemProps2.xml><?xml version="1.0" encoding="utf-8"?>
-<ds:datastoreItem xmlns:ds="http://schemas.openxmlformats.org/officeDocument/2006/customXml" ds:itemID="{7F29137C-F1C0-4930-80A0-A7C0C38F3D82}">
-  <ds:schemaRefs>
-    <ds:schemaRef ds:uri="http://schemas.microsoft.com/sharepoint/v3/contenttype/forms"/>
-  </ds:schemaRefs>
-</ds:datastoreItem>
+<file path=customXml/item3.xml><?xml version="1.0" encoding="utf-8"?>
+<p:properties xmlns:p="http://schemas.microsoft.com/office/2006/metadata/properties" xmlns:xsi="http://www.w3.org/2001/XMLSchema-instance" xmlns:pc="http://schemas.microsoft.com/office/infopath/2007/PartnerControls">
+  <documentManagement/>
+</p:properties>
 </file>
 
-<file path=customXml/itemProps3.xml><?xml version="1.0" encoding="utf-8"?>
+<file path=customXml/itemProps1.xml><?xml version="1.0" encoding="utf-8"?>
 <ds:datastoreItem xmlns:ds="http://schemas.openxmlformats.org/officeDocument/2006/customXml" ds:itemID="{BE4DBC62-83C7-4C26-A85C-6023E4D35A02}">
   <ds:schemaRefs>
     <ds:schemaRef ds:uri="http://schemas.microsoft.com/office/2006/metadata/contentType"/>
@@ -8718,4 +9133,29 @@
     <ds:schemaRef ds:uri="http://schemas.microsoft.com/internal/obd"/>
   </ds:schemaRefs>
 </ds:datastoreItem>
+</file>
+
+<file path=customXml/itemProps2.xml><?xml version="1.0" encoding="utf-8"?>
+<ds:datastoreItem xmlns:ds="http://schemas.openxmlformats.org/officeDocument/2006/customXml" ds:itemID="{7F29137C-F1C0-4930-80A0-A7C0C38F3D82}">
+  <ds:schemaRefs>
+    <ds:schemaRef ds:uri="http://schemas.microsoft.com/sharepoint/v3/contenttype/forms"/>
+  </ds:schemaRefs>
+</ds:datastoreItem>
+</file>
+
+<file path=customXml/itemProps3.xml><?xml version="1.0" encoding="utf-8"?>
+<ds:datastoreItem xmlns:ds="http://schemas.openxmlformats.org/officeDocument/2006/customXml" ds:itemID="{05F4B324-A6F8-4FC0-BBBB-05E2337781BA}">
+  <ds:schemaRefs>
+    <ds:schemaRef ds:uri="http://purl.org/dc/dcmitype/"/>
+    <ds:schemaRef ds:uri="http://schemas.microsoft.com/office/infopath/2007/PartnerControls"/>
+    <ds:schemaRef ds:uri="http://schemas.microsoft.com/office/2006/documentManagement/types"/>
+    <ds:schemaRef ds:uri="http://schemas.microsoft.com/office/2006/metadata/properties"/>
+    <ds:schemaRef ds:uri="http://purl.org/dc/terms/"/>
+    <ds:schemaRef ds:uri="http://schemas.openxmlformats.org/package/2006/metadata/core-properties"/>
+    <ds:schemaRef ds:uri="6d44ab1e-4f7a-423e-9215-d8d8e61f56e6"/>
+    <ds:schemaRef ds:uri="88a3e169-3f2e-4cb2-84e3-0f816f3920de"/>
+    <ds:schemaRef ds:uri="http://www.w3.org/XML/1998/namespace"/>
+    <ds:schemaRef ds:uri="http://purl.org/dc/elements/1.1/"/>
+  </ds:schemaRefs>
+</ds:datastoreItem>
 </file>
</xml_diff>